<commit_message>
update ppt for examination
</commit_message>
<xml_diff>
--- a/Ppt/финальная версия.pptx
+++ b/Ppt/финальная версия.pptx
@@ -5,7 +5,7 @@
     <p:sldMasterId id="2147483648" r:id="rId1"/>
   </p:sldMasterIdLst>
   <p:notesMasterIdLst>
-    <p:notesMasterId r:id="rId11"/>
+    <p:notesMasterId r:id="rId13"/>
   </p:notesMasterIdLst>
   <p:sldIdLst>
     <p:sldId id="256" r:id="rId2"/>
@@ -14,9 +14,11 @@
     <p:sldId id="264" r:id="rId5"/>
     <p:sldId id="266" r:id="rId6"/>
     <p:sldId id="267" r:id="rId7"/>
-    <p:sldId id="261" r:id="rId8"/>
-    <p:sldId id="265" r:id="rId9"/>
-    <p:sldId id="263" r:id="rId10"/>
+    <p:sldId id="268" r:id="rId8"/>
+    <p:sldId id="269" r:id="rId9"/>
+    <p:sldId id="261" r:id="rId10"/>
+    <p:sldId id="265" r:id="rId11"/>
+    <p:sldId id="263" r:id="rId12"/>
   </p:sldIdLst>
   <p:sldSz cx="12192000" cy="6858000"/>
   <p:notesSz cx="6858000" cy="9144000"/>
@@ -4886,6 +4888,843 @@
     <p:extLst>
       <p:ext uri="{BB962C8B-B14F-4D97-AF65-F5344CB8AC3E}">
         <p14:creationId xmlns:p14="http://schemas.microsoft.com/office/powerpoint/2010/main" val="3704616448"/>
+      </p:ext>
+    </p:extLst>
+  </p:cSld>
+  <p:clrMapOvr>
+    <a:masterClrMapping/>
+  </p:clrMapOvr>
+</p:sld>
+</file>
+
+<file path=ppt/slides/slide10.xml><?xml version="1.0" encoding="utf-8"?>
+<p:sld xmlns:a="http://schemas.openxmlformats.org/drawingml/2006/main" xmlns:r="http://schemas.openxmlformats.org/officeDocument/2006/relationships" xmlns:p="http://schemas.openxmlformats.org/presentationml/2006/main">
+  <p:cSld>
+    <p:spTree>
+      <p:nvGrpSpPr>
+        <p:cNvPr id="1" name=""/>
+        <p:cNvGrpSpPr/>
+        <p:nvPr/>
+      </p:nvGrpSpPr>
+      <p:grpSpPr>
+        <a:xfrm>
+          <a:off x="0" y="0"/>
+          <a:ext cx="0" cy="0"/>
+          <a:chOff x="0" y="0"/>
+          <a:chExt cx="0" cy="0"/>
+        </a:xfrm>
+      </p:grpSpPr>
+      <p:sp>
+        <p:nvSpPr>
+          <p:cNvPr id="4" name="Slide Number Placeholder 3">
+            <a:extLst>
+              <a:ext uri="{FF2B5EF4-FFF2-40B4-BE49-F238E27FC236}">
+                <a16:creationId xmlns:a16="http://schemas.microsoft.com/office/drawing/2014/main" id="{356807AF-B532-44F6-A3C5-779F1176F644}"/>
+              </a:ext>
+            </a:extLst>
+          </p:cNvPr>
+          <p:cNvSpPr>
+            <a:spLocks noGrp="1"/>
+          </p:cNvSpPr>
+          <p:nvPr>
+            <p:ph type="sldNum" sz="quarter" idx="12"/>
+          </p:nvPr>
+        </p:nvSpPr>
+        <p:spPr/>
+        <p:txBody>
+          <a:bodyPr/>
+          <a:lstStyle/>
+          <a:p>
+            <a:fld id="{1F8BD534-37C6-45AF-BD63-E8CFF4C8D25C}" type="slidenum">
+              <a:rPr lang="en-US" smtClean="0"/>
+              <a:t>10</a:t>
+            </a:fld>
+            <a:endParaRPr lang="en-US"/>
+          </a:p>
+        </p:txBody>
+      </p:sp>
+      <p:sp>
+        <p:nvSpPr>
+          <p:cNvPr id="5" name="TextBox 4">
+            <a:extLst>
+              <a:ext uri="{FF2B5EF4-FFF2-40B4-BE49-F238E27FC236}">
+                <a16:creationId xmlns:a16="http://schemas.microsoft.com/office/drawing/2014/main" id="{E2F314B4-3CCB-44D2-AF5F-B866DD7E5345}"/>
+              </a:ext>
+            </a:extLst>
+          </p:cNvPr>
+          <p:cNvSpPr txBox="1"/>
+          <p:nvPr/>
+        </p:nvSpPr>
+        <p:spPr>
+          <a:xfrm>
+            <a:off x="245214" y="796304"/>
+            <a:ext cx="11384715" cy="646331"/>
+          </a:xfrm>
+          <a:prstGeom prst="rect">
+            <a:avLst/>
+          </a:prstGeom>
+          <a:noFill/>
+        </p:spPr>
+        <p:txBody>
+          <a:bodyPr wrap="square">
+            <a:spAutoFit/>
+          </a:bodyPr>
+          <a:lstStyle/>
+          <a:p>
+            <a:pPr algn="just"/>
+            <a:r>
+              <a:rPr lang="ru-RU" dirty="0">
+                <a:latin typeface="+mj-lt"/>
+              </a:rPr>
+              <a:t>Итоговый момент определяется как отношение ускорений рамы при перенацеливании и при тестовом воздействии</a:t>
+            </a:r>
+          </a:p>
+        </p:txBody>
+      </p:sp>
+      <p:sp>
+        <p:nvSpPr>
+          <p:cNvPr id="6" name="TextBox 5">
+            <a:extLst>
+              <a:ext uri="{FF2B5EF4-FFF2-40B4-BE49-F238E27FC236}">
+                <a16:creationId xmlns:a16="http://schemas.microsoft.com/office/drawing/2014/main" id="{339AB545-3535-4DD5-A63E-4232D3ED4C5B}"/>
+              </a:ext>
+            </a:extLst>
+          </p:cNvPr>
+          <p:cNvSpPr txBox="1"/>
+          <p:nvPr/>
+        </p:nvSpPr>
+        <p:spPr>
+          <a:xfrm>
+            <a:off x="0" y="-7506"/>
+            <a:ext cx="10633039" cy="646331"/>
+          </a:xfrm>
+          <a:prstGeom prst="rect">
+            <a:avLst/>
+          </a:prstGeom>
+          <a:noFill/>
+        </p:spPr>
+        <p:txBody>
+          <a:bodyPr wrap="none" rtlCol="0">
+            <a:spAutoFit/>
+          </a:bodyPr>
+          <a:lstStyle/>
+          <a:p>
+            <a:r>
+              <a:rPr lang="ru-RU" sz="3600" dirty="0">
+                <a:latin typeface="+mj-lt"/>
+              </a:rPr>
+              <a:t>Оценка момента на основание при перенацеливании</a:t>
+            </a:r>
+          </a:p>
+        </p:txBody>
+      </p:sp>
+      <mc:AlternateContent xmlns:mc="http://schemas.openxmlformats.org/markup-compatibility/2006" xmlns:a14="http://schemas.microsoft.com/office/drawing/2010/main">
+        <mc:Choice Requires="a14">
+          <p:sp>
+            <p:nvSpPr>
+              <p:cNvPr id="7" name="TextBox 6">
+                <a:extLst>
+                  <a:ext uri="{FF2B5EF4-FFF2-40B4-BE49-F238E27FC236}">
+                    <a16:creationId xmlns:a16="http://schemas.microsoft.com/office/drawing/2014/main" id="{426F59A3-387F-40BD-A3D9-ADE749A62E24}"/>
+                  </a:ext>
+                </a:extLst>
+              </p:cNvPr>
+              <p:cNvSpPr txBox="1"/>
+              <p:nvPr/>
+            </p:nvSpPr>
+            <p:spPr>
+              <a:xfrm>
+                <a:off x="403642" y="1600114"/>
+                <a:ext cx="11384715" cy="612475"/>
+              </a:xfrm>
+              <a:prstGeom prst="rect">
+                <a:avLst/>
+              </a:prstGeom>
+              <a:noFill/>
+            </p:spPr>
+            <p:txBody>
+              <a:bodyPr wrap="square">
+                <a:spAutoFit/>
+              </a:bodyPr>
+              <a:lstStyle/>
+              <a:p>
+                <a:pPr algn="just"/>
+                <a14:m>
+                  <m:oMathPara xmlns:m="http://schemas.openxmlformats.org/officeDocument/2006/math">
+                    <m:oMathParaPr>
+                      <m:jc m:val="centerGroup"/>
+                    </m:oMathParaPr>
+                    <m:oMath xmlns:m="http://schemas.openxmlformats.org/officeDocument/2006/math">
+                      <m:r>
+                        <a:rPr lang="en-US" b="0" i="1" smtClean="0">
+                          <a:latin typeface="Cambria Math" panose="02040503050406030204" pitchFamily="18" charset="0"/>
+                        </a:rPr>
+                        <m:t>𝑀</m:t>
+                      </m:r>
+                      <m:r>
+                        <a:rPr lang="en-US" b="0" i="1" smtClean="0">
+                          <a:latin typeface="Cambria Math" panose="02040503050406030204" pitchFamily="18" charset="0"/>
+                        </a:rPr>
+                        <m:t>=</m:t>
+                      </m:r>
+                      <m:f>
+                        <m:fPr>
+                          <m:ctrlPr>
+                            <a:rPr lang="en-US" b="0" i="1" smtClean="0">
+                              <a:latin typeface="Cambria Math" panose="02040503050406030204" pitchFamily="18" charset="0"/>
+                              <a:ea typeface="Cambria Math" panose="02040503050406030204" pitchFamily="18" charset="0"/>
+                            </a:rPr>
+                          </m:ctrlPr>
+                        </m:fPr>
+                        <m:num>
+                          <m:sSub>
+                            <m:sSubPr>
+                              <m:ctrlPr>
+                                <a:rPr lang="en-US" i="1" smtClean="0">
+                                  <a:latin typeface="Cambria Math" panose="02040503050406030204" pitchFamily="18" charset="0"/>
+                                  <a:ea typeface="Cambria Math" panose="02040503050406030204" pitchFamily="18" charset="0"/>
+                                </a:rPr>
+                              </m:ctrlPr>
+                            </m:sSubPr>
+                            <m:e>
+                              <m:r>
+                                <m:rPr>
+                                  <m:sty m:val="p"/>
+                                </m:rPr>
+                                <a:rPr lang="en-US" i="1">
+                                  <a:latin typeface="Cambria Math" panose="02040503050406030204" pitchFamily="18" charset="0"/>
+                                  <a:ea typeface="Cambria Math" panose="02040503050406030204" pitchFamily="18" charset="0"/>
+                                </a:rPr>
+                                <m:t>ε</m:t>
+                              </m:r>
+                            </m:e>
+                            <m:sub>
+                              <m:r>
+                                <a:rPr lang="ru-RU" b="0" i="1" smtClean="0">
+                                  <a:latin typeface="Cambria Math" panose="02040503050406030204" pitchFamily="18" charset="0"/>
+                                  <a:ea typeface="Cambria Math" panose="02040503050406030204" pitchFamily="18" charset="0"/>
+                                </a:rPr>
+                                <m:t>п</m:t>
+                              </m:r>
+                            </m:sub>
+                          </m:sSub>
+                        </m:num>
+                        <m:den>
+                          <m:sSub>
+                            <m:sSubPr>
+                              <m:ctrlPr>
+                                <a:rPr lang="en-US" i="1">
+                                  <a:latin typeface="Cambria Math" panose="02040503050406030204" pitchFamily="18" charset="0"/>
+                                  <a:ea typeface="Cambria Math" panose="02040503050406030204" pitchFamily="18" charset="0"/>
+                                </a:rPr>
+                              </m:ctrlPr>
+                            </m:sSubPr>
+                            <m:e>
+                              <m:r>
+                                <m:rPr>
+                                  <m:sty m:val="p"/>
+                                </m:rPr>
+                                <a:rPr lang="en-US" i="1">
+                                  <a:latin typeface="Cambria Math" panose="02040503050406030204" pitchFamily="18" charset="0"/>
+                                  <a:ea typeface="Cambria Math" panose="02040503050406030204" pitchFamily="18" charset="0"/>
+                                </a:rPr>
+                                <m:t>ε</m:t>
+                              </m:r>
+                            </m:e>
+                            <m:sub>
+                              <m:r>
+                                <a:rPr lang="ru-RU" b="0" i="1" smtClean="0">
+                                  <a:latin typeface="Cambria Math" panose="02040503050406030204" pitchFamily="18" charset="0"/>
+                                  <a:ea typeface="Cambria Math" panose="02040503050406030204" pitchFamily="18" charset="0"/>
+                                </a:rPr>
+                                <m:t>т</m:t>
+                              </m:r>
+                            </m:sub>
+                          </m:sSub>
+                        </m:den>
+                      </m:f>
+                      <m:r>
+                        <a:rPr lang="en-US" b="0" i="1" smtClean="0">
+                          <a:latin typeface="Cambria Math" panose="02040503050406030204" pitchFamily="18" charset="0"/>
+                          <a:ea typeface="Cambria Math" panose="02040503050406030204" pitchFamily="18" charset="0"/>
+                        </a:rPr>
+                        <m:t>∙</m:t>
+                      </m:r>
+                      <m:sSub>
+                        <m:sSubPr>
+                          <m:ctrlPr>
+                            <a:rPr lang="en-US" b="0" i="1" smtClean="0">
+                              <a:latin typeface="Cambria Math" panose="02040503050406030204" pitchFamily="18" charset="0"/>
+                              <a:ea typeface="Cambria Math" panose="02040503050406030204" pitchFamily="18" charset="0"/>
+                            </a:rPr>
+                          </m:ctrlPr>
+                        </m:sSubPr>
+                        <m:e>
+                          <m:r>
+                            <a:rPr lang="en-US" b="0" i="1" smtClean="0">
+                              <a:latin typeface="Cambria Math" panose="02040503050406030204" pitchFamily="18" charset="0"/>
+                              <a:ea typeface="Cambria Math" panose="02040503050406030204" pitchFamily="18" charset="0"/>
+                            </a:rPr>
+                            <m:t>𝑀</m:t>
+                          </m:r>
+                        </m:e>
+                        <m:sub>
+                          <m:r>
+                            <a:rPr lang="ru-RU" b="0" i="1" smtClean="0">
+                              <a:latin typeface="Cambria Math" panose="02040503050406030204" pitchFamily="18" charset="0"/>
+                              <a:ea typeface="Cambria Math" panose="02040503050406030204" pitchFamily="18" charset="0"/>
+                            </a:rPr>
+                            <m:t>т</m:t>
+                          </m:r>
+                        </m:sub>
+                      </m:sSub>
+                    </m:oMath>
+                  </m:oMathPara>
+                </a14:m>
+                <a:endParaRPr lang="ru-RU" dirty="0">
+                  <a:latin typeface="+mj-lt"/>
+                </a:endParaRPr>
+              </a:p>
+            </p:txBody>
+          </p:sp>
+        </mc:Choice>
+        <mc:Fallback xmlns="">
+          <p:sp>
+            <p:nvSpPr>
+              <p:cNvPr id="7" name="TextBox 6">
+                <a:extLst>
+                  <a:ext uri="{FF2B5EF4-FFF2-40B4-BE49-F238E27FC236}">
+                    <a16:creationId xmlns:a16="http://schemas.microsoft.com/office/drawing/2014/main" id="{426F59A3-387F-40BD-A3D9-ADE749A62E24}"/>
+                  </a:ext>
+                </a:extLst>
+              </p:cNvPr>
+              <p:cNvSpPr txBox="1">
+                <a:spLocks noRot="1" noChangeAspect="1" noMove="1" noResize="1" noEditPoints="1" noAdjustHandles="1" noChangeArrowheads="1" noChangeShapeType="1" noTextEdit="1"/>
+              </p:cNvSpPr>
+              <p:nvPr/>
+            </p:nvSpPr>
+            <p:spPr>
+              <a:xfrm>
+                <a:off x="403642" y="1600114"/>
+                <a:ext cx="11384715" cy="612475"/>
+              </a:xfrm>
+              <a:prstGeom prst="rect">
+                <a:avLst/>
+              </a:prstGeom>
+              <a:blipFill>
+                <a:blip r:embed="rId2"/>
+                <a:stretch>
+                  <a:fillRect/>
+                </a:stretch>
+              </a:blipFill>
+            </p:spPr>
+            <p:txBody>
+              <a:bodyPr/>
+              <a:lstStyle/>
+              <a:p>
+                <a:r>
+                  <a:rPr lang="en-US">
+                    <a:noFill/>
+                  </a:rPr>
+                  <a:t> </a:t>
+                </a:r>
+              </a:p>
+            </p:txBody>
+          </p:sp>
+        </mc:Fallback>
+      </mc:AlternateContent>
+      <mc:AlternateContent xmlns:mc="http://schemas.openxmlformats.org/markup-compatibility/2006" xmlns:a14="http://schemas.microsoft.com/office/drawing/2010/main">
+        <mc:Choice Requires="a14">
+          <p:sp>
+            <p:nvSpPr>
+              <p:cNvPr id="8" name="TextBox 7">
+                <a:extLst>
+                  <a:ext uri="{FF2B5EF4-FFF2-40B4-BE49-F238E27FC236}">
+                    <a16:creationId xmlns:a16="http://schemas.microsoft.com/office/drawing/2014/main" id="{654FEEA9-50CF-470D-ADDC-678036E55340}"/>
+                  </a:ext>
+                </a:extLst>
+              </p:cNvPr>
+              <p:cNvSpPr txBox="1"/>
+              <p:nvPr/>
+            </p:nvSpPr>
+            <p:spPr>
+              <a:xfrm>
+                <a:off x="403642" y="2212589"/>
+                <a:ext cx="11384715" cy="646331"/>
+              </a:xfrm>
+              <a:prstGeom prst="rect">
+                <a:avLst/>
+              </a:prstGeom>
+              <a:noFill/>
+            </p:spPr>
+            <p:txBody>
+              <a:bodyPr wrap="square">
+                <a:spAutoFit/>
+              </a:bodyPr>
+              <a:lstStyle/>
+              <a:p>
+                <a:pPr algn="just"/>
+                <a:r>
+                  <a:rPr lang="ru-RU" dirty="0">
+                    <a:latin typeface="+mj-lt"/>
+                  </a:rPr>
+                  <a:t>Где </a:t>
+                </a:r>
+                <a14:m>
+                  <m:oMath xmlns:m="http://schemas.openxmlformats.org/officeDocument/2006/math">
+                    <m:sSub>
+                      <m:sSubPr>
+                        <m:ctrlPr>
+                          <a:rPr lang="en-US" i="1" smtClean="0">
+                            <a:latin typeface="Cambria Math" panose="02040503050406030204" pitchFamily="18" charset="0"/>
+                            <a:ea typeface="Cambria Math" panose="02040503050406030204" pitchFamily="18" charset="0"/>
+                          </a:rPr>
+                        </m:ctrlPr>
+                      </m:sSubPr>
+                      <m:e>
+                        <m:r>
+                          <m:rPr>
+                            <m:sty m:val="p"/>
+                          </m:rPr>
+                          <a:rPr lang="en-US" i="1">
+                            <a:latin typeface="Cambria Math" panose="02040503050406030204" pitchFamily="18" charset="0"/>
+                            <a:ea typeface="Cambria Math" panose="02040503050406030204" pitchFamily="18" charset="0"/>
+                          </a:rPr>
+                          <m:t>ε</m:t>
+                        </m:r>
+                      </m:e>
+                      <m:sub>
+                        <m:r>
+                          <a:rPr lang="ru-RU" b="0" i="1" smtClean="0">
+                            <a:latin typeface="Cambria Math" panose="02040503050406030204" pitchFamily="18" charset="0"/>
+                            <a:ea typeface="Cambria Math" panose="02040503050406030204" pitchFamily="18" charset="0"/>
+                          </a:rPr>
+                          <m:t>п</m:t>
+                        </m:r>
+                      </m:sub>
+                    </m:sSub>
+                  </m:oMath>
+                </a14:m>
+                <a:r>
+                  <a:rPr lang="ru-RU" dirty="0">
+                    <a:latin typeface="+mj-lt"/>
+                  </a:rPr>
+                  <a:t> - ускорение рамы при перенацеливании</a:t>
+                </a:r>
+                <a:r>
+                  <a:rPr lang="en-US" dirty="0">
+                    <a:latin typeface="+mj-lt"/>
+                  </a:rPr>
+                  <a:t>; </a:t>
+                </a:r>
+                <a14:m>
+                  <m:oMath xmlns:m="http://schemas.openxmlformats.org/officeDocument/2006/math">
+                    <m:sSub>
+                      <m:sSubPr>
+                        <m:ctrlPr>
+                          <a:rPr lang="en-US" i="1">
+                            <a:latin typeface="Cambria Math" panose="02040503050406030204" pitchFamily="18" charset="0"/>
+                            <a:ea typeface="Cambria Math" panose="02040503050406030204" pitchFamily="18" charset="0"/>
+                          </a:rPr>
+                        </m:ctrlPr>
+                      </m:sSubPr>
+                      <m:e>
+                        <m:r>
+                          <m:rPr>
+                            <m:sty m:val="p"/>
+                          </m:rPr>
+                          <a:rPr lang="en-US" i="1">
+                            <a:latin typeface="Cambria Math" panose="02040503050406030204" pitchFamily="18" charset="0"/>
+                            <a:ea typeface="Cambria Math" panose="02040503050406030204" pitchFamily="18" charset="0"/>
+                          </a:rPr>
+                          <m:t>ε</m:t>
+                        </m:r>
+                      </m:e>
+                      <m:sub>
+                        <m:r>
+                          <a:rPr lang="ru-RU" i="1">
+                            <a:latin typeface="Cambria Math" panose="02040503050406030204" pitchFamily="18" charset="0"/>
+                            <a:ea typeface="Cambria Math" panose="02040503050406030204" pitchFamily="18" charset="0"/>
+                          </a:rPr>
+                          <m:t>т</m:t>
+                        </m:r>
+                      </m:sub>
+                    </m:sSub>
+                  </m:oMath>
+                </a14:m>
+                <a:r>
+                  <a:rPr lang="en-US" dirty="0">
+                    <a:latin typeface="+mj-lt"/>
+                  </a:rPr>
+                  <a:t> - </a:t>
+                </a:r>
+                <a:r>
+                  <a:rPr lang="ru-RU" dirty="0">
+                    <a:latin typeface="+mj-lt"/>
+                  </a:rPr>
+                  <a:t>ускорение рамы при тестовом воздействии</a:t>
+                </a:r>
+                <a:r>
+                  <a:rPr lang="en-US" dirty="0">
+                    <a:latin typeface="+mj-lt"/>
+                  </a:rPr>
+                  <a:t>; </a:t>
+                </a:r>
+                <a14:m>
+                  <m:oMath xmlns:m="http://schemas.openxmlformats.org/officeDocument/2006/math">
+                    <m:sSub>
+                      <m:sSubPr>
+                        <m:ctrlPr>
+                          <a:rPr lang="en-US" i="1">
+                            <a:latin typeface="Cambria Math" panose="02040503050406030204" pitchFamily="18" charset="0"/>
+                            <a:ea typeface="Cambria Math" panose="02040503050406030204" pitchFamily="18" charset="0"/>
+                          </a:rPr>
+                        </m:ctrlPr>
+                      </m:sSubPr>
+                      <m:e>
+                        <m:r>
+                          <a:rPr lang="en-US" i="1">
+                            <a:latin typeface="Cambria Math" panose="02040503050406030204" pitchFamily="18" charset="0"/>
+                            <a:ea typeface="Cambria Math" panose="02040503050406030204" pitchFamily="18" charset="0"/>
+                          </a:rPr>
+                          <m:t>𝑀</m:t>
+                        </m:r>
+                      </m:e>
+                      <m:sub>
+                        <m:r>
+                          <a:rPr lang="ru-RU" i="1">
+                            <a:latin typeface="Cambria Math" panose="02040503050406030204" pitchFamily="18" charset="0"/>
+                            <a:ea typeface="Cambria Math" panose="02040503050406030204" pitchFamily="18" charset="0"/>
+                          </a:rPr>
+                          <m:t>т</m:t>
+                        </m:r>
+                      </m:sub>
+                    </m:sSub>
+                  </m:oMath>
+                </a14:m>
+                <a:r>
+                  <a:rPr lang="en-US" dirty="0">
+                    <a:latin typeface="+mj-lt"/>
+                  </a:rPr>
+                  <a:t> - </a:t>
+                </a:r>
+                <a:r>
+                  <a:rPr lang="ru-RU" dirty="0">
+                    <a:latin typeface="+mj-lt"/>
+                  </a:rPr>
+                  <a:t>эталонный момент маховика, равный 0,005 </a:t>
+                </a:r>
+                <a:r>
+                  <a:rPr lang="ru-RU" dirty="0" err="1">
+                    <a:latin typeface="+mj-lt"/>
+                  </a:rPr>
+                  <a:t>Н·м</a:t>
+                </a:r>
+                <a:endParaRPr lang="ru-RU" dirty="0">
+                  <a:latin typeface="+mj-lt"/>
+                </a:endParaRPr>
+              </a:p>
+            </p:txBody>
+          </p:sp>
+        </mc:Choice>
+        <mc:Fallback xmlns="">
+          <p:sp>
+            <p:nvSpPr>
+              <p:cNvPr id="8" name="TextBox 7">
+                <a:extLst>
+                  <a:ext uri="{FF2B5EF4-FFF2-40B4-BE49-F238E27FC236}">
+                    <a16:creationId xmlns:a16="http://schemas.microsoft.com/office/drawing/2014/main" id="{654FEEA9-50CF-470D-ADDC-678036E55340}"/>
+                  </a:ext>
+                </a:extLst>
+              </p:cNvPr>
+              <p:cNvSpPr txBox="1">
+                <a:spLocks noRot="1" noChangeAspect="1" noMove="1" noResize="1" noEditPoints="1" noAdjustHandles="1" noChangeArrowheads="1" noChangeShapeType="1" noTextEdit="1"/>
+              </p:cNvSpPr>
+              <p:nvPr/>
+            </p:nvSpPr>
+            <p:spPr>
+              <a:xfrm>
+                <a:off x="403642" y="2212589"/>
+                <a:ext cx="11384715" cy="646331"/>
+              </a:xfrm>
+              <a:prstGeom prst="rect">
+                <a:avLst/>
+              </a:prstGeom>
+              <a:blipFill>
+                <a:blip r:embed="rId3"/>
+                <a:stretch>
+                  <a:fillRect l="-428" t="-5660" r="-482" b="-14151"/>
+                </a:stretch>
+              </a:blipFill>
+            </p:spPr>
+            <p:txBody>
+              <a:bodyPr/>
+              <a:lstStyle/>
+              <a:p>
+                <a:r>
+                  <a:rPr lang="en-US">
+                    <a:noFill/>
+                  </a:rPr>
+                  <a:t> </a:t>
+                </a:r>
+              </a:p>
+            </p:txBody>
+          </p:sp>
+        </mc:Fallback>
+      </mc:AlternateContent>
+      <p:pic>
+        <p:nvPicPr>
+          <p:cNvPr id="10" name="Picture 9">
+            <a:extLst>
+              <a:ext uri="{FF2B5EF4-FFF2-40B4-BE49-F238E27FC236}">
+                <a16:creationId xmlns:a16="http://schemas.microsoft.com/office/drawing/2014/main" id="{B2C75F8D-E74C-4D9C-92C1-1CD7F2374AE0}"/>
+              </a:ext>
+            </a:extLst>
+          </p:cNvPr>
+          <p:cNvPicPr>
+            <a:picLocks noChangeAspect="1"/>
+          </p:cNvPicPr>
+          <p:nvPr/>
+        </p:nvPicPr>
+        <p:blipFill>
+          <a:blip r:embed="rId4">
+            <a:extLst>
+              <a:ext uri="{28A0092B-C50C-407E-A947-70E740481C1C}">
+                <a14:useLocalDpi xmlns:a14="http://schemas.microsoft.com/office/drawing/2010/main" val="0"/>
+              </a:ext>
+            </a:extLst>
+          </a:blip>
+          <a:stretch>
+            <a:fillRect/>
+          </a:stretch>
+        </p:blipFill>
+        <p:spPr>
+          <a:xfrm>
+            <a:off x="3614549" y="2858920"/>
+            <a:ext cx="4646044" cy="3484533"/>
+          </a:xfrm>
+          <a:prstGeom prst="rect">
+            <a:avLst/>
+          </a:prstGeom>
+        </p:spPr>
+      </p:pic>
+      <p:sp>
+        <p:nvSpPr>
+          <p:cNvPr id="11" name="TextBox 10">
+            <a:extLst>
+              <a:ext uri="{FF2B5EF4-FFF2-40B4-BE49-F238E27FC236}">
+                <a16:creationId xmlns:a16="http://schemas.microsoft.com/office/drawing/2014/main" id="{ED50AAA5-A17C-414A-B679-854F62D0E264}"/>
+              </a:ext>
+            </a:extLst>
+          </p:cNvPr>
+          <p:cNvSpPr txBox="1"/>
+          <p:nvPr/>
+        </p:nvSpPr>
+        <p:spPr>
+          <a:xfrm>
+            <a:off x="3869267" y="6343453"/>
+            <a:ext cx="3964547" cy="338554"/>
+          </a:xfrm>
+          <a:prstGeom prst="rect">
+            <a:avLst/>
+          </a:prstGeom>
+          <a:noFill/>
+        </p:spPr>
+        <p:txBody>
+          <a:bodyPr wrap="none" rtlCol="0">
+            <a:spAutoFit/>
+          </a:bodyPr>
+          <a:lstStyle/>
+          <a:p>
+            <a:r>
+              <a:rPr lang="ru-RU" sz="1600" dirty="0">
+                <a:latin typeface="+mj-lt"/>
+              </a:rPr>
+              <a:t>Рисунок 8 – Нескомпенсированный момент</a:t>
+            </a:r>
+          </a:p>
+        </p:txBody>
+      </p:sp>
+    </p:spTree>
+    <p:extLst>
+      <p:ext uri="{BB962C8B-B14F-4D97-AF65-F5344CB8AC3E}">
+        <p14:creationId xmlns:p14="http://schemas.microsoft.com/office/powerpoint/2010/main" val="2969139650"/>
+      </p:ext>
+    </p:extLst>
+  </p:cSld>
+  <p:clrMapOvr>
+    <a:masterClrMapping/>
+  </p:clrMapOvr>
+</p:sld>
+</file>
+
+<file path=ppt/slides/slide11.xml><?xml version="1.0" encoding="utf-8"?>
+<p:sld xmlns:a="http://schemas.openxmlformats.org/drawingml/2006/main" xmlns:r="http://schemas.openxmlformats.org/officeDocument/2006/relationships" xmlns:p="http://schemas.openxmlformats.org/presentationml/2006/main">
+  <p:cSld>
+    <p:spTree>
+      <p:nvGrpSpPr>
+        <p:cNvPr id="1" name=""/>
+        <p:cNvGrpSpPr/>
+        <p:nvPr/>
+      </p:nvGrpSpPr>
+      <p:grpSpPr>
+        <a:xfrm>
+          <a:off x="0" y="0"/>
+          <a:ext cx="0" cy="0"/>
+          <a:chOff x="0" y="0"/>
+          <a:chExt cx="0" cy="0"/>
+        </a:xfrm>
+      </p:grpSpPr>
+      <p:sp>
+        <p:nvSpPr>
+          <p:cNvPr id="2" name="Номер слайда 1"/>
+          <p:cNvSpPr>
+            <a:spLocks noGrp="1"/>
+          </p:cNvSpPr>
+          <p:nvPr>
+            <p:ph type="sldNum" sz="quarter" idx="12"/>
+          </p:nvPr>
+        </p:nvSpPr>
+        <p:spPr/>
+        <p:txBody>
+          <a:bodyPr/>
+          <a:lstStyle/>
+          <a:p>
+            <a:fld id="{1F8BD534-37C6-45AF-BD63-E8CFF4C8D25C}" type="slidenum">
+              <a:rPr lang="en-US" smtClean="0"/>
+              <a:t>11</a:t>
+            </a:fld>
+            <a:endParaRPr lang="en-US"/>
+          </a:p>
+        </p:txBody>
+      </p:sp>
+      <p:sp>
+        <p:nvSpPr>
+          <p:cNvPr id="4" name="TextBox 3">
+            <a:extLst>
+              <a:ext uri="{FF2B5EF4-FFF2-40B4-BE49-F238E27FC236}">
+                <a16:creationId xmlns:a16="http://schemas.microsoft.com/office/drawing/2014/main" id="{EEEC72EE-784F-449E-A930-23808E09552E}"/>
+              </a:ext>
+            </a:extLst>
+          </p:cNvPr>
+          <p:cNvSpPr txBox="1"/>
+          <p:nvPr/>
+        </p:nvSpPr>
+        <p:spPr>
+          <a:xfrm>
+            <a:off x="0" y="-7506"/>
+            <a:ext cx="2537874" cy="646331"/>
+          </a:xfrm>
+          <a:prstGeom prst="rect">
+            <a:avLst/>
+          </a:prstGeom>
+          <a:noFill/>
+        </p:spPr>
+        <p:txBody>
+          <a:bodyPr wrap="none" rtlCol="0">
+            <a:spAutoFit/>
+          </a:bodyPr>
+          <a:lstStyle/>
+          <a:p>
+            <a:r>
+              <a:rPr lang="ru-RU" sz="3600" dirty="0">
+                <a:latin typeface="+mj-lt"/>
+              </a:rPr>
+              <a:t>Заключение</a:t>
+            </a:r>
+          </a:p>
+        </p:txBody>
+      </p:sp>
+      <p:sp>
+        <p:nvSpPr>
+          <p:cNvPr id="8" name="TextBox 7">
+            <a:extLst>
+              <a:ext uri="{FF2B5EF4-FFF2-40B4-BE49-F238E27FC236}">
+                <a16:creationId xmlns:a16="http://schemas.microsoft.com/office/drawing/2014/main" id="{DCA36B11-BA86-458D-B0D6-526644284586}"/>
+              </a:ext>
+            </a:extLst>
+          </p:cNvPr>
+          <p:cNvSpPr txBox="1"/>
+          <p:nvPr/>
+        </p:nvSpPr>
+        <p:spPr>
+          <a:xfrm>
+            <a:off x="219003" y="964081"/>
+            <a:ext cx="11384715" cy="1477328"/>
+          </a:xfrm>
+          <a:prstGeom prst="rect">
+            <a:avLst/>
+          </a:prstGeom>
+          <a:noFill/>
+        </p:spPr>
+        <p:txBody>
+          <a:bodyPr wrap="square">
+            <a:spAutoFit/>
+          </a:bodyPr>
+          <a:lstStyle/>
+          <a:p>
+            <a:pPr marL="285750" indent="-285750" algn="just">
+              <a:buFont typeface="Arial" panose="020B0604020202020204" pitchFamily="34" charset="0"/>
+              <a:buChar char="•"/>
+            </a:pPr>
+            <a:r>
+              <a:rPr lang="ru-RU" b="1" dirty="0"/>
+              <a:t> </a:t>
+            </a:r>
+            <a:r>
+              <a:rPr lang="ru-RU" dirty="0"/>
+              <a:t>Разработан стенд для измерения остаточного реактивного момента при перенацеливании оптических систем.</a:t>
+            </a:r>
+          </a:p>
+          <a:p>
+            <a:pPr marL="285750" indent="-285750" algn="just">
+              <a:buFont typeface="Arial" panose="020B0604020202020204" pitchFamily="34" charset="0"/>
+              <a:buChar char="•"/>
+            </a:pPr>
+            <a:r>
+              <a:rPr lang="ru-RU" dirty="0"/>
+              <a:t> Проведено моделирование, определены оптимальные параметры колебательного звена.</a:t>
+            </a:r>
+          </a:p>
+          <a:p>
+            <a:pPr marL="285750" indent="-285750" algn="just">
+              <a:buFont typeface="Arial" panose="020B0604020202020204" pitchFamily="34" charset="0"/>
+              <a:buChar char="•"/>
+            </a:pPr>
+            <a:r>
+              <a:rPr lang="ru-RU" dirty="0"/>
+              <a:t> Методика измерения прошла аттестацию в Государственном реестре средств измерений.</a:t>
+            </a:r>
+          </a:p>
+          <a:p>
+            <a:pPr marL="285750" indent="-285750" algn="just">
+              <a:buFont typeface="Arial" panose="020B0604020202020204" pitchFamily="34" charset="0"/>
+              <a:buChar char="•"/>
+            </a:pPr>
+            <a:r>
+              <a:rPr lang="ru-RU" dirty="0"/>
+              <a:t> Достигнута высокая точность — погрешность менее 5%.</a:t>
+            </a:r>
+          </a:p>
+          <a:p>
+            <a:pPr marL="285750" indent="-285750" algn="just">
+              <a:buFont typeface="Arial" panose="020B0604020202020204" pitchFamily="34" charset="0"/>
+              <a:buChar char="•"/>
+            </a:pPr>
+            <a:r>
+              <a:rPr lang="ru-RU" dirty="0"/>
+              <a:t> Методика может применяться для настройки оптико-механических систем различного назначения</a:t>
+            </a:r>
+            <a:endParaRPr lang="ru-RU" dirty="0">
+              <a:latin typeface="+mj-lt"/>
+            </a:endParaRPr>
+          </a:p>
+        </p:txBody>
+      </p:sp>
+    </p:spTree>
+    <p:extLst>
+      <p:ext uri="{BB962C8B-B14F-4D97-AF65-F5344CB8AC3E}">
+        <p14:creationId xmlns:p14="http://schemas.microsoft.com/office/powerpoint/2010/main" val="1270011595"/>
       </p:ext>
     </p:extLst>
   </p:cSld>
@@ -6770,8 +7609,8 @@
           </a:p>
         </p:txBody>
       </p:sp>
-      <mc:AlternateContent xmlns:mc="http://schemas.openxmlformats.org/markup-compatibility/2006">
-        <mc:Choice xmlns:a14="http://schemas.microsoft.com/office/drawing/2010/main" Requires="a14">
+      <mc:AlternateContent xmlns:mc="http://schemas.openxmlformats.org/markup-compatibility/2006" xmlns:a14="http://schemas.microsoft.com/office/drawing/2010/main">
+        <mc:Choice Requires="a14">
           <p:sp>
             <p:nvSpPr>
               <p:cNvPr id="12" name="Прямоугольник 11">
@@ -7323,7 +8162,7 @@
             </p:txBody>
           </p:sp>
         </mc:Choice>
-        <mc:Fallback>
+        <mc:Fallback xmlns="">
           <p:sp>
             <p:nvSpPr>
               <p:cNvPr id="12" name="Прямоугольник 11">
@@ -7436,8 +8275,8 @@
           </a:prstGeom>
         </p:spPr>
       </p:pic>
-      <mc:AlternateContent xmlns:mc="http://schemas.openxmlformats.org/markup-compatibility/2006">
-        <mc:Choice xmlns:a14="http://schemas.microsoft.com/office/drawing/2010/main" Requires="a14">
+      <mc:AlternateContent xmlns:mc="http://schemas.openxmlformats.org/markup-compatibility/2006" xmlns:a14="http://schemas.microsoft.com/office/drawing/2010/main">
+        <mc:Choice Requires="a14">
           <p:sp>
             <p:nvSpPr>
               <p:cNvPr id="14" name="TextBox 13">
@@ -7980,7 +8819,7 @@
             </p:txBody>
           </p:sp>
         </mc:Choice>
-        <mc:Fallback>
+        <mc:Fallback xmlns="">
           <p:sp>
             <p:nvSpPr>
               <p:cNvPr id="14" name="TextBox 13">
@@ -8055,6 +8894,7 @@
               </a:bodyPr>
               <a:lstStyle/>
               <a:p>
+                <a:pPr/>
                 <a14:m>
                   <m:oMathPara xmlns:m="http://schemas.openxmlformats.org/officeDocument/2006/math">
                     <m:oMathParaPr>
@@ -8295,7 +9135,7 @@
               <a:lstStyle/>
               <a:p>
                 <a:r>
-                  <a:rPr lang="ru-RU">
+                  <a:rPr lang="en-US">
                     <a:noFill/>
                   </a:rPr>
                   <a:t> </a:t>
@@ -8426,7 +9266,7 @@
         </p:nvSpPr>
         <p:spPr>
           <a:xfrm>
-            <a:off x="730278" y="4008918"/>
+            <a:off x="573692" y="3726225"/>
             <a:ext cx="2953053" cy="338554"/>
           </a:xfrm>
           <a:prstGeom prst="rect">
@@ -8449,102 +9289,536 @@
           </a:p>
         </p:txBody>
       </p:sp>
-      <p:sp>
-        <p:nvSpPr>
-          <p:cNvPr id="12" name="Прямоугольник 11">
-            <a:extLst>
-              <a:ext uri="{FF2B5EF4-FFF2-40B4-BE49-F238E27FC236}">
-                <a16:creationId xmlns:a16="http://schemas.microsoft.com/office/drawing/2014/main" id="{85C5B0C8-5735-4441-B508-AA2CACCFCBE9}"/>
-              </a:ext>
-            </a:extLst>
-          </p:cNvPr>
-          <p:cNvSpPr/>
-          <p:nvPr/>
-        </p:nvSpPr>
-        <p:spPr>
-          <a:xfrm>
-            <a:off x="4917485" y="684037"/>
-            <a:ext cx="6970644" cy="3416320"/>
-          </a:xfrm>
-          <a:prstGeom prst="rect">
-            <a:avLst/>
-          </a:prstGeom>
-        </p:spPr>
-        <p:txBody>
-          <a:bodyPr wrap="square">
-            <a:spAutoFit/>
-          </a:bodyPr>
-          <a:lstStyle/>
-          <a:p>
-            <a:pPr algn="just"/>
-            <a:r>
-              <a:rPr lang="ru-RU" sz="2400" dirty="0"/>
-              <a:t>Маховик устанавливается на </a:t>
-            </a:r>
-            <a:r>
-              <a:rPr lang="ru-RU" sz="2400" dirty="0" err="1"/>
-              <a:t>безколлекторный</a:t>
-            </a:r>
-            <a:r>
-              <a:rPr lang="ru-RU" sz="2400" dirty="0"/>
-              <a:t> двигатель ДБМ-40.</a:t>
-            </a:r>
-          </a:p>
-          <a:p>
-            <a:pPr algn="just"/>
-            <a:endParaRPr lang="ru-RU" sz="2400" dirty="0"/>
-          </a:p>
-          <a:p>
-            <a:pPr algn="just"/>
-            <a:r>
-              <a:rPr lang="ru-RU" sz="2400" dirty="0"/>
-              <a:t>Двигатель ускоряется по </a:t>
-            </a:r>
-            <a:r>
-              <a:rPr lang="ru-RU" sz="2400" dirty="0" err="1"/>
-              <a:t>трапецевидному</a:t>
-            </a:r>
-            <a:r>
-              <a:rPr lang="ru-RU" sz="2400" dirty="0"/>
-              <a:t> закону.</a:t>
-            </a:r>
-            <a:br>
-              <a:rPr lang="ru-RU" sz="2400" dirty="0"/>
-            </a:br>
-            <a:br>
-              <a:rPr lang="ru-RU" sz="2400" dirty="0"/>
-            </a:br>
-            <a:r>
-              <a:rPr lang="ru-RU" sz="2400" dirty="0"/>
-              <a:t>Скорость двигателя измеряется по датчику угла </a:t>
-            </a:r>
-            <a:r>
-              <a:rPr lang="en-US" sz="2400" dirty="0"/>
-              <a:t>&lt;</a:t>
-            </a:r>
-            <a:r>
-              <a:rPr lang="ru-RU" sz="2400" dirty="0"/>
-              <a:t>ИМЯ</a:t>
-            </a:r>
-            <a:r>
-              <a:rPr lang="en-US" sz="2400" dirty="0"/>
-              <a:t>&gt;</a:t>
-            </a:r>
-            <a:r>
-              <a:rPr lang="ru-RU" sz="2400" dirty="0"/>
-              <a:t>.</a:t>
-            </a:r>
-          </a:p>
-          <a:p>
-            <a:pPr algn="just"/>
-            <a:endParaRPr lang="ru-RU" sz="2400"/>
-          </a:p>
-          <a:p>
-            <a:pPr algn="just"/>
-            <a:endParaRPr lang="ru-RU" sz="2400" dirty="0"/>
-          </a:p>
-        </p:txBody>
-      </p:sp>
+      <mc:AlternateContent xmlns:mc="http://schemas.openxmlformats.org/markup-compatibility/2006">
+        <mc:Choice xmlns:a14="http://schemas.microsoft.com/office/drawing/2010/main" Requires="a14">
+          <p:sp>
+            <p:nvSpPr>
+              <p:cNvPr id="12" name="Прямоугольник 11">
+                <a:extLst>
+                  <a:ext uri="{FF2B5EF4-FFF2-40B4-BE49-F238E27FC236}">
+                    <a16:creationId xmlns:a16="http://schemas.microsoft.com/office/drawing/2014/main" id="{85C5B0C8-5735-4441-B508-AA2CACCFCBE9}"/>
+                  </a:ext>
+                </a:extLst>
+              </p:cNvPr>
+              <p:cNvSpPr/>
+              <p:nvPr/>
+            </p:nvSpPr>
+            <p:spPr>
+              <a:xfrm>
+                <a:off x="4917485" y="684037"/>
+                <a:ext cx="6970644" cy="7170617"/>
+              </a:xfrm>
+              <a:prstGeom prst="rect">
+                <a:avLst/>
+              </a:prstGeom>
+            </p:spPr>
+            <p:txBody>
+              <a:bodyPr wrap="square">
+                <a:spAutoFit/>
+              </a:bodyPr>
+              <a:lstStyle/>
+              <a:p>
+                <a:pPr algn="just"/>
+                <a:r>
+                  <a:rPr lang="ru-RU" sz="2400" dirty="0"/>
+                  <a:t>Маховик устанавливается на бе</a:t>
+                </a:r>
+                <a:r>
+                  <a:rPr lang="en-US" sz="2400" dirty="0"/>
+                  <a:t>c</a:t>
+                </a:r>
+                <a:r>
+                  <a:rPr lang="ru-RU" sz="2400" dirty="0"/>
+                  <a:t>коллекторный двигатель ДБМ-40.</a:t>
+                </a:r>
+              </a:p>
+              <a:p>
+                <a:pPr algn="just"/>
+                <a:endParaRPr lang="ru-RU" sz="2400" dirty="0"/>
+              </a:p>
+              <a:p>
+                <a:pPr algn="just"/>
+                <a:r>
+                  <a:rPr lang="ru-RU" sz="2400" dirty="0"/>
+                  <a:t>Двигатель ускоряется по трапециевидному закону.</a:t>
+                </a:r>
+                <a:br>
+                  <a:rPr lang="ru-RU" sz="2400" dirty="0"/>
+                </a:br>
+                <a:r>
+                  <a:rPr lang="ru-RU" sz="2400" dirty="0"/>
+                  <a:t>Скорость двигателя измеряется по датчику угла </a:t>
+                </a:r>
+                <a:r>
+                  <a:rPr lang="en-US" sz="2400" dirty="0"/>
+                  <a:t>&lt;</a:t>
+                </a:r>
+                <a:r>
+                  <a:rPr lang="ru-RU" sz="2400" dirty="0"/>
+                  <a:t>ИМЯ</a:t>
+                </a:r>
+                <a:r>
+                  <a:rPr lang="en-US" sz="2400" dirty="0"/>
+                  <a:t>&gt;</a:t>
+                </a:r>
+                <a:r>
+                  <a:rPr lang="ru-RU" sz="2400" dirty="0"/>
+                  <a:t>.</a:t>
+                </a:r>
+                <a:endParaRPr lang="en-US" sz="2400" dirty="0"/>
+              </a:p>
+              <a:p>
+                <a:pPr algn="just"/>
+                <a:endParaRPr lang="en-US" sz="2400" dirty="0"/>
+              </a:p>
+              <a:p>
+                <a:pPr algn="just"/>
+                <a:r>
+                  <a:rPr lang="ru-RU" sz="2400" dirty="0"/>
+                  <a:t>Погрешность измерения ускорения определяется многократными измерениями</a:t>
+                </a:r>
+              </a:p>
+              <a:p>
+                <a:pPr algn="just"/>
+                <a14:m>
+                  <m:oMathPara xmlns:m="http://schemas.openxmlformats.org/officeDocument/2006/math">
+                    <m:oMathParaPr>
+                      <m:jc m:val="centerGroup"/>
+                    </m:oMathParaPr>
+                    <m:oMath xmlns:m="http://schemas.openxmlformats.org/officeDocument/2006/math">
+                      <m:r>
+                        <a:rPr lang="ru-RU" sz="2400" i="1" smtClean="0">
+                          <a:latin typeface="Cambria Math" panose="02040503050406030204" pitchFamily="18" charset="0"/>
+                          <a:ea typeface="Cambria Math" panose="02040503050406030204" pitchFamily="18" charset="0"/>
+                        </a:rPr>
+                        <m:t>∆</m:t>
+                      </m:r>
+                      <m:r>
+                        <a:rPr lang="ru-RU" sz="2400" i="1" smtClean="0">
+                          <a:latin typeface="Cambria Math" panose="02040503050406030204" pitchFamily="18" charset="0"/>
+                          <a:ea typeface="Cambria Math" panose="02040503050406030204" pitchFamily="18" charset="0"/>
+                        </a:rPr>
+                        <m:t>𝜀</m:t>
+                      </m:r>
+                      <m:r>
+                        <a:rPr lang="ru-RU" sz="2400" b="0" i="1" smtClean="0">
+                          <a:latin typeface="Cambria Math" panose="02040503050406030204" pitchFamily="18" charset="0"/>
+                          <a:ea typeface="Cambria Math" panose="02040503050406030204" pitchFamily="18" charset="0"/>
+                        </a:rPr>
+                        <m:t>=±0,17 </m:t>
+                      </m:r>
+                      <m:f>
+                        <m:fPr>
+                          <m:ctrlPr>
+                            <a:rPr lang="ru-RU" sz="2400" b="0" i="1" smtClean="0">
+                              <a:latin typeface="Cambria Math" panose="02040503050406030204" pitchFamily="18" charset="0"/>
+                              <a:ea typeface="Cambria Math" panose="02040503050406030204" pitchFamily="18" charset="0"/>
+                            </a:rPr>
+                          </m:ctrlPr>
+                        </m:fPr>
+                        <m:num>
+                          <m:r>
+                            <a:rPr lang="ru-RU" sz="2400" b="0" i="1" smtClean="0">
+                              <a:latin typeface="Cambria Math" panose="02040503050406030204" pitchFamily="18" charset="0"/>
+                              <a:ea typeface="Cambria Math" panose="02040503050406030204" pitchFamily="18" charset="0"/>
+                            </a:rPr>
+                            <m:t>рад</m:t>
+                          </m:r>
+                        </m:num>
+                        <m:den>
+                          <m:sSup>
+                            <m:sSupPr>
+                              <m:ctrlPr>
+                                <a:rPr lang="ru-RU" sz="2400" b="0" i="1" smtClean="0">
+                                  <a:latin typeface="Cambria Math" panose="02040503050406030204" pitchFamily="18" charset="0"/>
+                                  <a:ea typeface="Cambria Math" panose="02040503050406030204" pitchFamily="18" charset="0"/>
+                                </a:rPr>
+                              </m:ctrlPr>
+                            </m:sSupPr>
+                            <m:e>
+                              <m:r>
+                                <a:rPr lang="ru-RU" sz="2400" b="0" i="1" smtClean="0">
+                                  <a:latin typeface="Cambria Math" panose="02040503050406030204" pitchFamily="18" charset="0"/>
+                                  <a:ea typeface="Cambria Math" panose="02040503050406030204" pitchFamily="18" charset="0"/>
+                                </a:rPr>
+                                <m:t>с</m:t>
+                              </m:r>
+                            </m:e>
+                            <m:sup>
+                              <m:r>
+                                <a:rPr lang="ru-RU" sz="2400" b="0" i="1" smtClean="0">
+                                  <a:latin typeface="Cambria Math" panose="02040503050406030204" pitchFamily="18" charset="0"/>
+                                  <a:ea typeface="Cambria Math" panose="02040503050406030204" pitchFamily="18" charset="0"/>
+                                </a:rPr>
+                                <m:t>2</m:t>
+                              </m:r>
+                            </m:sup>
+                          </m:sSup>
+                        </m:den>
+                      </m:f>
+                    </m:oMath>
+                  </m:oMathPara>
+                </a14:m>
+                <a:endParaRPr lang="ru-RU" sz="2400" dirty="0"/>
+              </a:p>
+              <a:p>
+                <a:pPr algn="just"/>
+                <a:endParaRPr lang="en-US" sz="2400" dirty="0"/>
+              </a:p>
+              <a:p>
+                <a:pPr algn="just"/>
+                <a:r>
+                  <a:rPr lang="ru-RU" sz="2400" dirty="0"/>
+                  <a:t>Итоговая погрешность тестового момента:</a:t>
+                </a:r>
+                <a:br>
+                  <a:rPr lang="ru-RU" sz="2400" dirty="0"/>
+                </a:br>
+                <a14:m>
+                  <m:oMathPara xmlns:m="http://schemas.openxmlformats.org/officeDocument/2006/math">
+                    <m:oMathParaPr>
+                      <m:jc m:val="centerGroup"/>
+                    </m:oMathParaPr>
+                    <m:oMath xmlns:m="http://schemas.openxmlformats.org/officeDocument/2006/math">
+                      <m:r>
+                        <a:rPr lang="ru-RU" sz="2400" i="1" smtClean="0">
+                          <a:latin typeface="Cambria Math" panose="02040503050406030204" pitchFamily="18" charset="0"/>
+                          <a:ea typeface="Cambria Math" panose="02040503050406030204" pitchFamily="18" charset="0"/>
+                        </a:rPr>
+                        <m:t>∆</m:t>
+                      </m:r>
+                      <m:r>
+                        <a:rPr lang="en-US" sz="2400" b="0" i="1" smtClean="0">
+                          <a:latin typeface="Cambria Math" panose="02040503050406030204" pitchFamily="18" charset="0"/>
+                          <a:ea typeface="Cambria Math" panose="02040503050406030204" pitchFamily="18" charset="0"/>
+                        </a:rPr>
+                        <m:t>𝑀</m:t>
+                      </m:r>
+                      <m:r>
+                        <a:rPr lang="en-US" sz="2400" b="0" i="1" smtClean="0">
+                          <a:latin typeface="Cambria Math" panose="02040503050406030204" pitchFamily="18" charset="0"/>
+                          <a:ea typeface="Cambria Math" panose="02040503050406030204" pitchFamily="18" charset="0"/>
+                        </a:rPr>
+                        <m:t>=</m:t>
+                      </m:r>
+                      <m:rad>
+                        <m:radPr>
+                          <m:degHide m:val="on"/>
+                          <m:ctrlPr>
+                            <a:rPr lang="en-US" sz="2400" b="0" i="1" smtClean="0">
+                              <a:latin typeface="Cambria Math" panose="02040503050406030204" pitchFamily="18" charset="0"/>
+                              <a:ea typeface="Cambria Math" panose="02040503050406030204" pitchFamily="18" charset="0"/>
+                            </a:rPr>
+                          </m:ctrlPr>
+                        </m:radPr>
+                        <m:deg/>
+                        <m:e>
+                          <m:sSup>
+                            <m:sSupPr>
+                              <m:ctrlPr>
+                                <a:rPr lang="en-US" sz="2400" b="0" i="1" smtClean="0">
+                                  <a:latin typeface="Cambria Math" panose="02040503050406030204" pitchFamily="18" charset="0"/>
+                                  <a:ea typeface="Cambria Math" panose="02040503050406030204" pitchFamily="18" charset="0"/>
+                                </a:rPr>
+                              </m:ctrlPr>
+                            </m:sSupPr>
+                            <m:e>
+                              <m:r>
+                                <a:rPr lang="ru-RU" sz="2400" b="0" i="1" smtClean="0">
+                                  <a:latin typeface="Cambria Math" panose="02040503050406030204" pitchFamily="18" charset="0"/>
+                                  <a:ea typeface="Cambria Math" panose="02040503050406030204" pitchFamily="18" charset="0"/>
+                                </a:rPr>
+                                <m:t>(∆</m:t>
+                              </m:r>
+                              <m:r>
+                                <a:rPr lang="en-US" sz="2400" b="0" i="1" smtClean="0">
+                                  <a:latin typeface="Cambria Math" panose="02040503050406030204" pitchFamily="18" charset="0"/>
+                                  <a:ea typeface="Cambria Math" panose="02040503050406030204" pitchFamily="18" charset="0"/>
+                                </a:rPr>
+                                <m:t>𝐽</m:t>
+                              </m:r>
+                              <m:r>
+                                <a:rPr lang="en-US" sz="2400" b="0" i="1" smtClean="0">
+                                  <a:latin typeface="Cambria Math" panose="02040503050406030204" pitchFamily="18" charset="0"/>
+                                  <a:ea typeface="Cambria Math" panose="02040503050406030204" pitchFamily="18" charset="0"/>
+                                </a:rPr>
+                                <m:t>∙</m:t>
+                              </m:r>
+                              <m:r>
+                                <a:rPr lang="en-US" sz="2400" b="0" i="1" smtClean="0">
+                                  <a:latin typeface="Cambria Math" panose="02040503050406030204" pitchFamily="18" charset="0"/>
+                                  <a:ea typeface="Cambria Math" panose="02040503050406030204" pitchFamily="18" charset="0"/>
+                                </a:rPr>
+                                <m:t>𝜀</m:t>
+                              </m:r>
+                              <m:r>
+                                <a:rPr lang="ru-RU" sz="2400" b="0" i="1" smtClean="0">
+                                  <a:latin typeface="Cambria Math" panose="02040503050406030204" pitchFamily="18" charset="0"/>
+                                  <a:ea typeface="Cambria Math" panose="02040503050406030204" pitchFamily="18" charset="0"/>
+                                </a:rPr>
+                                <m:t>)</m:t>
+                              </m:r>
+                            </m:e>
+                            <m:sup>
+                              <m:r>
+                                <a:rPr lang="en-US" sz="2400" b="0" i="1" smtClean="0">
+                                  <a:latin typeface="Cambria Math" panose="02040503050406030204" pitchFamily="18" charset="0"/>
+                                  <a:ea typeface="Cambria Math" panose="02040503050406030204" pitchFamily="18" charset="0"/>
+                                </a:rPr>
+                                <m:t>2</m:t>
+                              </m:r>
+                            </m:sup>
+                          </m:sSup>
+                          <m:r>
+                            <a:rPr lang="en-US" sz="2400" b="0" i="1" smtClean="0">
+                              <a:latin typeface="Cambria Math" panose="02040503050406030204" pitchFamily="18" charset="0"/>
+                              <a:ea typeface="Cambria Math" panose="02040503050406030204" pitchFamily="18" charset="0"/>
+                            </a:rPr>
+                            <m:t>+</m:t>
+                          </m:r>
+                          <m:sSup>
+                            <m:sSupPr>
+                              <m:ctrlPr>
+                                <a:rPr lang="en-US" sz="2400" b="0" i="1" smtClean="0">
+                                  <a:latin typeface="Cambria Math" panose="02040503050406030204" pitchFamily="18" charset="0"/>
+                                  <a:ea typeface="Cambria Math" panose="02040503050406030204" pitchFamily="18" charset="0"/>
+                                </a:rPr>
+                              </m:ctrlPr>
+                            </m:sSupPr>
+                            <m:e>
+                              <m:r>
+                                <a:rPr lang="en-US" sz="2400" b="0" i="1" smtClean="0">
+                                  <a:latin typeface="Cambria Math" panose="02040503050406030204" pitchFamily="18" charset="0"/>
+                                  <a:ea typeface="Cambria Math" panose="02040503050406030204" pitchFamily="18" charset="0"/>
+                                </a:rPr>
+                                <m:t>(∆</m:t>
+                              </m:r>
+                              <m:r>
+                                <a:rPr lang="en-US" sz="2400" b="0" i="1" smtClean="0">
+                                  <a:latin typeface="Cambria Math" panose="02040503050406030204" pitchFamily="18" charset="0"/>
+                                  <a:ea typeface="Cambria Math" panose="02040503050406030204" pitchFamily="18" charset="0"/>
+                                </a:rPr>
+                                <m:t>𝜀</m:t>
+                              </m:r>
+                              <m:r>
+                                <a:rPr lang="en-US" sz="2400" b="0" i="1" smtClean="0">
+                                  <a:latin typeface="Cambria Math" panose="02040503050406030204" pitchFamily="18" charset="0"/>
+                                  <a:ea typeface="Cambria Math" panose="02040503050406030204" pitchFamily="18" charset="0"/>
+                                </a:rPr>
+                                <m:t>∙</m:t>
+                              </m:r>
+                              <m:r>
+                                <a:rPr lang="en-US" sz="2400" b="0" i="1" smtClean="0">
+                                  <a:latin typeface="Cambria Math" panose="02040503050406030204" pitchFamily="18" charset="0"/>
+                                  <a:ea typeface="Cambria Math" panose="02040503050406030204" pitchFamily="18" charset="0"/>
+                                </a:rPr>
+                                <m:t>𝐽</m:t>
+                              </m:r>
+                              <m:r>
+                                <a:rPr lang="en-US" sz="2400" b="0" i="1" smtClean="0">
+                                  <a:latin typeface="Cambria Math" panose="02040503050406030204" pitchFamily="18" charset="0"/>
+                                  <a:ea typeface="Cambria Math" panose="02040503050406030204" pitchFamily="18" charset="0"/>
+                                </a:rPr>
+                                <m:t>)</m:t>
+                              </m:r>
+                            </m:e>
+                            <m:sup>
+                              <m:r>
+                                <a:rPr lang="en-US" sz="2400" b="0" i="1" smtClean="0">
+                                  <a:latin typeface="Cambria Math" panose="02040503050406030204" pitchFamily="18" charset="0"/>
+                                  <a:ea typeface="Cambria Math" panose="02040503050406030204" pitchFamily="18" charset="0"/>
+                                </a:rPr>
+                                <m:t>2</m:t>
+                              </m:r>
+                            </m:sup>
+                          </m:sSup>
+                        </m:e>
+                      </m:rad>
+                      <m:r>
+                        <a:rPr lang="en-US" sz="2400" b="0" i="1" smtClean="0">
+                          <a:latin typeface="Cambria Math" panose="02040503050406030204" pitchFamily="18" charset="0"/>
+                          <a:ea typeface="Cambria Math" panose="02040503050406030204" pitchFamily="18" charset="0"/>
+                        </a:rPr>
+                        <m:t>=5∙</m:t>
+                      </m:r>
+                      <m:sSup>
+                        <m:sSupPr>
+                          <m:ctrlPr>
+                            <a:rPr lang="en-US" sz="2400" b="0" i="1" smtClean="0">
+                              <a:latin typeface="Cambria Math" panose="02040503050406030204" pitchFamily="18" charset="0"/>
+                              <a:ea typeface="Cambria Math" panose="02040503050406030204" pitchFamily="18" charset="0"/>
+                            </a:rPr>
+                          </m:ctrlPr>
+                        </m:sSupPr>
+                        <m:e>
+                          <m:r>
+                            <a:rPr lang="en-US" sz="2400" b="0" i="1" smtClean="0">
+                              <a:latin typeface="Cambria Math" panose="02040503050406030204" pitchFamily="18" charset="0"/>
+                              <a:ea typeface="Cambria Math" panose="02040503050406030204" pitchFamily="18" charset="0"/>
+                            </a:rPr>
+                            <m:t>10</m:t>
+                          </m:r>
+                        </m:e>
+                        <m:sup>
+                          <m:r>
+                            <a:rPr lang="en-US" sz="2400" b="0" i="1" smtClean="0">
+                              <a:latin typeface="Cambria Math" panose="02040503050406030204" pitchFamily="18" charset="0"/>
+                              <a:ea typeface="Cambria Math" panose="02040503050406030204" pitchFamily="18" charset="0"/>
+                            </a:rPr>
+                            <m:t>−5</m:t>
+                          </m:r>
+                        </m:sup>
+                      </m:sSup>
+                      <m:r>
+                        <a:rPr lang="en-US" sz="2400" b="0" i="1" smtClean="0">
+                          <a:latin typeface="Cambria Math" panose="02040503050406030204" pitchFamily="18" charset="0"/>
+                          <a:ea typeface="Cambria Math" panose="02040503050406030204" pitchFamily="18" charset="0"/>
+                        </a:rPr>
+                        <m:t> </m:t>
+                      </m:r>
+                      <m:r>
+                        <a:rPr lang="ru-RU" sz="2400" b="0" i="1" smtClean="0">
+                          <a:latin typeface="Cambria Math" panose="02040503050406030204" pitchFamily="18" charset="0"/>
+                          <a:ea typeface="Cambria Math" panose="02040503050406030204" pitchFamily="18" charset="0"/>
+                        </a:rPr>
+                        <m:t>Н∙м</m:t>
+                      </m:r>
+                    </m:oMath>
+                  </m:oMathPara>
+                </a14:m>
+                <a:endParaRPr lang="ru-RU" sz="2400" dirty="0"/>
+              </a:p>
+              <a:p>
+                <a:pPr algn="just"/>
+                <a:endParaRPr lang="ru-RU" sz="2400" dirty="0"/>
+              </a:p>
+              <a:p>
+                <a:pPr algn="just"/>
+                <a14:m>
+                  <m:oMathPara xmlns:m="http://schemas.openxmlformats.org/officeDocument/2006/math">
+                    <m:oMathParaPr>
+                      <m:jc m:val="centerGroup"/>
+                    </m:oMathParaPr>
+                    <m:oMath xmlns:m="http://schemas.openxmlformats.org/officeDocument/2006/math">
+                      <m:r>
+                        <a:rPr lang="en-US" sz="2400" b="0" i="1" smtClean="0">
+                          <a:latin typeface="Cambria Math" panose="02040503050406030204" pitchFamily="18" charset="0"/>
+                        </a:rPr>
+                        <m:t>𝑀</m:t>
+                      </m:r>
+                      <m:r>
+                        <a:rPr lang="en-US" sz="2400" b="0" i="1" smtClean="0">
+                          <a:latin typeface="Cambria Math" panose="02040503050406030204" pitchFamily="18" charset="0"/>
+                        </a:rPr>
+                        <m:t>=0,005 ±5∙</m:t>
+                      </m:r>
+                      <m:sSup>
+                        <m:sSupPr>
+                          <m:ctrlPr>
+                            <a:rPr lang="en-US" sz="2400" b="0" i="1" smtClean="0">
+                              <a:latin typeface="Cambria Math" panose="02040503050406030204" pitchFamily="18" charset="0"/>
+                              <a:ea typeface="Cambria Math" panose="02040503050406030204" pitchFamily="18" charset="0"/>
+                            </a:rPr>
+                          </m:ctrlPr>
+                        </m:sSupPr>
+                        <m:e>
+                          <m:r>
+                            <a:rPr lang="en-US" sz="2400" b="0" i="1" smtClean="0">
+                              <a:latin typeface="Cambria Math" panose="02040503050406030204" pitchFamily="18" charset="0"/>
+                              <a:ea typeface="Cambria Math" panose="02040503050406030204" pitchFamily="18" charset="0"/>
+                            </a:rPr>
+                            <m:t>10</m:t>
+                          </m:r>
+                        </m:e>
+                        <m:sup>
+                          <m:r>
+                            <a:rPr lang="en-US" sz="2400" b="0" i="1" smtClean="0">
+                              <a:latin typeface="Cambria Math" panose="02040503050406030204" pitchFamily="18" charset="0"/>
+                              <a:ea typeface="Cambria Math" panose="02040503050406030204" pitchFamily="18" charset="0"/>
+                            </a:rPr>
+                            <m:t>−5</m:t>
+                          </m:r>
+                        </m:sup>
+                      </m:sSup>
+                      <m:r>
+                        <a:rPr lang="en-US" sz="2400" b="0" i="1" smtClean="0">
+                          <a:latin typeface="Cambria Math" panose="02040503050406030204" pitchFamily="18" charset="0"/>
+                          <a:ea typeface="Cambria Math" panose="02040503050406030204" pitchFamily="18" charset="0"/>
+                        </a:rPr>
+                        <m:t> </m:t>
+                      </m:r>
+                      <m:r>
+                        <a:rPr lang="ru-RU" sz="2400" b="0" i="1" smtClean="0">
+                          <a:latin typeface="Cambria Math" panose="02040503050406030204" pitchFamily="18" charset="0"/>
+                          <a:ea typeface="Cambria Math" panose="02040503050406030204" pitchFamily="18" charset="0"/>
+                        </a:rPr>
+                        <m:t>Н∙м</m:t>
+                      </m:r>
+                    </m:oMath>
+                  </m:oMathPara>
+                </a14:m>
+                <a:endParaRPr lang="en-US" sz="2400" dirty="0"/>
+              </a:p>
+              <a:p>
+                <a:pPr algn="just"/>
+                <a:endParaRPr lang="ru-RU" sz="2400" dirty="0"/>
+              </a:p>
+              <a:p>
+                <a:pPr algn="just"/>
+                <a:endParaRPr lang="ru-RU" sz="2400" dirty="0"/>
+              </a:p>
+              <a:p>
+                <a:pPr algn="just"/>
+                <a:endParaRPr lang="ru-RU" sz="2400" dirty="0"/>
+              </a:p>
+            </p:txBody>
+          </p:sp>
+        </mc:Choice>
+        <mc:Fallback>
+          <p:sp>
+            <p:nvSpPr>
+              <p:cNvPr id="12" name="Прямоугольник 11">
+                <a:extLst>
+                  <a:ext uri="{FF2B5EF4-FFF2-40B4-BE49-F238E27FC236}">
+                    <a16:creationId xmlns:a16="http://schemas.microsoft.com/office/drawing/2014/main" id="{85C5B0C8-5735-4441-B508-AA2CACCFCBE9}"/>
+                  </a:ext>
+                </a:extLst>
+              </p:cNvPr>
+              <p:cNvSpPr>
+                <a:spLocks noRot="1" noChangeAspect="1" noMove="1" noResize="1" noEditPoints="1" noAdjustHandles="1" noChangeArrowheads="1" noChangeShapeType="1" noTextEdit="1"/>
+              </p:cNvSpPr>
+              <p:nvPr/>
+            </p:nvSpPr>
+            <p:spPr>
+              <a:xfrm>
+                <a:off x="4917485" y="684037"/>
+                <a:ext cx="6970644" cy="7170617"/>
+              </a:xfrm>
+              <a:prstGeom prst="rect">
+                <a:avLst/>
+              </a:prstGeom>
+              <a:blipFill>
+                <a:blip r:embed="rId2"/>
+                <a:stretch>
+                  <a:fillRect l="-1400" t="-680" r="-1312"/>
+                </a:stretch>
+              </a:blipFill>
+            </p:spPr>
+            <p:txBody>
+              <a:bodyPr/>
+              <a:lstStyle/>
+              <a:p>
+                <a:r>
+                  <a:rPr lang="en-US">
+                    <a:noFill/>
+                  </a:rPr>
+                  <a:t> </a:t>
+                </a:r>
+              </a:p>
+            </p:txBody>
+          </p:sp>
+        </mc:Fallback>
+      </mc:AlternateContent>
       <p:sp>
         <p:nvSpPr>
           <p:cNvPr id="18" name="Прямоугольник 17">
@@ -8577,14 +9851,1082 @@
           </a:p>
         </p:txBody>
       </p:sp>
+      <p:pic>
+        <p:nvPicPr>
+          <p:cNvPr id="3" name="Picture 2">
+            <a:extLst>
+              <a:ext uri="{FF2B5EF4-FFF2-40B4-BE49-F238E27FC236}">
+                <a16:creationId xmlns:a16="http://schemas.microsoft.com/office/drawing/2014/main" id="{A755D10B-EEA6-490C-9BF4-EDD48ADA5B14}"/>
+              </a:ext>
+            </a:extLst>
+          </p:cNvPr>
+          <p:cNvPicPr>
+            <a:picLocks noChangeAspect="1"/>
+          </p:cNvPicPr>
+          <p:nvPr/>
+        </p:nvPicPr>
+        <p:blipFill>
+          <a:blip r:embed="rId3">
+            <a:extLst>
+              <a:ext uri="{28A0092B-C50C-407E-A947-70E740481C1C}">
+                <a14:useLocalDpi xmlns:a14="http://schemas.microsoft.com/office/drawing/2010/main" val="0"/>
+              </a:ext>
+            </a:extLst>
+          </a:blip>
+          <a:stretch>
+            <a:fillRect/>
+          </a:stretch>
+        </p:blipFill>
+        <p:spPr>
+          <a:xfrm>
+            <a:off x="365422" y="776404"/>
+            <a:ext cx="3659459" cy="2949821"/>
+          </a:xfrm>
+          <a:prstGeom prst="rect">
+            <a:avLst/>
+          </a:prstGeom>
+        </p:spPr>
+      </p:pic>
+      <p:pic>
+        <p:nvPicPr>
+          <p:cNvPr id="13" name="Рисунок 1">
+            <a:extLst>
+              <a:ext uri="{FF2B5EF4-FFF2-40B4-BE49-F238E27FC236}">
+                <a16:creationId xmlns:a16="http://schemas.microsoft.com/office/drawing/2014/main" id="{86826F18-664E-4E3A-B0DC-C6F1B216BF3E}"/>
+              </a:ext>
+            </a:extLst>
+          </p:cNvPr>
+          <p:cNvPicPr/>
+          <p:nvPr/>
+        </p:nvPicPr>
+        <p:blipFill>
+          <a:blip r:embed="rId4">
+            <a:extLst>
+              <a:ext uri="{28A0092B-C50C-407E-A947-70E740481C1C}">
+                <a14:useLocalDpi xmlns:a14="http://schemas.microsoft.com/office/drawing/2010/main" val="0"/>
+              </a:ext>
+            </a:extLst>
+          </a:blip>
+          <a:srcRect/>
+          <a:stretch>
+            <a:fillRect/>
+          </a:stretch>
+        </p:blipFill>
+        <p:spPr bwMode="auto">
+          <a:xfrm>
+            <a:off x="438781" y="3973450"/>
+            <a:ext cx="3222874" cy="2398470"/>
+          </a:xfrm>
+          <a:prstGeom prst="rect">
+            <a:avLst/>
+          </a:prstGeom>
+          <a:noFill/>
+          <a:ln>
+            <a:noFill/>
+          </a:ln>
+        </p:spPr>
+      </p:pic>
+    </p:spTree>
+    <p:extLst>
+      <p:ext uri="{BB962C8B-B14F-4D97-AF65-F5344CB8AC3E}">
+        <p14:creationId xmlns:p14="http://schemas.microsoft.com/office/powerpoint/2010/main" val="841034221"/>
+      </p:ext>
+    </p:extLst>
+  </p:cSld>
+  <p:clrMapOvr>
+    <a:masterClrMapping/>
+  </p:clrMapOvr>
+</p:sld>
+</file>
+
+<file path=ppt/slides/slide7.xml><?xml version="1.0" encoding="utf-8"?>
+<p:sld xmlns:a="http://schemas.openxmlformats.org/drawingml/2006/main" xmlns:r="http://schemas.openxmlformats.org/officeDocument/2006/relationships" xmlns:p="http://schemas.openxmlformats.org/presentationml/2006/main">
+  <p:cSld>
+    <p:spTree>
+      <p:nvGrpSpPr>
+        <p:cNvPr id="1" name=""/>
+        <p:cNvGrpSpPr/>
+        <p:nvPr/>
+      </p:nvGrpSpPr>
+      <p:grpSpPr>
+        <a:xfrm>
+          <a:off x="0" y="0"/>
+          <a:ext cx="0" cy="0"/>
+          <a:chOff x="0" y="0"/>
+          <a:chExt cx="0" cy="0"/>
+        </a:xfrm>
+      </p:grpSpPr>
+      <p:sp>
+        <p:nvSpPr>
+          <p:cNvPr id="4" name="Номер слайда 3">
+            <a:extLst>
+              <a:ext uri="{FF2B5EF4-FFF2-40B4-BE49-F238E27FC236}">
+                <a16:creationId xmlns:a16="http://schemas.microsoft.com/office/drawing/2014/main" id="{FA27ABEE-315A-4D20-92C1-C12964519599}"/>
+              </a:ext>
+            </a:extLst>
+          </p:cNvPr>
+          <p:cNvSpPr>
+            <a:spLocks noGrp="1"/>
+          </p:cNvSpPr>
+          <p:nvPr>
+            <p:ph type="sldNum" sz="quarter" idx="12"/>
+          </p:nvPr>
+        </p:nvSpPr>
+        <p:spPr/>
+        <p:txBody>
+          <a:bodyPr/>
+          <a:lstStyle/>
+          <a:p>
+            <a:fld id="{1F8BD534-37C6-45AF-BD63-E8CFF4C8D25C}" type="slidenum">
+              <a:rPr lang="en-US" smtClean="0"/>
+              <a:t>7</a:t>
+            </a:fld>
+            <a:endParaRPr lang="en-US"/>
+          </a:p>
+        </p:txBody>
+      </p:sp>
+      <p:sp>
+        <p:nvSpPr>
+          <p:cNvPr id="7" name="Title 1">
+            <a:extLst>
+              <a:ext uri="{FF2B5EF4-FFF2-40B4-BE49-F238E27FC236}">
+                <a16:creationId xmlns:a16="http://schemas.microsoft.com/office/drawing/2014/main" id="{4F3EFBB3-C0F5-4C25-A4EC-6CEF46C91B4B}"/>
+              </a:ext>
+            </a:extLst>
+          </p:cNvPr>
+          <p:cNvSpPr>
+            <a:spLocks noGrp="1"/>
+          </p:cNvSpPr>
+          <p:nvPr>
+            <p:ph type="title"/>
+          </p:nvPr>
+        </p:nvSpPr>
+        <p:spPr>
+          <a:xfrm>
+            <a:off x="0" y="-11239"/>
+            <a:ext cx="12084424" cy="903161"/>
+          </a:xfrm>
+        </p:spPr>
+        <p:txBody>
+          <a:bodyPr>
+            <a:normAutofit/>
+          </a:bodyPr>
+          <a:lstStyle/>
+          <a:p>
+            <a:r>
+              <a:rPr lang="ru-RU" sz="4000" dirty="0">
+                <a:latin typeface="+mj-lt"/>
+              </a:rPr>
+              <a:t>Аттестация стенда. Измерение </a:t>
+            </a:r>
+            <a:r>
+              <a:rPr lang="ru-RU" sz="4000" dirty="0"/>
+              <a:t>ускорения</a:t>
+            </a:r>
+            <a:r>
+              <a:rPr lang="ru-RU" sz="4000" dirty="0">
+                <a:latin typeface="+mj-lt"/>
+              </a:rPr>
+              <a:t> маховика</a:t>
+            </a:r>
+            <a:endParaRPr lang="en-US" dirty="0"/>
+          </a:p>
+        </p:txBody>
+      </p:sp>
+      <p:sp>
+        <p:nvSpPr>
+          <p:cNvPr id="11" name="TextBox 10">
+            <a:extLst>
+              <a:ext uri="{FF2B5EF4-FFF2-40B4-BE49-F238E27FC236}">
+                <a16:creationId xmlns:a16="http://schemas.microsoft.com/office/drawing/2014/main" id="{256846A2-90A5-48EF-8FAF-1DD4DB27DC82}"/>
+              </a:ext>
+            </a:extLst>
+          </p:cNvPr>
+          <p:cNvSpPr txBox="1"/>
+          <p:nvPr/>
+        </p:nvSpPr>
+        <p:spPr>
+          <a:xfrm>
+            <a:off x="573692" y="3726225"/>
+            <a:ext cx="2953053" cy="338554"/>
+          </a:xfrm>
+          <a:prstGeom prst="rect">
+            <a:avLst/>
+          </a:prstGeom>
+          <a:noFill/>
+        </p:spPr>
+        <p:txBody>
+          <a:bodyPr wrap="none" rtlCol="0">
+            <a:spAutoFit/>
+          </a:bodyPr>
+          <a:lstStyle/>
+          <a:p>
+            <a:r>
+              <a:rPr lang="ru-RU" sz="1600" dirty="0">
+                <a:latin typeface="+mj-lt"/>
+              </a:rPr>
+              <a:t>Рисунок 6 – Эталонный маховик</a:t>
+            </a:r>
+          </a:p>
+        </p:txBody>
+      </p:sp>
       <mc:AlternateContent xmlns:mc="http://schemas.openxmlformats.org/markup-compatibility/2006">
         <mc:Choice xmlns:a14="http://schemas.microsoft.com/office/drawing/2010/main" Requires="a14">
           <p:sp>
             <p:nvSpPr>
-              <p:cNvPr id="14" name="TextBox 13">
+              <p:cNvPr id="12" name="Прямоугольник 11">
                 <a:extLst>
                   <a:ext uri="{FF2B5EF4-FFF2-40B4-BE49-F238E27FC236}">
-                    <a16:creationId xmlns:a16="http://schemas.microsoft.com/office/drawing/2014/main" id="{FD5CE986-D61E-44F6-99D5-3DA81B507ACD}"/>
+                    <a16:creationId xmlns:a16="http://schemas.microsoft.com/office/drawing/2014/main" id="{85C5B0C8-5735-4441-B508-AA2CACCFCBE9}"/>
+                  </a:ext>
+                </a:extLst>
+              </p:cNvPr>
+              <p:cNvSpPr/>
+              <p:nvPr/>
+            </p:nvSpPr>
+            <p:spPr>
+              <a:xfrm>
+                <a:off x="4917485" y="684037"/>
+                <a:ext cx="6970644" cy="7170617"/>
+              </a:xfrm>
+              <a:prstGeom prst="rect">
+                <a:avLst/>
+              </a:prstGeom>
+            </p:spPr>
+            <p:txBody>
+              <a:bodyPr wrap="square">
+                <a:spAutoFit/>
+              </a:bodyPr>
+              <a:lstStyle/>
+              <a:p>
+                <a:pPr algn="just"/>
+                <a:r>
+                  <a:rPr lang="ru-RU" sz="2400" dirty="0"/>
+                  <a:t>Маховик устанавливается на бе</a:t>
+                </a:r>
+                <a:r>
+                  <a:rPr lang="en-US" sz="2400" dirty="0"/>
+                  <a:t>c</a:t>
+                </a:r>
+                <a:r>
+                  <a:rPr lang="ru-RU" sz="2400" dirty="0"/>
+                  <a:t>коллекторный двигатель ДБМ-40.</a:t>
+                </a:r>
+              </a:p>
+              <a:p>
+                <a:pPr algn="just"/>
+                <a:endParaRPr lang="ru-RU" sz="2400" dirty="0"/>
+              </a:p>
+              <a:p>
+                <a:pPr algn="just"/>
+                <a:r>
+                  <a:rPr lang="ru-RU" sz="2400" dirty="0"/>
+                  <a:t>Двигатель ускоряется по трапециевидному закону.</a:t>
+                </a:r>
+                <a:br>
+                  <a:rPr lang="ru-RU" sz="2400" dirty="0"/>
+                </a:br>
+                <a:r>
+                  <a:rPr lang="ru-RU" sz="2400" dirty="0"/>
+                  <a:t>Скорость двигателя измеряется по датчику угла </a:t>
+                </a:r>
+                <a:r>
+                  <a:rPr lang="en-US" sz="2400" dirty="0"/>
+                  <a:t>&lt;</a:t>
+                </a:r>
+                <a:r>
+                  <a:rPr lang="ru-RU" sz="2400" dirty="0"/>
+                  <a:t>ИМЯ</a:t>
+                </a:r>
+                <a:r>
+                  <a:rPr lang="en-US" sz="2400" dirty="0"/>
+                  <a:t>&gt;</a:t>
+                </a:r>
+                <a:r>
+                  <a:rPr lang="ru-RU" sz="2400" dirty="0"/>
+                  <a:t>.</a:t>
+                </a:r>
+                <a:endParaRPr lang="en-US" sz="2400" dirty="0"/>
+              </a:p>
+              <a:p>
+                <a:pPr algn="just"/>
+                <a:endParaRPr lang="en-US" sz="2400" dirty="0"/>
+              </a:p>
+              <a:p>
+                <a:pPr algn="just"/>
+                <a:r>
+                  <a:rPr lang="ru-RU" sz="2400" dirty="0"/>
+                  <a:t>Погрешность измерения ускорения определяется многократными измерениями</a:t>
+                </a:r>
+              </a:p>
+              <a:p>
+                <a:pPr algn="just"/>
+                <a14:m>
+                  <m:oMathPara xmlns:m="http://schemas.openxmlformats.org/officeDocument/2006/math">
+                    <m:oMathParaPr>
+                      <m:jc m:val="centerGroup"/>
+                    </m:oMathParaPr>
+                    <m:oMath xmlns:m="http://schemas.openxmlformats.org/officeDocument/2006/math">
+                      <m:r>
+                        <a:rPr lang="ru-RU" sz="2400" i="1" smtClean="0">
+                          <a:latin typeface="Cambria Math" panose="02040503050406030204" pitchFamily="18" charset="0"/>
+                          <a:ea typeface="Cambria Math" panose="02040503050406030204" pitchFamily="18" charset="0"/>
+                        </a:rPr>
+                        <m:t>∆</m:t>
+                      </m:r>
+                      <m:r>
+                        <a:rPr lang="ru-RU" sz="2400" i="1" smtClean="0">
+                          <a:latin typeface="Cambria Math" panose="02040503050406030204" pitchFamily="18" charset="0"/>
+                          <a:ea typeface="Cambria Math" panose="02040503050406030204" pitchFamily="18" charset="0"/>
+                        </a:rPr>
+                        <m:t>𝜀</m:t>
+                      </m:r>
+                      <m:r>
+                        <a:rPr lang="ru-RU" sz="2400" b="0" i="1" smtClean="0">
+                          <a:latin typeface="Cambria Math" panose="02040503050406030204" pitchFamily="18" charset="0"/>
+                          <a:ea typeface="Cambria Math" panose="02040503050406030204" pitchFamily="18" charset="0"/>
+                        </a:rPr>
+                        <m:t>=±0,17 </m:t>
+                      </m:r>
+                      <m:f>
+                        <m:fPr>
+                          <m:ctrlPr>
+                            <a:rPr lang="ru-RU" sz="2400" b="0" i="1" smtClean="0">
+                              <a:latin typeface="Cambria Math" panose="02040503050406030204" pitchFamily="18" charset="0"/>
+                              <a:ea typeface="Cambria Math" panose="02040503050406030204" pitchFamily="18" charset="0"/>
+                            </a:rPr>
+                          </m:ctrlPr>
+                        </m:fPr>
+                        <m:num>
+                          <m:r>
+                            <a:rPr lang="ru-RU" sz="2400" b="0" i="1" smtClean="0">
+                              <a:latin typeface="Cambria Math" panose="02040503050406030204" pitchFamily="18" charset="0"/>
+                              <a:ea typeface="Cambria Math" panose="02040503050406030204" pitchFamily="18" charset="0"/>
+                            </a:rPr>
+                            <m:t>рад</m:t>
+                          </m:r>
+                        </m:num>
+                        <m:den>
+                          <m:sSup>
+                            <m:sSupPr>
+                              <m:ctrlPr>
+                                <a:rPr lang="ru-RU" sz="2400" b="0" i="1" smtClean="0">
+                                  <a:latin typeface="Cambria Math" panose="02040503050406030204" pitchFamily="18" charset="0"/>
+                                  <a:ea typeface="Cambria Math" panose="02040503050406030204" pitchFamily="18" charset="0"/>
+                                </a:rPr>
+                              </m:ctrlPr>
+                            </m:sSupPr>
+                            <m:e>
+                              <m:r>
+                                <a:rPr lang="ru-RU" sz="2400" b="0" i="1" smtClean="0">
+                                  <a:latin typeface="Cambria Math" panose="02040503050406030204" pitchFamily="18" charset="0"/>
+                                  <a:ea typeface="Cambria Math" panose="02040503050406030204" pitchFamily="18" charset="0"/>
+                                </a:rPr>
+                                <m:t>с</m:t>
+                              </m:r>
+                            </m:e>
+                            <m:sup>
+                              <m:r>
+                                <a:rPr lang="ru-RU" sz="2400" b="0" i="1" smtClean="0">
+                                  <a:latin typeface="Cambria Math" panose="02040503050406030204" pitchFamily="18" charset="0"/>
+                                  <a:ea typeface="Cambria Math" panose="02040503050406030204" pitchFamily="18" charset="0"/>
+                                </a:rPr>
+                                <m:t>2</m:t>
+                              </m:r>
+                            </m:sup>
+                          </m:sSup>
+                        </m:den>
+                      </m:f>
+                    </m:oMath>
+                  </m:oMathPara>
+                </a14:m>
+                <a:endParaRPr lang="ru-RU" sz="2400" dirty="0"/>
+              </a:p>
+              <a:p>
+                <a:pPr algn="just"/>
+                <a:endParaRPr lang="en-US" sz="2400" dirty="0"/>
+              </a:p>
+              <a:p>
+                <a:pPr algn="just"/>
+                <a:r>
+                  <a:rPr lang="ru-RU" sz="2400" dirty="0"/>
+                  <a:t>Итоговая погрешность тестового момента:</a:t>
+                </a:r>
+                <a:br>
+                  <a:rPr lang="ru-RU" sz="2400" dirty="0"/>
+                </a:br>
+                <a14:m>
+                  <m:oMathPara xmlns:m="http://schemas.openxmlformats.org/officeDocument/2006/math">
+                    <m:oMathParaPr>
+                      <m:jc m:val="centerGroup"/>
+                    </m:oMathParaPr>
+                    <m:oMath xmlns:m="http://schemas.openxmlformats.org/officeDocument/2006/math">
+                      <m:r>
+                        <a:rPr lang="ru-RU" sz="2400" i="1" smtClean="0">
+                          <a:latin typeface="Cambria Math" panose="02040503050406030204" pitchFamily="18" charset="0"/>
+                          <a:ea typeface="Cambria Math" panose="02040503050406030204" pitchFamily="18" charset="0"/>
+                        </a:rPr>
+                        <m:t>∆</m:t>
+                      </m:r>
+                      <m:r>
+                        <a:rPr lang="en-US" sz="2400" b="0" i="1" smtClean="0">
+                          <a:latin typeface="Cambria Math" panose="02040503050406030204" pitchFamily="18" charset="0"/>
+                          <a:ea typeface="Cambria Math" panose="02040503050406030204" pitchFamily="18" charset="0"/>
+                        </a:rPr>
+                        <m:t>𝑀</m:t>
+                      </m:r>
+                      <m:r>
+                        <a:rPr lang="en-US" sz="2400" b="0" i="1" smtClean="0">
+                          <a:latin typeface="Cambria Math" panose="02040503050406030204" pitchFamily="18" charset="0"/>
+                          <a:ea typeface="Cambria Math" panose="02040503050406030204" pitchFamily="18" charset="0"/>
+                        </a:rPr>
+                        <m:t>=</m:t>
+                      </m:r>
+                      <m:rad>
+                        <m:radPr>
+                          <m:degHide m:val="on"/>
+                          <m:ctrlPr>
+                            <a:rPr lang="en-US" sz="2400" b="0" i="1" smtClean="0">
+                              <a:latin typeface="Cambria Math" panose="02040503050406030204" pitchFamily="18" charset="0"/>
+                              <a:ea typeface="Cambria Math" panose="02040503050406030204" pitchFamily="18" charset="0"/>
+                            </a:rPr>
+                          </m:ctrlPr>
+                        </m:radPr>
+                        <m:deg/>
+                        <m:e>
+                          <m:sSup>
+                            <m:sSupPr>
+                              <m:ctrlPr>
+                                <a:rPr lang="en-US" sz="2400" b="0" i="1" smtClean="0">
+                                  <a:latin typeface="Cambria Math" panose="02040503050406030204" pitchFamily="18" charset="0"/>
+                                  <a:ea typeface="Cambria Math" panose="02040503050406030204" pitchFamily="18" charset="0"/>
+                                </a:rPr>
+                              </m:ctrlPr>
+                            </m:sSupPr>
+                            <m:e>
+                              <m:r>
+                                <a:rPr lang="ru-RU" sz="2400" b="0" i="1" smtClean="0">
+                                  <a:latin typeface="Cambria Math" panose="02040503050406030204" pitchFamily="18" charset="0"/>
+                                  <a:ea typeface="Cambria Math" panose="02040503050406030204" pitchFamily="18" charset="0"/>
+                                </a:rPr>
+                                <m:t>(∆</m:t>
+                              </m:r>
+                              <m:r>
+                                <a:rPr lang="en-US" sz="2400" b="0" i="1" smtClean="0">
+                                  <a:latin typeface="Cambria Math" panose="02040503050406030204" pitchFamily="18" charset="0"/>
+                                  <a:ea typeface="Cambria Math" panose="02040503050406030204" pitchFamily="18" charset="0"/>
+                                </a:rPr>
+                                <m:t>𝐽</m:t>
+                              </m:r>
+                              <m:r>
+                                <a:rPr lang="en-US" sz="2400" b="0" i="1" smtClean="0">
+                                  <a:latin typeface="Cambria Math" panose="02040503050406030204" pitchFamily="18" charset="0"/>
+                                  <a:ea typeface="Cambria Math" panose="02040503050406030204" pitchFamily="18" charset="0"/>
+                                </a:rPr>
+                                <m:t>∙</m:t>
+                              </m:r>
+                              <m:r>
+                                <a:rPr lang="en-US" sz="2400" b="0" i="1" smtClean="0">
+                                  <a:latin typeface="Cambria Math" panose="02040503050406030204" pitchFamily="18" charset="0"/>
+                                  <a:ea typeface="Cambria Math" panose="02040503050406030204" pitchFamily="18" charset="0"/>
+                                </a:rPr>
+                                <m:t>𝜀</m:t>
+                              </m:r>
+                              <m:r>
+                                <a:rPr lang="ru-RU" sz="2400" b="0" i="1" smtClean="0">
+                                  <a:latin typeface="Cambria Math" panose="02040503050406030204" pitchFamily="18" charset="0"/>
+                                  <a:ea typeface="Cambria Math" panose="02040503050406030204" pitchFamily="18" charset="0"/>
+                                </a:rPr>
+                                <m:t>)</m:t>
+                              </m:r>
+                            </m:e>
+                            <m:sup>
+                              <m:r>
+                                <a:rPr lang="en-US" sz="2400" b="0" i="1" smtClean="0">
+                                  <a:latin typeface="Cambria Math" panose="02040503050406030204" pitchFamily="18" charset="0"/>
+                                  <a:ea typeface="Cambria Math" panose="02040503050406030204" pitchFamily="18" charset="0"/>
+                                </a:rPr>
+                                <m:t>2</m:t>
+                              </m:r>
+                            </m:sup>
+                          </m:sSup>
+                          <m:r>
+                            <a:rPr lang="en-US" sz="2400" b="0" i="1" smtClean="0">
+                              <a:latin typeface="Cambria Math" panose="02040503050406030204" pitchFamily="18" charset="0"/>
+                              <a:ea typeface="Cambria Math" panose="02040503050406030204" pitchFamily="18" charset="0"/>
+                            </a:rPr>
+                            <m:t>+</m:t>
+                          </m:r>
+                          <m:sSup>
+                            <m:sSupPr>
+                              <m:ctrlPr>
+                                <a:rPr lang="en-US" sz="2400" b="0" i="1" smtClean="0">
+                                  <a:latin typeface="Cambria Math" panose="02040503050406030204" pitchFamily="18" charset="0"/>
+                                  <a:ea typeface="Cambria Math" panose="02040503050406030204" pitchFamily="18" charset="0"/>
+                                </a:rPr>
+                              </m:ctrlPr>
+                            </m:sSupPr>
+                            <m:e>
+                              <m:r>
+                                <a:rPr lang="en-US" sz="2400" b="0" i="1" smtClean="0">
+                                  <a:latin typeface="Cambria Math" panose="02040503050406030204" pitchFamily="18" charset="0"/>
+                                  <a:ea typeface="Cambria Math" panose="02040503050406030204" pitchFamily="18" charset="0"/>
+                                </a:rPr>
+                                <m:t>(∆</m:t>
+                              </m:r>
+                              <m:r>
+                                <a:rPr lang="en-US" sz="2400" b="0" i="1" smtClean="0">
+                                  <a:latin typeface="Cambria Math" panose="02040503050406030204" pitchFamily="18" charset="0"/>
+                                  <a:ea typeface="Cambria Math" panose="02040503050406030204" pitchFamily="18" charset="0"/>
+                                </a:rPr>
+                                <m:t>𝜀</m:t>
+                              </m:r>
+                              <m:r>
+                                <a:rPr lang="en-US" sz="2400" b="0" i="1" smtClean="0">
+                                  <a:latin typeface="Cambria Math" panose="02040503050406030204" pitchFamily="18" charset="0"/>
+                                  <a:ea typeface="Cambria Math" panose="02040503050406030204" pitchFamily="18" charset="0"/>
+                                </a:rPr>
+                                <m:t>∙</m:t>
+                              </m:r>
+                              <m:r>
+                                <a:rPr lang="en-US" sz="2400" b="0" i="1" smtClean="0">
+                                  <a:latin typeface="Cambria Math" panose="02040503050406030204" pitchFamily="18" charset="0"/>
+                                  <a:ea typeface="Cambria Math" panose="02040503050406030204" pitchFamily="18" charset="0"/>
+                                </a:rPr>
+                                <m:t>𝐽</m:t>
+                              </m:r>
+                              <m:r>
+                                <a:rPr lang="en-US" sz="2400" b="0" i="1" smtClean="0">
+                                  <a:latin typeface="Cambria Math" panose="02040503050406030204" pitchFamily="18" charset="0"/>
+                                  <a:ea typeface="Cambria Math" panose="02040503050406030204" pitchFamily="18" charset="0"/>
+                                </a:rPr>
+                                <m:t>)</m:t>
+                              </m:r>
+                            </m:e>
+                            <m:sup>
+                              <m:r>
+                                <a:rPr lang="en-US" sz="2400" b="0" i="1" smtClean="0">
+                                  <a:latin typeface="Cambria Math" panose="02040503050406030204" pitchFamily="18" charset="0"/>
+                                  <a:ea typeface="Cambria Math" panose="02040503050406030204" pitchFamily="18" charset="0"/>
+                                </a:rPr>
+                                <m:t>2</m:t>
+                              </m:r>
+                            </m:sup>
+                          </m:sSup>
+                        </m:e>
+                      </m:rad>
+                      <m:r>
+                        <a:rPr lang="en-US" sz="2400" b="0" i="1" smtClean="0">
+                          <a:latin typeface="Cambria Math" panose="02040503050406030204" pitchFamily="18" charset="0"/>
+                          <a:ea typeface="Cambria Math" panose="02040503050406030204" pitchFamily="18" charset="0"/>
+                        </a:rPr>
+                        <m:t>=5∙</m:t>
+                      </m:r>
+                      <m:sSup>
+                        <m:sSupPr>
+                          <m:ctrlPr>
+                            <a:rPr lang="en-US" sz="2400" b="0" i="1" smtClean="0">
+                              <a:latin typeface="Cambria Math" panose="02040503050406030204" pitchFamily="18" charset="0"/>
+                              <a:ea typeface="Cambria Math" panose="02040503050406030204" pitchFamily="18" charset="0"/>
+                            </a:rPr>
+                          </m:ctrlPr>
+                        </m:sSupPr>
+                        <m:e>
+                          <m:r>
+                            <a:rPr lang="en-US" sz="2400" b="0" i="1" smtClean="0">
+                              <a:latin typeface="Cambria Math" panose="02040503050406030204" pitchFamily="18" charset="0"/>
+                              <a:ea typeface="Cambria Math" panose="02040503050406030204" pitchFamily="18" charset="0"/>
+                            </a:rPr>
+                            <m:t>10</m:t>
+                          </m:r>
+                        </m:e>
+                        <m:sup>
+                          <m:r>
+                            <a:rPr lang="en-US" sz="2400" b="0" i="1" smtClean="0">
+                              <a:latin typeface="Cambria Math" panose="02040503050406030204" pitchFamily="18" charset="0"/>
+                              <a:ea typeface="Cambria Math" panose="02040503050406030204" pitchFamily="18" charset="0"/>
+                            </a:rPr>
+                            <m:t>−5</m:t>
+                          </m:r>
+                        </m:sup>
+                      </m:sSup>
+                      <m:r>
+                        <a:rPr lang="en-US" sz="2400" b="0" i="1" smtClean="0">
+                          <a:latin typeface="Cambria Math" panose="02040503050406030204" pitchFamily="18" charset="0"/>
+                          <a:ea typeface="Cambria Math" panose="02040503050406030204" pitchFamily="18" charset="0"/>
+                        </a:rPr>
+                        <m:t> </m:t>
+                      </m:r>
+                      <m:r>
+                        <a:rPr lang="ru-RU" sz="2400" b="0" i="1" smtClean="0">
+                          <a:latin typeface="Cambria Math" panose="02040503050406030204" pitchFamily="18" charset="0"/>
+                          <a:ea typeface="Cambria Math" panose="02040503050406030204" pitchFamily="18" charset="0"/>
+                        </a:rPr>
+                        <m:t>Н∙м</m:t>
+                      </m:r>
+                    </m:oMath>
+                  </m:oMathPara>
+                </a14:m>
+                <a:endParaRPr lang="ru-RU" sz="2400" dirty="0"/>
+              </a:p>
+              <a:p>
+                <a:pPr algn="just"/>
+                <a:endParaRPr lang="ru-RU" sz="2400" dirty="0"/>
+              </a:p>
+              <a:p>
+                <a:pPr algn="just"/>
+                <a14:m>
+                  <m:oMathPara xmlns:m="http://schemas.openxmlformats.org/officeDocument/2006/math">
+                    <m:oMathParaPr>
+                      <m:jc m:val="centerGroup"/>
+                    </m:oMathParaPr>
+                    <m:oMath xmlns:m="http://schemas.openxmlformats.org/officeDocument/2006/math">
+                      <m:r>
+                        <a:rPr lang="en-US" sz="2400" b="0" i="1" smtClean="0">
+                          <a:latin typeface="Cambria Math" panose="02040503050406030204" pitchFamily="18" charset="0"/>
+                        </a:rPr>
+                        <m:t>𝑀</m:t>
+                      </m:r>
+                      <m:r>
+                        <a:rPr lang="en-US" sz="2400" b="0" i="1" smtClean="0">
+                          <a:latin typeface="Cambria Math" panose="02040503050406030204" pitchFamily="18" charset="0"/>
+                        </a:rPr>
+                        <m:t>=0,005 ±5∙</m:t>
+                      </m:r>
+                      <m:sSup>
+                        <m:sSupPr>
+                          <m:ctrlPr>
+                            <a:rPr lang="en-US" sz="2400" b="0" i="1" smtClean="0">
+                              <a:latin typeface="Cambria Math" panose="02040503050406030204" pitchFamily="18" charset="0"/>
+                              <a:ea typeface="Cambria Math" panose="02040503050406030204" pitchFamily="18" charset="0"/>
+                            </a:rPr>
+                          </m:ctrlPr>
+                        </m:sSupPr>
+                        <m:e>
+                          <m:r>
+                            <a:rPr lang="en-US" sz="2400" b="0" i="1" smtClean="0">
+                              <a:latin typeface="Cambria Math" panose="02040503050406030204" pitchFamily="18" charset="0"/>
+                              <a:ea typeface="Cambria Math" panose="02040503050406030204" pitchFamily="18" charset="0"/>
+                            </a:rPr>
+                            <m:t>10</m:t>
+                          </m:r>
+                        </m:e>
+                        <m:sup>
+                          <m:r>
+                            <a:rPr lang="en-US" sz="2400" b="0" i="1" smtClean="0">
+                              <a:latin typeface="Cambria Math" panose="02040503050406030204" pitchFamily="18" charset="0"/>
+                              <a:ea typeface="Cambria Math" panose="02040503050406030204" pitchFamily="18" charset="0"/>
+                            </a:rPr>
+                            <m:t>−5</m:t>
+                          </m:r>
+                        </m:sup>
+                      </m:sSup>
+                      <m:r>
+                        <a:rPr lang="en-US" sz="2400" b="0" i="1" smtClean="0">
+                          <a:latin typeface="Cambria Math" panose="02040503050406030204" pitchFamily="18" charset="0"/>
+                          <a:ea typeface="Cambria Math" panose="02040503050406030204" pitchFamily="18" charset="0"/>
+                        </a:rPr>
+                        <m:t> </m:t>
+                      </m:r>
+                      <m:r>
+                        <a:rPr lang="ru-RU" sz="2400" b="0" i="1" smtClean="0">
+                          <a:latin typeface="Cambria Math" panose="02040503050406030204" pitchFamily="18" charset="0"/>
+                          <a:ea typeface="Cambria Math" panose="02040503050406030204" pitchFamily="18" charset="0"/>
+                        </a:rPr>
+                        <m:t>Н∙м</m:t>
+                      </m:r>
+                    </m:oMath>
+                  </m:oMathPara>
+                </a14:m>
+                <a:endParaRPr lang="en-US" sz="2400" dirty="0"/>
+              </a:p>
+              <a:p>
+                <a:pPr algn="just"/>
+                <a:endParaRPr lang="ru-RU" sz="2400" dirty="0"/>
+              </a:p>
+              <a:p>
+                <a:pPr algn="just"/>
+                <a:endParaRPr lang="ru-RU" sz="2400" dirty="0"/>
+              </a:p>
+              <a:p>
+                <a:pPr algn="just"/>
+                <a:endParaRPr lang="ru-RU" sz="2400" dirty="0"/>
+              </a:p>
+            </p:txBody>
+          </p:sp>
+        </mc:Choice>
+        <mc:Fallback>
+          <p:sp>
+            <p:nvSpPr>
+              <p:cNvPr id="12" name="Прямоугольник 11">
+                <a:extLst>
+                  <a:ext uri="{FF2B5EF4-FFF2-40B4-BE49-F238E27FC236}">
+                    <a16:creationId xmlns:a16="http://schemas.microsoft.com/office/drawing/2014/main" id="{85C5B0C8-5735-4441-B508-AA2CACCFCBE9}"/>
+                  </a:ext>
+                </a:extLst>
+              </p:cNvPr>
+              <p:cNvSpPr>
+                <a:spLocks noRot="1" noChangeAspect="1" noMove="1" noResize="1" noEditPoints="1" noAdjustHandles="1" noChangeArrowheads="1" noChangeShapeType="1" noTextEdit="1"/>
+              </p:cNvSpPr>
+              <p:nvPr/>
+            </p:nvSpPr>
+            <p:spPr>
+              <a:xfrm>
+                <a:off x="4917485" y="684037"/>
+                <a:ext cx="6970644" cy="7170617"/>
+              </a:xfrm>
+              <a:prstGeom prst="rect">
+                <a:avLst/>
+              </a:prstGeom>
+              <a:blipFill>
+                <a:blip r:embed="rId2"/>
+                <a:stretch>
+                  <a:fillRect l="-1400" t="-680" r="-1312"/>
+                </a:stretch>
+              </a:blipFill>
+            </p:spPr>
+            <p:txBody>
+              <a:bodyPr/>
+              <a:lstStyle/>
+              <a:p>
+                <a:r>
+                  <a:rPr lang="en-US">
+                    <a:noFill/>
+                  </a:rPr>
+                  <a:t> </a:t>
+                </a:r>
+              </a:p>
+            </p:txBody>
+          </p:sp>
+        </mc:Fallback>
+      </mc:AlternateContent>
+      <p:sp>
+        <p:nvSpPr>
+          <p:cNvPr id="18" name="Прямоугольник 17">
+            <a:extLst>
+              <a:ext uri="{FF2B5EF4-FFF2-40B4-BE49-F238E27FC236}">
+                <a16:creationId xmlns:a16="http://schemas.microsoft.com/office/drawing/2014/main" id="{754E424C-1F93-4A75-B081-543E48DF86C0}"/>
+              </a:ext>
+            </a:extLst>
+          </p:cNvPr>
+          <p:cNvSpPr/>
+          <p:nvPr/>
+        </p:nvSpPr>
+        <p:spPr>
+          <a:xfrm>
+            <a:off x="4994997" y="4656580"/>
+            <a:ext cx="4987203" cy="461665"/>
+          </a:xfrm>
+          <a:prstGeom prst="rect">
+            <a:avLst/>
+          </a:prstGeom>
+        </p:spPr>
+        <p:txBody>
+          <a:bodyPr wrap="square">
+            <a:spAutoFit/>
+          </a:bodyPr>
+          <a:lstStyle/>
+          <a:p>
+            <a:pPr algn="just"/>
+            <a:endParaRPr lang="ru-RU" sz="2400" dirty="0"/>
+          </a:p>
+        </p:txBody>
+      </p:sp>
+      <p:pic>
+        <p:nvPicPr>
+          <p:cNvPr id="3" name="Picture 2">
+            <a:extLst>
+              <a:ext uri="{FF2B5EF4-FFF2-40B4-BE49-F238E27FC236}">
+                <a16:creationId xmlns:a16="http://schemas.microsoft.com/office/drawing/2014/main" id="{A755D10B-EEA6-490C-9BF4-EDD48ADA5B14}"/>
+              </a:ext>
+            </a:extLst>
+          </p:cNvPr>
+          <p:cNvPicPr>
+            <a:picLocks noChangeAspect="1"/>
+          </p:cNvPicPr>
+          <p:nvPr/>
+        </p:nvPicPr>
+        <p:blipFill>
+          <a:blip r:embed="rId3">
+            <a:extLst>
+              <a:ext uri="{28A0092B-C50C-407E-A947-70E740481C1C}">
+                <a14:useLocalDpi xmlns:a14="http://schemas.microsoft.com/office/drawing/2010/main" val="0"/>
+              </a:ext>
+            </a:extLst>
+          </a:blip>
+          <a:stretch>
+            <a:fillRect/>
+          </a:stretch>
+        </p:blipFill>
+        <p:spPr>
+          <a:xfrm>
+            <a:off x="365422" y="776404"/>
+            <a:ext cx="3659459" cy="2949821"/>
+          </a:xfrm>
+          <a:prstGeom prst="rect">
+            <a:avLst/>
+          </a:prstGeom>
+        </p:spPr>
+      </p:pic>
+      <p:pic>
+        <p:nvPicPr>
+          <p:cNvPr id="13" name="Рисунок 1">
+            <a:extLst>
+              <a:ext uri="{FF2B5EF4-FFF2-40B4-BE49-F238E27FC236}">
+                <a16:creationId xmlns:a16="http://schemas.microsoft.com/office/drawing/2014/main" id="{86826F18-664E-4E3A-B0DC-C6F1B216BF3E}"/>
+              </a:ext>
+            </a:extLst>
+          </p:cNvPr>
+          <p:cNvPicPr/>
+          <p:nvPr/>
+        </p:nvPicPr>
+        <p:blipFill>
+          <a:blip r:embed="rId4">
+            <a:extLst>
+              <a:ext uri="{28A0092B-C50C-407E-A947-70E740481C1C}">
+                <a14:useLocalDpi xmlns:a14="http://schemas.microsoft.com/office/drawing/2010/main" val="0"/>
+              </a:ext>
+            </a:extLst>
+          </a:blip>
+          <a:srcRect/>
+          <a:stretch>
+            <a:fillRect/>
+          </a:stretch>
+        </p:blipFill>
+        <p:spPr bwMode="auto">
+          <a:xfrm>
+            <a:off x="438781" y="3973450"/>
+            <a:ext cx="3222874" cy="2398470"/>
+          </a:xfrm>
+          <a:prstGeom prst="rect">
+            <a:avLst/>
+          </a:prstGeom>
+          <a:noFill/>
+          <a:ln>
+            <a:noFill/>
+          </a:ln>
+        </p:spPr>
+      </p:pic>
+    </p:spTree>
+    <p:extLst>
+      <p:ext uri="{BB962C8B-B14F-4D97-AF65-F5344CB8AC3E}">
+        <p14:creationId xmlns:p14="http://schemas.microsoft.com/office/powerpoint/2010/main" val="3821675543"/>
+      </p:ext>
+    </p:extLst>
+  </p:cSld>
+  <p:clrMapOvr>
+    <a:masterClrMapping/>
+  </p:clrMapOvr>
+</p:sld>
+</file>
+
+<file path=ppt/slides/slide8.xml><?xml version="1.0" encoding="utf-8"?>
+<p:sld xmlns:a="http://schemas.openxmlformats.org/drawingml/2006/main" xmlns:r="http://schemas.openxmlformats.org/officeDocument/2006/relationships" xmlns:p="http://schemas.openxmlformats.org/presentationml/2006/main">
+  <p:cSld>
+    <p:spTree>
+      <p:nvGrpSpPr>
+        <p:cNvPr id="1" name=""/>
+        <p:cNvGrpSpPr/>
+        <p:nvPr/>
+      </p:nvGrpSpPr>
+      <p:grpSpPr>
+        <a:xfrm>
+          <a:off x="0" y="0"/>
+          <a:ext cx="0" cy="0"/>
+          <a:chOff x="0" y="0"/>
+          <a:chExt cx="0" cy="0"/>
+        </a:xfrm>
+      </p:grpSpPr>
+      <p:sp>
+        <p:nvSpPr>
+          <p:cNvPr id="4" name="Номер слайда 3">
+            <a:extLst>
+              <a:ext uri="{FF2B5EF4-FFF2-40B4-BE49-F238E27FC236}">
+                <a16:creationId xmlns:a16="http://schemas.microsoft.com/office/drawing/2014/main" id="{FA27ABEE-315A-4D20-92C1-C12964519599}"/>
+              </a:ext>
+            </a:extLst>
+          </p:cNvPr>
+          <p:cNvSpPr>
+            <a:spLocks noGrp="1"/>
+          </p:cNvSpPr>
+          <p:nvPr>
+            <p:ph type="sldNum" sz="quarter" idx="12"/>
+          </p:nvPr>
+        </p:nvSpPr>
+        <p:spPr/>
+        <p:txBody>
+          <a:bodyPr/>
+          <a:lstStyle/>
+          <a:p>
+            <a:fld id="{1F8BD534-37C6-45AF-BD63-E8CFF4C8D25C}" type="slidenum">
+              <a:rPr lang="en-US" smtClean="0"/>
+              <a:t>8</a:t>
+            </a:fld>
+            <a:endParaRPr lang="en-US"/>
+          </a:p>
+        </p:txBody>
+      </p:sp>
+      <p:sp>
+        <p:nvSpPr>
+          <p:cNvPr id="7" name="Title 1">
+            <a:extLst>
+              <a:ext uri="{FF2B5EF4-FFF2-40B4-BE49-F238E27FC236}">
+                <a16:creationId xmlns:a16="http://schemas.microsoft.com/office/drawing/2014/main" id="{4F3EFBB3-C0F5-4C25-A4EC-6CEF46C91B4B}"/>
+              </a:ext>
+            </a:extLst>
+          </p:cNvPr>
+          <p:cNvSpPr>
+            <a:spLocks noGrp="1"/>
+          </p:cNvSpPr>
+          <p:nvPr>
+            <p:ph type="title"/>
+          </p:nvPr>
+        </p:nvSpPr>
+        <p:spPr>
+          <a:xfrm>
+            <a:off x="0" y="-11239"/>
+            <a:ext cx="12084424" cy="903161"/>
+          </a:xfrm>
+        </p:spPr>
+        <p:txBody>
+          <a:bodyPr>
+            <a:normAutofit/>
+          </a:bodyPr>
+          <a:lstStyle/>
+          <a:p>
+            <a:r>
+              <a:rPr lang="ru-RU" sz="4000" dirty="0">
+                <a:latin typeface="+mj-lt"/>
+              </a:rPr>
+              <a:t>Аттестация стенда. Погрешность гироскопа</a:t>
+            </a:r>
+            <a:endParaRPr lang="en-US" dirty="0"/>
+          </a:p>
+        </p:txBody>
+      </p:sp>
+      <p:sp>
+        <p:nvSpPr>
+          <p:cNvPr id="12" name="Прямоугольник 11">
+            <a:extLst>
+              <a:ext uri="{FF2B5EF4-FFF2-40B4-BE49-F238E27FC236}">
+                <a16:creationId xmlns:a16="http://schemas.microsoft.com/office/drawing/2014/main" id="{85C5B0C8-5735-4441-B508-AA2CACCFCBE9}"/>
+              </a:ext>
+            </a:extLst>
+          </p:cNvPr>
+          <p:cNvSpPr/>
+          <p:nvPr/>
+        </p:nvSpPr>
+        <p:spPr>
+          <a:xfrm>
+            <a:off x="870869" y="4887412"/>
+            <a:ext cx="10342685" cy="830997"/>
+          </a:xfrm>
+          <a:prstGeom prst="rect">
+            <a:avLst/>
+          </a:prstGeom>
+        </p:spPr>
+        <p:txBody>
+          <a:bodyPr wrap="square">
+            <a:spAutoFit/>
+          </a:bodyPr>
+          <a:lstStyle/>
+          <a:p>
+            <a:pPr algn="just"/>
+            <a:endParaRPr lang="ru-RU" sz="2400" dirty="0"/>
+          </a:p>
+          <a:p>
+            <a:pPr algn="just"/>
+            <a:endParaRPr lang="ru-RU" sz="2400" dirty="0"/>
+          </a:p>
+        </p:txBody>
+      </p:sp>
+      <p:sp>
+        <p:nvSpPr>
+          <p:cNvPr id="18" name="Прямоугольник 17">
+            <a:extLst>
+              <a:ext uri="{FF2B5EF4-FFF2-40B4-BE49-F238E27FC236}">
+                <a16:creationId xmlns:a16="http://schemas.microsoft.com/office/drawing/2014/main" id="{754E424C-1F93-4A75-B081-543E48DF86C0}"/>
+              </a:ext>
+            </a:extLst>
+          </p:cNvPr>
+          <p:cNvSpPr/>
+          <p:nvPr/>
+        </p:nvSpPr>
+        <p:spPr>
+          <a:xfrm>
+            <a:off x="4994997" y="4656580"/>
+            <a:ext cx="4987203" cy="461665"/>
+          </a:xfrm>
+          <a:prstGeom prst="rect">
+            <a:avLst/>
+          </a:prstGeom>
+        </p:spPr>
+        <p:txBody>
+          <a:bodyPr wrap="square">
+            <a:spAutoFit/>
+          </a:bodyPr>
+          <a:lstStyle/>
+          <a:p>
+            <a:pPr algn="just"/>
+            <a:endParaRPr lang="ru-RU" sz="2400" dirty="0"/>
+          </a:p>
+        </p:txBody>
+      </p:sp>
+      <p:pic>
+        <p:nvPicPr>
+          <p:cNvPr id="1026" name="Picture 2" descr="Выходное изображение">
+            <a:extLst>
+              <a:ext uri="{FF2B5EF4-FFF2-40B4-BE49-F238E27FC236}">
+                <a16:creationId xmlns:a16="http://schemas.microsoft.com/office/drawing/2014/main" id="{ABA21F3C-631D-47D8-88C9-7BE7FA42906B}"/>
+              </a:ext>
+            </a:extLst>
+          </p:cNvPr>
+          <p:cNvPicPr>
+            <a:picLocks noChangeAspect="1" noChangeArrowheads="1"/>
+          </p:cNvPicPr>
+          <p:nvPr/>
+        </p:nvPicPr>
+        <p:blipFill>
+          <a:blip r:embed="rId2">
+            <a:extLst>
+              <a:ext uri="{28A0092B-C50C-407E-A947-70E740481C1C}">
+                <a14:useLocalDpi xmlns:a14="http://schemas.microsoft.com/office/drawing/2010/main" val="0"/>
+              </a:ext>
+            </a:extLst>
+          </a:blip>
+          <a:srcRect/>
+          <a:stretch>
+            <a:fillRect/>
+          </a:stretch>
+        </p:blipFill>
+        <p:spPr bwMode="auto">
+          <a:xfrm>
+            <a:off x="2169665" y="662807"/>
+            <a:ext cx="7020291" cy="4188325"/>
+          </a:xfrm>
+          <a:prstGeom prst="rect">
+            <a:avLst/>
+          </a:prstGeom>
+          <a:noFill/>
+          <a:extLst>
+            <a:ext uri="{909E8E84-426E-40DD-AFC4-6F175D3DCCD1}">
+              <a14:hiddenFill xmlns:a14="http://schemas.microsoft.com/office/drawing/2010/main">
+                <a:solidFill>
+                  <a:srgbClr val="FFFFFF"/>
+                </a:solidFill>
+              </a14:hiddenFill>
+            </a:ext>
+          </a:extLst>
+        </p:spPr>
+      </p:pic>
+      <mc:AlternateContent xmlns:mc="http://schemas.openxmlformats.org/markup-compatibility/2006">
+        <mc:Choice xmlns:a14="http://schemas.microsoft.com/office/drawing/2010/main" Requires="a14">
+          <p:sp>
+            <p:nvSpPr>
+              <p:cNvPr id="10" name="TextBox 9">
+                <a:extLst>
+                  <a:ext uri="{FF2B5EF4-FFF2-40B4-BE49-F238E27FC236}">
+                    <a16:creationId xmlns:a16="http://schemas.microsoft.com/office/drawing/2014/main" id="{E77CC1F7-E166-4CE6-BB8B-5EB930DA1169}"/>
                   </a:ext>
                 </a:extLst>
               </p:cNvPr>
@@ -8593,8 +10935,8 @@
             </p:nvSpPr>
             <p:spPr>
               <a:xfrm>
-                <a:off x="97523" y="4438552"/>
-                <a:ext cx="5677524" cy="1735411"/>
+                <a:off x="2763715" y="4982326"/>
+                <a:ext cx="6190128" cy="975908"/>
               </a:xfrm>
               <a:prstGeom prst="rect">
                 <a:avLst/>
@@ -8607,611 +10949,7 @@
               </a:bodyPr>
               <a:lstStyle/>
               <a:p>
-                <a:pPr>
-                  <a:lnSpc>
-                    <a:spcPct val="150000"/>
-                  </a:lnSpc>
-                </a:pPr>
-                <a:r>
-                  <a:rPr lang="ru-RU" sz="1800" dirty="0">
-                    <a:effectLst/>
-                    <a:latin typeface="Cambria Math" panose="02040503050406030204" pitchFamily="18" charset="0"/>
-                    <a:ea typeface="SimSun" panose="02010600030101010101" pitchFamily="2" charset="-122"/>
-                  </a:rPr>
-                  <a:t>Определяем </a:t>
-                </a:r>
-                <a:r>
-                  <a:rPr lang="ru-RU" sz="1800" dirty="0" err="1">
-                    <a:effectLst/>
-                    <a:latin typeface="Cambria Math" panose="02040503050406030204" pitchFamily="18" charset="0"/>
-                    <a:ea typeface="SimSun" panose="02010600030101010101" pitchFamily="2" charset="-122"/>
-                  </a:rPr>
-                  <a:t>погреность</a:t>
-                </a:r>
-                <a:r>
-                  <a:rPr lang="ru-RU" sz="1800" dirty="0">
-                    <a:effectLst/>
-                    <a:latin typeface="Cambria Math" panose="02040503050406030204" pitchFamily="18" charset="0"/>
-                    <a:ea typeface="SimSun" panose="02010600030101010101" pitchFamily="2" charset="-122"/>
-                  </a:rPr>
-                  <a:t> по формуле:</a:t>
-                </a:r>
-              </a:p>
-              <a:p>
-                <a:pPr>
-                  <a:lnSpc>
-                    <a:spcPct val="150000"/>
-                  </a:lnSpc>
-                </a:pPr>
-                <a14:m>
-                  <m:oMathPara xmlns:m="http://schemas.openxmlformats.org/officeDocument/2006/math">
-                    <m:oMathParaPr>
-                      <m:jc m:val="centerGroup"/>
-                    </m:oMathParaPr>
-                    <m:oMath xmlns:m="http://schemas.openxmlformats.org/officeDocument/2006/math">
-                      <m:sSub>
-                        <m:sSubPr>
-                          <m:ctrlPr>
-                            <a:rPr lang="ru-RU" sz="1800" i="1" smtClean="0">
-                              <a:effectLst/>
-                              <a:latin typeface="Cambria Math" panose="02040503050406030204" pitchFamily="18" charset="0"/>
-                              <a:ea typeface="SimSun" panose="02010600030101010101" pitchFamily="2" charset="-122"/>
-                            </a:rPr>
-                          </m:ctrlPr>
-                        </m:sSubPr>
-                        <m:e>
-                          <m:r>
-                            <a:rPr lang="ru-RU" sz="1800" i="1">
-                              <a:effectLst/>
-                              <a:latin typeface="Cambria Math" panose="02040503050406030204" pitchFamily="18" charset="0"/>
-                              <a:ea typeface="SimSun" panose="02010600030101010101" pitchFamily="2" charset="-122"/>
-                            </a:rPr>
-                            <m:t>𝐽</m:t>
-                          </m:r>
-                        </m:e>
-                        <m:sub>
-                          <m:r>
-                            <a:rPr lang="ru-RU" sz="1800" i="1">
-                              <a:effectLst/>
-                              <a:latin typeface="Cambria Math" panose="02040503050406030204" pitchFamily="18" charset="0"/>
-                              <a:ea typeface="SimSun" panose="02010600030101010101" pitchFamily="2" charset="-122"/>
-                            </a:rPr>
-                            <m:t>𝑖</m:t>
-                          </m:r>
-                        </m:sub>
-                      </m:sSub>
-                      <m:r>
-                        <a:rPr lang="ru-RU" sz="1800" i="1">
-                          <a:effectLst/>
-                          <a:latin typeface="Cambria Math" panose="02040503050406030204" pitchFamily="18" charset="0"/>
-                          <a:ea typeface="SimSun" panose="02010600030101010101" pitchFamily="2" charset="-122"/>
-                        </a:rPr>
-                        <m:t>= </m:t>
-                      </m:r>
-                      <m:sSub>
-                        <m:sSubPr>
-                          <m:ctrlPr>
-                            <a:rPr lang="ru-RU" sz="1800" i="1">
-                              <a:effectLst/>
-                              <a:latin typeface="Cambria Math" panose="02040503050406030204" pitchFamily="18" charset="0"/>
-                              <a:ea typeface="SimSun" panose="02010600030101010101" pitchFamily="2" charset="-122"/>
-                            </a:rPr>
-                          </m:ctrlPr>
-                        </m:sSubPr>
-                        <m:e>
-                          <m:r>
-                            <a:rPr lang="en-US" sz="1800" i="1">
-                              <a:effectLst/>
-                              <a:latin typeface="Cambria Math" panose="02040503050406030204" pitchFamily="18" charset="0"/>
-                              <a:ea typeface="SimSun" panose="02010600030101010101" pitchFamily="2" charset="-122"/>
-                            </a:rPr>
-                            <m:t>𝐽</m:t>
-                          </m:r>
-                        </m:e>
-                        <m:sub>
-                          <m:r>
-                            <a:rPr lang="ru-RU" sz="1800" i="1">
-                              <a:effectLst/>
-                              <a:latin typeface="Cambria Math" panose="02040503050406030204" pitchFamily="18" charset="0"/>
-                              <a:ea typeface="SimSun" panose="02010600030101010101" pitchFamily="2" charset="-122"/>
-                            </a:rPr>
-                            <m:t>𝑖</m:t>
-                          </m:r>
-                        </m:sub>
-                      </m:sSub>
-                      <m:rad>
-                        <m:radPr>
-                          <m:degHide m:val="on"/>
-                          <m:ctrlPr>
-                            <a:rPr lang="ru-RU" sz="1800" i="1">
-                              <a:effectLst/>
-                              <a:latin typeface="Cambria Math" panose="02040503050406030204" pitchFamily="18" charset="0"/>
-                              <a:ea typeface="SimSun" panose="02010600030101010101" pitchFamily="2" charset="-122"/>
-                            </a:rPr>
-                          </m:ctrlPr>
-                        </m:radPr>
-                        <m:deg/>
-                        <m:e>
-                          <m:sSup>
-                            <m:sSupPr>
-                              <m:ctrlPr>
-                                <a:rPr lang="ru-RU" sz="1800" i="1">
-                                  <a:effectLst/>
-                                  <a:latin typeface="Cambria Math" panose="02040503050406030204" pitchFamily="18" charset="0"/>
-                                  <a:ea typeface="SimSun" panose="02010600030101010101" pitchFamily="2" charset="-122"/>
-                                </a:rPr>
-                              </m:ctrlPr>
-                            </m:sSupPr>
-                            <m:e>
-                              <m:d>
-                                <m:dPr>
-                                  <m:ctrlPr>
-                                    <a:rPr lang="ru-RU" sz="1800" i="1">
-                                      <a:effectLst/>
-                                      <a:latin typeface="Cambria Math" panose="02040503050406030204" pitchFamily="18" charset="0"/>
-                                      <a:ea typeface="SimSun" panose="02010600030101010101" pitchFamily="2" charset="-122"/>
-                                    </a:rPr>
-                                  </m:ctrlPr>
-                                </m:dPr>
-                                <m:e>
-                                  <m:f>
-                                    <m:fPr>
-                                      <m:ctrlPr>
-                                        <a:rPr lang="ru-RU" sz="1800" i="1">
-                                          <a:effectLst/>
-                                          <a:latin typeface="Cambria Math" panose="02040503050406030204" pitchFamily="18" charset="0"/>
-                                          <a:ea typeface="SimSun" panose="02010600030101010101" pitchFamily="2" charset="-122"/>
-                                        </a:rPr>
-                                      </m:ctrlPr>
-                                    </m:fPr>
-                                    <m:num>
-                                      <m:r>
-                                        <a:rPr lang="ru-RU" sz="1800" i="1">
-                                          <a:effectLst/>
-                                          <a:latin typeface="Cambria Math" panose="02040503050406030204" pitchFamily="18" charset="0"/>
-                                          <a:ea typeface="SimSun" panose="02010600030101010101" pitchFamily="2" charset="-122"/>
-                                        </a:rPr>
-                                        <m:t>𝜕</m:t>
-                                      </m:r>
-                                      <m:r>
-                                        <m:rPr>
-                                          <m:sty m:val="p"/>
-                                        </m:rPr>
-                                        <a:rPr lang="ru-RU" sz="1800">
-                                          <a:effectLst/>
-                                          <a:latin typeface="Cambria Math" panose="02040503050406030204" pitchFamily="18" charset="0"/>
-                                          <a:ea typeface="SimSun" panose="02010600030101010101" pitchFamily="2" charset="-122"/>
-                                        </a:rPr>
-                                        <m:t>ln</m:t>
-                                      </m:r>
-                                      <m:r>
-                                        <a:rPr lang="ru-RU" sz="1800">
-                                          <a:effectLst/>
-                                          <a:latin typeface="Cambria Math" panose="02040503050406030204" pitchFamily="18" charset="0"/>
-                                          <a:ea typeface="SimSun" panose="02010600030101010101" pitchFamily="2" charset="-122"/>
-                                        </a:rPr>
-                                        <m:t>⁡</m:t>
-                                      </m:r>
-                                      <m:r>
-                                        <a:rPr lang="ru-RU" sz="1800" i="1">
-                                          <a:effectLst/>
-                                          <a:latin typeface="Cambria Math" panose="02040503050406030204" pitchFamily="18" charset="0"/>
-                                          <a:ea typeface="SimSun" panose="02010600030101010101" pitchFamily="2" charset="-122"/>
-                                        </a:rPr>
-                                        <m:t>(</m:t>
-                                      </m:r>
-                                      <m:sSub>
-                                        <m:sSubPr>
-                                          <m:ctrlPr>
-                                            <a:rPr lang="ru-RU" sz="1800" i="1">
-                                              <a:effectLst/>
-                                              <a:latin typeface="Cambria Math" panose="02040503050406030204" pitchFamily="18" charset="0"/>
-                                              <a:ea typeface="SimSun" panose="02010600030101010101" pitchFamily="2" charset="-122"/>
-                                            </a:rPr>
-                                          </m:ctrlPr>
-                                        </m:sSubPr>
-                                        <m:e>
-                                          <m:r>
-                                            <a:rPr lang="ru-RU" sz="1800" i="1">
-                                              <a:effectLst/>
-                                              <a:latin typeface="Cambria Math" panose="02040503050406030204" pitchFamily="18" charset="0"/>
-                                              <a:ea typeface="SimSun" panose="02010600030101010101" pitchFamily="2" charset="-122"/>
-                                            </a:rPr>
-                                            <m:t>𝐽</m:t>
-                                          </m:r>
-                                        </m:e>
-                                        <m:sub>
-                                          <m:r>
-                                            <a:rPr lang="ru-RU" sz="1800" i="1">
-                                              <a:effectLst/>
-                                              <a:latin typeface="Cambria Math" panose="02040503050406030204" pitchFamily="18" charset="0"/>
-                                              <a:ea typeface="SimSun" panose="02010600030101010101" pitchFamily="2" charset="-122"/>
-                                            </a:rPr>
-                                            <m:t>𝑖</m:t>
-                                          </m:r>
-                                        </m:sub>
-                                      </m:sSub>
-                                      <m:r>
-                                        <a:rPr lang="ru-RU" sz="1800" i="1">
-                                          <a:effectLst/>
-                                          <a:latin typeface="Cambria Math" panose="02040503050406030204" pitchFamily="18" charset="0"/>
-                                          <a:ea typeface="SimSun" panose="02010600030101010101" pitchFamily="2" charset="-122"/>
-                                        </a:rPr>
-                                        <m:t>)</m:t>
-                                      </m:r>
-                                    </m:num>
-                                    <m:den>
-                                      <m:r>
-                                        <a:rPr lang="ru-RU" sz="1800" i="1">
-                                          <a:effectLst/>
-                                          <a:latin typeface="Cambria Math" panose="02040503050406030204" pitchFamily="18" charset="0"/>
-                                          <a:ea typeface="SimSun" panose="02010600030101010101" pitchFamily="2" charset="-122"/>
-                                        </a:rPr>
-                                        <m:t>𝜕</m:t>
-                                      </m:r>
-                                      <m:sSub>
-                                        <m:sSubPr>
-                                          <m:ctrlPr>
-                                            <a:rPr lang="ru-RU" sz="1800" i="1">
-                                              <a:effectLst/>
-                                              <a:latin typeface="Cambria Math" panose="02040503050406030204" pitchFamily="18" charset="0"/>
-                                              <a:ea typeface="SimSun" panose="02010600030101010101" pitchFamily="2" charset="-122"/>
-                                            </a:rPr>
-                                          </m:ctrlPr>
-                                        </m:sSubPr>
-                                        <m:e>
-                                          <m:r>
-                                            <a:rPr lang="ru-RU" sz="1800" i="1">
-                                              <a:effectLst/>
-                                              <a:latin typeface="Cambria Math" panose="02040503050406030204" pitchFamily="18" charset="0"/>
-                                              <a:ea typeface="SimSun" panose="02010600030101010101" pitchFamily="2" charset="-122"/>
-                                            </a:rPr>
-                                            <m:t>𝑚</m:t>
-                                          </m:r>
-                                        </m:e>
-                                        <m:sub>
-                                          <m:r>
-                                            <a:rPr lang="ru-RU" sz="1800" i="1">
-                                              <a:effectLst/>
-                                              <a:latin typeface="Cambria Math" panose="02040503050406030204" pitchFamily="18" charset="0"/>
-                                              <a:ea typeface="SimSun" panose="02010600030101010101" pitchFamily="2" charset="-122"/>
-                                            </a:rPr>
-                                            <m:t>𝑖</m:t>
-                                          </m:r>
-                                        </m:sub>
-                                      </m:sSub>
-                                    </m:den>
-                                  </m:f>
-                                  <m:r>
-                                    <a:rPr lang="ru-RU" sz="1800" i="1">
-                                      <a:effectLst/>
-                                      <a:latin typeface="Cambria Math" panose="02040503050406030204" pitchFamily="18" charset="0"/>
-                                      <a:ea typeface="SimSun" panose="02010600030101010101" pitchFamily="2" charset="-122"/>
-                                    </a:rPr>
-                                    <m:t>∆</m:t>
-                                  </m:r>
-                                  <m:sSub>
-                                    <m:sSubPr>
-                                      <m:ctrlPr>
-                                        <a:rPr lang="ru-RU" sz="1800" i="1">
-                                          <a:effectLst/>
-                                          <a:latin typeface="Cambria Math" panose="02040503050406030204" pitchFamily="18" charset="0"/>
-                                          <a:ea typeface="SimSun" panose="02010600030101010101" pitchFamily="2" charset="-122"/>
-                                        </a:rPr>
-                                      </m:ctrlPr>
-                                    </m:sSubPr>
-                                    <m:e>
-                                      <m:r>
-                                        <a:rPr lang="ru-RU" sz="1800" i="1">
-                                          <a:effectLst/>
-                                          <a:latin typeface="Cambria Math" panose="02040503050406030204" pitchFamily="18" charset="0"/>
-                                          <a:ea typeface="SimSun" panose="02010600030101010101" pitchFamily="2" charset="-122"/>
-                                        </a:rPr>
-                                        <m:t>𝑚</m:t>
-                                      </m:r>
-                                    </m:e>
-                                    <m:sub>
-                                      <m:r>
-                                        <a:rPr lang="ru-RU" sz="1800" i="1">
-                                          <a:effectLst/>
-                                          <a:latin typeface="Cambria Math" panose="02040503050406030204" pitchFamily="18" charset="0"/>
-                                          <a:ea typeface="SimSun" panose="02010600030101010101" pitchFamily="2" charset="-122"/>
-                                        </a:rPr>
-                                        <m:t>𝑖</m:t>
-                                      </m:r>
-                                    </m:sub>
-                                  </m:sSub>
-                                </m:e>
-                              </m:d>
-                            </m:e>
-                            <m:sup>
-                              <m:r>
-                                <a:rPr lang="ru-RU" sz="1800" i="1">
-                                  <a:effectLst/>
-                                  <a:latin typeface="Cambria Math" panose="02040503050406030204" pitchFamily="18" charset="0"/>
-                                  <a:ea typeface="SimSun" panose="02010600030101010101" pitchFamily="2" charset="-122"/>
-                                </a:rPr>
-                                <m:t>2</m:t>
-                              </m:r>
-                            </m:sup>
-                          </m:sSup>
-                          <m:r>
-                            <a:rPr lang="ru-RU" sz="1800" i="1">
-                              <a:effectLst/>
-                              <a:latin typeface="Cambria Math" panose="02040503050406030204" pitchFamily="18" charset="0"/>
-                              <a:ea typeface="SimSun" panose="02010600030101010101" pitchFamily="2" charset="-122"/>
-                            </a:rPr>
-                            <m:t>+</m:t>
-                          </m:r>
-                          <m:sSup>
-                            <m:sSupPr>
-                              <m:ctrlPr>
-                                <a:rPr lang="ru-RU" sz="1800" i="1">
-                                  <a:effectLst/>
-                                  <a:latin typeface="Cambria Math" panose="02040503050406030204" pitchFamily="18" charset="0"/>
-                                  <a:ea typeface="SimSun" panose="02010600030101010101" pitchFamily="2" charset="-122"/>
-                                </a:rPr>
-                              </m:ctrlPr>
-                            </m:sSupPr>
-                            <m:e>
-                              <m:d>
-                                <m:dPr>
-                                  <m:ctrlPr>
-                                    <a:rPr lang="ru-RU" sz="1800" i="1">
-                                      <a:effectLst/>
-                                      <a:latin typeface="Cambria Math" panose="02040503050406030204" pitchFamily="18" charset="0"/>
-                                      <a:ea typeface="SimSun" panose="02010600030101010101" pitchFamily="2" charset="-122"/>
-                                    </a:rPr>
-                                  </m:ctrlPr>
-                                </m:dPr>
-                                <m:e>
-                                  <m:f>
-                                    <m:fPr>
-                                      <m:ctrlPr>
-                                        <a:rPr lang="ru-RU" sz="1800" i="1">
-                                          <a:effectLst/>
-                                          <a:latin typeface="Cambria Math" panose="02040503050406030204" pitchFamily="18" charset="0"/>
-                                          <a:ea typeface="SimSun" panose="02010600030101010101" pitchFamily="2" charset="-122"/>
-                                        </a:rPr>
-                                      </m:ctrlPr>
-                                    </m:fPr>
-                                    <m:num>
-                                      <m:r>
-                                        <a:rPr lang="ru-RU" sz="1800" i="1">
-                                          <a:effectLst/>
-                                          <a:latin typeface="Cambria Math" panose="02040503050406030204" pitchFamily="18" charset="0"/>
-                                          <a:ea typeface="SimSun" panose="02010600030101010101" pitchFamily="2" charset="-122"/>
-                                        </a:rPr>
-                                        <m:t>𝜕</m:t>
-                                      </m:r>
-                                      <m:r>
-                                        <m:rPr>
-                                          <m:sty m:val="p"/>
-                                        </m:rPr>
-                                        <a:rPr lang="ru-RU" sz="1800">
-                                          <a:effectLst/>
-                                          <a:latin typeface="Cambria Math" panose="02040503050406030204" pitchFamily="18" charset="0"/>
-                                          <a:ea typeface="SimSun" panose="02010600030101010101" pitchFamily="2" charset="-122"/>
-                                        </a:rPr>
-                                        <m:t>ln</m:t>
-                                      </m:r>
-                                      <m:r>
-                                        <a:rPr lang="ru-RU" sz="1800">
-                                          <a:effectLst/>
-                                          <a:latin typeface="Cambria Math" panose="02040503050406030204" pitchFamily="18" charset="0"/>
-                                          <a:ea typeface="SimSun" panose="02010600030101010101" pitchFamily="2" charset="-122"/>
-                                        </a:rPr>
-                                        <m:t>⁡</m:t>
-                                      </m:r>
-                                      <m:r>
-                                        <a:rPr lang="ru-RU" sz="1800" i="1">
-                                          <a:effectLst/>
-                                          <a:latin typeface="Cambria Math" panose="02040503050406030204" pitchFamily="18" charset="0"/>
-                                          <a:ea typeface="SimSun" panose="02010600030101010101" pitchFamily="2" charset="-122"/>
-                                        </a:rPr>
-                                        <m:t>(</m:t>
-                                      </m:r>
-                                      <m:sSub>
-                                        <m:sSubPr>
-                                          <m:ctrlPr>
-                                            <a:rPr lang="ru-RU" sz="1800" i="1">
-                                              <a:effectLst/>
-                                              <a:latin typeface="Cambria Math" panose="02040503050406030204" pitchFamily="18" charset="0"/>
-                                              <a:ea typeface="SimSun" panose="02010600030101010101" pitchFamily="2" charset="-122"/>
-                                            </a:rPr>
-                                          </m:ctrlPr>
-                                        </m:sSubPr>
-                                        <m:e>
-                                          <m:r>
-                                            <a:rPr lang="ru-RU" sz="1800" i="1">
-                                              <a:effectLst/>
-                                              <a:latin typeface="Cambria Math" panose="02040503050406030204" pitchFamily="18" charset="0"/>
-                                              <a:ea typeface="SimSun" panose="02010600030101010101" pitchFamily="2" charset="-122"/>
-                                            </a:rPr>
-                                            <m:t>𝐽</m:t>
-                                          </m:r>
-                                        </m:e>
-                                        <m:sub>
-                                          <m:r>
-                                            <a:rPr lang="ru-RU" sz="1800" i="1">
-                                              <a:effectLst/>
-                                              <a:latin typeface="Cambria Math" panose="02040503050406030204" pitchFamily="18" charset="0"/>
-                                              <a:ea typeface="SimSun" panose="02010600030101010101" pitchFamily="2" charset="-122"/>
-                                            </a:rPr>
-                                            <m:t>𝑖</m:t>
-                                          </m:r>
-                                        </m:sub>
-                                      </m:sSub>
-                                      <m:r>
-                                        <a:rPr lang="ru-RU" sz="1800" i="1">
-                                          <a:effectLst/>
-                                          <a:latin typeface="Cambria Math" panose="02040503050406030204" pitchFamily="18" charset="0"/>
-                                          <a:ea typeface="SimSun" panose="02010600030101010101" pitchFamily="2" charset="-122"/>
-                                        </a:rPr>
-                                        <m:t>)</m:t>
-                                      </m:r>
-                                    </m:num>
-                                    <m:den>
-                                      <m:r>
-                                        <a:rPr lang="ru-RU" sz="1800" i="1">
-                                          <a:effectLst/>
-                                          <a:latin typeface="Cambria Math" panose="02040503050406030204" pitchFamily="18" charset="0"/>
-                                          <a:ea typeface="SimSun" panose="02010600030101010101" pitchFamily="2" charset="-122"/>
-                                        </a:rPr>
-                                        <m:t>𝜕</m:t>
-                                      </m:r>
-                                      <m:sSub>
-                                        <m:sSubPr>
-                                          <m:ctrlPr>
-                                            <a:rPr lang="ru-RU" sz="1800" i="1">
-                                              <a:effectLst/>
-                                              <a:latin typeface="Cambria Math" panose="02040503050406030204" pitchFamily="18" charset="0"/>
-                                              <a:ea typeface="SimSun" panose="02010600030101010101" pitchFamily="2" charset="-122"/>
-                                            </a:rPr>
-                                          </m:ctrlPr>
-                                        </m:sSubPr>
-                                        <m:e>
-                                          <m:r>
-                                            <a:rPr lang="ru-RU" sz="1800" i="1">
-                                              <a:effectLst/>
-                                              <a:latin typeface="Cambria Math" panose="02040503050406030204" pitchFamily="18" charset="0"/>
-                                              <a:ea typeface="SimSun" panose="02010600030101010101" pitchFamily="2" charset="-122"/>
-                                            </a:rPr>
-                                            <m:t>𝑟</m:t>
-                                          </m:r>
-                                        </m:e>
-                                        <m:sub>
-                                          <m:r>
-                                            <a:rPr lang="ru-RU" sz="1800" i="1">
-                                              <a:effectLst/>
-                                              <a:latin typeface="Cambria Math" panose="02040503050406030204" pitchFamily="18" charset="0"/>
-                                              <a:ea typeface="SimSun" panose="02010600030101010101" pitchFamily="2" charset="-122"/>
-                                            </a:rPr>
-                                            <m:t>𝑖</m:t>
-                                          </m:r>
-                                        </m:sub>
-                                      </m:sSub>
-                                    </m:den>
-                                  </m:f>
-                                  <m:r>
-                                    <a:rPr lang="ru-RU" sz="1800" i="1">
-                                      <a:effectLst/>
-                                      <a:latin typeface="Cambria Math" panose="02040503050406030204" pitchFamily="18" charset="0"/>
-                                      <a:ea typeface="SimSun" panose="02010600030101010101" pitchFamily="2" charset="-122"/>
-                                    </a:rPr>
-                                    <m:t>∆</m:t>
-                                  </m:r>
-                                  <m:r>
-                                    <a:rPr lang="ru-RU" sz="1800" i="1">
-                                      <a:effectLst/>
-                                      <a:latin typeface="Cambria Math" panose="02040503050406030204" pitchFamily="18" charset="0"/>
-                                      <a:ea typeface="SimSun" panose="02010600030101010101" pitchFamily="2" charset="-122"/>
-                                    </a:rPr>
-                                    <m:t>𝑟</m:t>
-                                  </m:r>
-                                </m:e>
-                              </m:d>
-                            </m:e>
-                            <m:sup>
-                              <m:r>
-                                <a:rPr lang="ru-RU" sz="1800" i="1">
-                                  <a:effectLst/>
-                                  <a:latin typeface="Cambria Math" panose="02040503050406030204" pitchFamily="18" charset="0"/>
-                                  <a:ea typeface="SimSun" panose="02010600030101010101" pitchFamily="2" charset="-122"/>
-                                </a:rPr>
-                                <m:t>2</m:t>
-                              </m:r>
-                            </m:sup>
-                          </m:sSup>
-                        </m:e>
-                      </m:rad>
-                    </m:oMath>
-                  </m:oMathPara>
-                </a14:m>
-                <a:endParaRPr lang="ru-RU" sz="1800" dirty="0">
-                  <a:effectLst/>
-                  <a:latin typeface="Times New Roman" panose="02020603050405020304" pitchFamily="18" charset="0"/>
-                  <a:ea typeface="SimSun" panose="02010600030101010101" pitchFamily="2" charset="-122"/>
-                </a:endParaRPr>
-              </a:p>
-            </p:txBody>
-          </p:sp>
-        </mc:Choice>
-        <mc:Fallback>
-          <p:sp>
-            <p:nvSpPr>
-              <p:cNvPr id="14" name="TextBox 13">
-                <a:extLst>
-                  <a:ext uri="{FF2B5EF4-FFF2-40B4-BE49-F238E27FC236}">
-                    <a16:creationId xmlns:a16="http://schemas.microsoft.com/office/drawing/2014/main" id="{FD5CE986-D61E-44F6-99D5-3DA81B507ACD}"/>
-                  </a:ext>
-                </a:extLst>
-              </p:cNvPr>
-              <p:cNvSpPr txBox="1">
-                <a:spLocks noRot="1" noChangeAspect="1" noMove="1" noResize="1" noEditPoints="1" noAdjustHandles="1" noChangeArrowheads="1" noChangeShapeType="1" noTextEdit="1"/>
-              </p:cNvSpPr>
-              <p:nvPr/>
-            </p:nvSpPr>
-            <p:spPr>
-              <a:xfrm>
-                <a:off x="97523" y="4438552"/>
-                <a:ext cx="5677524" cy="1735411"/>
-              </a:xfrm>
-              <a:prstGeom prst="rect">
-                <a:avLst/>
-              </a:prstGeom>
-              <a:blipFill>
-                <a:blip r:embed="rId2"/>
-                <a:stretch>
-                  <a:fillRect l="-967"/>
-                </a:stretch>
-              </a:blipFill>
-            </p:spPr>
-            <p:txBody>
-              <a:bodyPr/>
-              <a:lstStyle/>
-              <a:p>
-                <a:r>
-                  <a:rPr lang="ru-RU">
-                    <a:noFill/>
-                  </a:rPr>
-                  <a:t> </a:t>
-                </a:r>
-              </a:p>
-            </p:txBody>
-          </p:sp>
-        </mc:Fallback>
-      </mc:AlternateContent>
-      <mc:AlternateContent xmlns:mc="http://schemas.openxmlformats.org/markup-compatibility/2006">
-        <mc:Choice xmlns:a14="http://schemas.microsoft.com/office/drawing/2010/main" Requires="a14">
-          <p:sp>
-            <p:nvSpPr>
-              <p:cNvPr id="15" name="TextBox 14">
-                <a:extLst>
-                  <a:ext uri="{FF2B5EF4-FFF2-40B4-BE49-F238E27FC236}">
-                    <a16:creationId xmlns:a16="http://schemas.microsoft.com/office/drawing/2014/main" id="{C56A41B1-1177-44A3-8AD3-CD3EA2C2983E}"/>
-                  </a:ext>
-                </a:extLst>
-              </p:cNvPr>
-              <p:cNvSpPr txBox="1"/>
-              <p:nvPr/>
-            </p:nvSpPr>
-            <p:spPr>
-              <a:xfrm>
-                <a:off x="2759700" y="6322484"/>
-                <a:ext cx="6190128" cy="375552"/>
-              </a:xfrm>
-              <a:prstGeom prst="rect">
-                <a:avLst/>
-              </a:prstGeom>
-              <a:noFill/>
-            </p:spPr>
-            <p:txBody>
-              <a:bodyPr wrap="square">
-                <a:spAutoFit/>
-              </a:bodyPr>
-              <a:lstStyle/>
-              <a:p>
+                <a:pPr/>
                 <a14:m>
                   <m:oMathPara xmlns:m="http://schemas.openxmlformats.org/officeDocument/2006/math">
                     <m:oMathParaPr>
@@ -9222,7 +10960,7 @@
                         <a:rPr lang="en-US" b="1" i="1" smtClean="0">
                           <a:latin typeface="Cambria Math" panose="02040503050406030204" pitchFamily="18" charset="0"/>
                         </a:rPr>
-                        <m:t>𝑱</m:t>
+                        <m:t>𝑴</m:t>
                       </m:r>
                       <m:r>
                         <a:rPr lang="en-US" b="1" i="1" smtClean="0">
@@ -9234,7 +10972,7 @@
                         <a:rPr lang="en-US" b="1" i="1" smtClean="0">
                           <a:latin typeface="Cambria Math" panose="02040503050406030204" pitchFamily="18" charset="0"/>
                         </a:rPr>
-                        <m:t>𝟐</m:t>
+                        <m:t>𝟎</m:t>
                       </m:r>
                       <m:r>
                         <a:rPr lang="en-US" b="1" i="1" smtClean="0">
@@ -9246,7 +10984,34 @@
                         <a:rPr lang="en-US" b="1" i="1" smtClean="0">
                           <a:latin typeface="Cambria Math" panose="02040503050406030204" pitchFamily="18" charset="0"/>
                         </a:rPr>
-                        <m:t>𝟔𝟗</m:t>
+                        <m:t>𝟎𝟎𝟓</m:t>
+                      </m:r>
+                      <m:r>
+                        <a:rPr lang="en-US" b="1" i="1" smtClean="0">
+                          <a:latin typeface="Cambria Math" panose="02040503050406030204" pitchFamily="18" charset="0"/>
+                        </a:rPr>
+                        <m:t> ±</m:t>
+                      </m:r>
+                      <m:r>
+                        <a:rPr lang="en-US" b="1" i="1" smtClean="0">
+                          <a:latin typeface="Cambria Math" panose="02040503050406030204" pitchFamily="18" charset="0"/>
+                          <a:ea typeface="Cambria Math" panose="02040503050406030204" pitchFamily="18" charset="0"/>
+                        </a:rPr>
+                        <m:t>𝟕</m:t>
+                      </m:r>
+                      <m:r>
+                        <a:rPr lang="en-US" b="1" i="1" smtClean="0">
+                          <a:latin typeface="Cambria Math" panose="02040503050406030204" pitchFamily="18" charset="0"/>
+                          <a:ea typeface="Cambria Math" panose="02040503050406030204" pitchFamily="18" charset="0"/>
+                        </a:rPr>
+                        <m:t>.</m:t>
+                      </m:r>
+                      <m:r>
+                        <a:rPr lang="en-US" b="1" i="1" smtClean="0">
+                          <a:latin typeface="Cambria Math" panose="02040503050406030204" pitchFamily="18" charset="0"/>
+                          <a:ea typeface="Cambria Math" panose="02040503050406030204" pitchFamily="18" charset="0"/>
+                        </a:rPr>
+                        <m:t>𝟎𝟕</m:t>
                       </m:r>
                       <m:r>
                         <a:rPr lang="en-US" b="1" i="1" smtClean="0">
@@ -9279,14 +11044,7 @@
                               <a:latin typeface="Cambria Math" panose="02040503050406030204" pitchFamily="18" charset="0"/>
                               <a:ea typeface="Cambria Math" panose="02040503050406030204" pitchFamily="18" charset="0"/>
                             </a:rPr>
-                            <m:t>−</m:t>
-                          </m:r>
-                          <m:r>
-                            <a:rPr lang="en-US" b="1" i="1" smtClean="0">
-                              <a:latin typeface="Cambria Math" panose="02040503050406030204" pitchFamily="18" charset="0"/>
-                              <a:ea typeface="Cambria Math" panose="02040503050406030204" pitchFamily="18" charset="0"/>
-                            </a:rPr>
-                            <m:t>𝟒</m:t>
+                            <m:t>𝟓</m:t>
                           </m:r>
                         </m:sup>
                       </m:sSup>
@@ -9295,14 +11053,160 @@
                           <a:latin typeface="Cambria Math" panose="02040503050406030204" pitchFamily="18" charset="0"/>
                           <a:ea typeface="Cambria Math" panose="02040503050406030204" pitchFamily="18" charset="0"/>
                         </a:rPr>
-                        <m:t> ±</m:t>
+                        <m:t> </m:t>
+                      </m:r>
+                      <m:r>
+                        <a:rPr lang="ru-RU" b="1" i="1" smtClean="0">
+                          <a:latin typeface="Cambria Math" panose="02040503050406030204" pitchFamily="18" charset="0"/>
+                          <a:ea typeface="Cambria Math" panose="02040503050406030204" pitchFamily="18" charset="0"/>
+                        </a:rPr>
+                        <m:t>Н∙м</m:t>
+                      </m:r>
+                    </m:oMath>
+                  </m:oMathPara>
+                </a14:m>
+                <a:endParaRPr lang="ru-RU" b="1" dirty="0"/>
+              </a:p>
+              <a:p>
+                <a:pPr/>
+                <a14:m>
+                  <m:oMathPara xmlns:m="http://schemas.openxmlformats.org/officeDocument/2006/math">
+                    <m:oMathParaPr>
+                      <m:jc m:val="centerGroup"/>
+                    </m:oMathParaPr>
+                    <m:oMath xmlns:m="http://schemas.openxmlformats.org/officeDocument/2006/math">
+                      <m:r>
+                        <a:rPr lang="ru-RU" b="1" i="1" smtClean="0">
+                          <a:latin typeface="Cambria Math" panose="02040503050406030204" pitchFamily="18" charset="0"/>
+                          <a:ea typeface="Cambria Math" panose="02040503050406030204" pitchFamily="18" charset="0"/>
+                        </a:rPr>
+                        <m:t>𝜹</m:t>
                       </m:r>
                       <m:r>
                         <a:rPr lang="en-US" b="1" i="1" smtClean="0">
                           <a:latin typeface="Cambria Math" panose="02040503050406030204" pitchFamily="18" charset="0"/>
                           <a:ea typeface="Cambria Math" panose="02040503050406030204" pitchFamily="18" charset="0"/>
                         </a:rPr>
-                        <m:t>𝟒</m:t>
+                        <m:t>𝑴</m:t>
+                      </m:r>
+                      <m:r>
+                        <a:rPr lang="en-US" b="1" i="1" smtClean="0">
+                          <a:latin typeface="Cambria Math" panose="02040503050406030204" pitchFamily="18" charset="0"/>
+                          <a:ea typeface="Cambria Math" panose="02040503050406030204" pitchFamily="18" charset="0"/>
+                        </a:rPr>
+                        <m:t>= </m:t>
+                      </m:r>
+                      <m:f>
+                        <m:fPr>
+                          <m:ctrlPr>
+                            <a:rPr lang="en-US" b="1" i="1" smtClean="0">
+                              <a:latin typeface="Cambria Math" panose="02040503050406030204" pitchFamily="18" charset="0"/>
+                              <a:ea typeface="Cambria Math" panose="02040503050406030204" pitchFamily="18" charset="0"/>
+                            </a:rPr>
+                          </m:ctrlPr>
+                        </m:fPr>
+                        <m:num>
+                          <m:r>
+                            <a:rPr lang="en-US" b="1" i="1" smtClean="0">
+                              <a:latin typeface="Cambria Math" panose="02040503050406030204" pitchFamily="18" charset="0"/>
+                              <a:ea typeface="Cambria Math" panose="02040503050406030204" pitchFamily="18" charset="0"/>
+                            </a:rPr>
+                            <m:t>𝟕</m:t>
+                          </m:r>
+                          <m:r>
+                            <a:rPr lang="en-US" b="1" i="1" smtClean="0">
+                              <a:latin typeface="Cambria Math" panose="02040503050406030204" pitchFamily="18" charset="0"/>
+                              <a:ea typeface="Cambria Math" panose="02040503050406030204" pitchFamily="18" charset="0"/>
+                            </a:rPr>
+                            <m:t>,</m:t>
+                          </m:r>
+                          <m:r>
+                            <a:rPr lang="en-US" b="1" i="1" smtClean="0">
+                              <a:latin typeface="Cambria Math" panose="02040503050406030204" pitchFamily="18" charset="0"/>
+                              <a:ea typeface="Cambria Math" panose="02040503050406030204" pitchFamily="18" charset="0"/>
+                            </a:rPr>
+                            <m:t>𝟎𝟕</m:t>
+                          </m:r>
+                          <m:r>
+                            <a:rPr lang="en-US" b="1" i="1" smtClean="0">
+                              <a:latin typeface="Cambria Math" panose="02040503050406030204" pitchFamily="18" charset="0"/>
+                              <a:ea typeface="Cambria Math" panose="02040503050406030204" pitchFamily="18" charset="0"/>
+                            </a:rPr>
+                            <m:t>∙</m:t>
+                          </m:r>
+                          <m:sSup>
+                            <m:sSupPr>
+                              <m:ctrlPr>
+                                <a:rPr lang="en-US" b="1" i="1" smtClean="0">
+                                  <a:latin typeface="Cambria Math" panose="02040503050406030204" pitchFamily="18" charset="0"/>
+                                  <a:ea typeface="Cambria Math" panose="02040503050406030204" pitchFamily="18" charset="0"/>
+                                </a:rPr>
+                              </m:ctrlPr>
+                            </m:sSupPr>
+                            <m:e>
+                              <m:r>
+                                <a:rPr lang="en-US" b="1" i="1" smtClean="0">
+                                  <a:latin typeface="Cambria Math" panose="02040503050406030204" pitchFamily="18" charset="0"/>
+                                  <a:ea typeface="Cambria Math" panose="02040503050406030204" pitchFamily="18" charset="0"/>
+                                </a:rPr>
+                                <m:t>𝟏𝟎</m:t>
+                              </m:r>
+                            </m:e>
+                            <m:sup>
+                              <m:r>
+                                <a:rPr lang="en-US" b="1" i="1" smtClean="0">
+                                  <a:latin typeface="Cambria Math" panose="02040503050406030204" pitchFamily="18" charset="0"/>
+                                  <a:ea typeface="Cambria Math" panose="02040503050406030204" pitchFamily="18" charset="0"/>
+                                </a:rPr>
+                                <m:t>−</m:t>
+                              </m:r>
+                              <m:r>
+                                <a:rPr lang="en-US" b="1" i="1" smtClean="0">
+                                  <a:latin typeface="Cambria Math" panose="02040503050406030204" pitchFamily="18" charset="0"/>
+                                  <a:ea typeface="Cambria Math" panose="02040503050406030204" pitchFamily="18" charset="0"/>
+                                </a:rPr>
+                                <m:t>𝟓</m:t>
+                              </m:r>
+                            </m:sup>
+                          </m:sSup>
+                        </m:num>
+                        <m:den>
+                          <m:r>
+                            <a:rPr lang="en-US" b="1" i="1" smtClean="0">
+                              <a:latin typeface="Cambria Math" panose="02040503050406030204" pitchFamily="18" charset="0"/>
+                              <a:ea typeface="Cambria Math" panose="02040503050406030204" pitchFamily="18" charset="0"/>
+                            </a:rPr>
+                            <m:t>𝟎</m:t>
+                          </m:r>
+                          <m:r>
+                            <a:rPr lang="en-US" b="1" i="1" smtClean="0">
+                              <a:latin typeface="Cambria Math" panose="02040503050406030204" pitchFamily="18" charset="0"/>
+                              <a:ea typeface="Cambria Math" panose="02040503050406030204" pitchFamily="18" charset="0"/>
+                            </a:rPr>
+                            <m:t>,</m:t>
+                          </m:r>
+                          <m:r>
+                            <a:rPr lang="en-US" b="1" i="1" smtClean="0">
+                              <a:latin typeface="Cambria Math" panose="02040503050406030204" pitchFamily="18" charset="0"/>
+                              <a:ea typeface="Cambria Math" panose="02040503050406030204" pitchFamily="18" charset="0"/>
+                            </a:rPr>
+                            <m:t>𝟎𝟎𝟓</m:t>
+                          </m:r>
+                        </m:den>
+                      </m:f>
+                      <m:r>
+                        <a:rPr lang="en-US" b="1" i="1" smtClean="0">
+                          <a:latin typeface="Cambria Math" panose="02040503050406030204" pitchFamily="18" charset="0"/>
+                          <a:ea typeface="Cambria Math" panose="02040503050406030204" pitchFamily="18" charset="0"/>
+                        </a:rPr>
+                        <m:t> ≈</m:t>
+                      </m:r>
+                      <m:r>
+                        <a:rPr lang="en-US" b="1" i="1" smtClean="0">
+                          <a:latin typeface="Cambria Math" panose="02040503050406030204" pitchFamily="18" charset="0"/>
+                          <a:ea typeface="Cambria Math" panose="02040503050406030204" pitchFamily="18" charset="0"/>
+                        </a:rPr>
+                        <m:t>𝟏</m:t>
                       </m:r>
                       <m:r>
                         <a:rPr lang="en-US" b="1" i="1" smtClean="0">
@@ -9316,99 +11220,15 @@
                           <a:latin typeface="Cambria Math" panose="02040503050406030204" pitchFamily="18" charset="0"/>
                           <a:ea typeface="Cambria Math" panose="02040503050406030204" pitchFamily="18" charset="0"/>
                         </a:rPr>
-                        <m:t>𝟓𝟖</m:t>
+                        <m:t>𝟓</m:t>
                       </m:r>
                       <m:r>
                         <a:rPr lang="en-US" b="1" i="1" smtClean="0">
                           <a:latin typeface="Cambria Math" panose="02040503050406030204" pitchFamily="18" charset="0"/>
                           <a:ea typeface="Cambria Math" panose="02040503050406030204" pitchFamily="18" charset="0"/>
                         </a:rPr>
-                        <m:t>∙</m:t>
+                        <m:t> %</m:t>
                       </m:r>
-                      <m:sSup>
-                        <m:sSupPr>
-                          <m:ctrlPr>
-                            <a:rPr lang="en-US" b="1" i="1" smtClean="0">
-                              <a:latin typeface="Cambria Math" panose="02040503050406030204" pitchFamily="18" charset="0"/>
-                              <a:ea typeface="Cambria Math" panose="02040503050406030204" pitchFamily="18" charset="0"/>
-                            </a:rPr>
-                          </m:ctrlPr>
-                        </m:sSupPr>
-                        <m:e>
-                          <m:r>
-                            <a:rPr lang="en-US" b="1" i="1" smtClean="0">
-                              <a:latin typeface="Cambria Math" panose="02040503050406030204" pitchFamily="18" charset="0"/>
-                              <a:ea typeface="Cambria Math" panose="02040503050406030204" pitchFamily="18" charset="0"/>
-                            </a:rPr>
-                            <m:t>𝟏𝟎</m:t>
-                          </m:r>
-                        </m:e>
-                        <m:sup>
-                          <m:r>
-                            <a:rPr lang="en-US" b="1" i="1" smtClean="0">
-                              <a:latin typeface="Cambria Math" panose="02040503050406030204" pitchFamily="18" charset="0"/>
-                              <a:ea typeface="Cambria Math" panose="02040503050406030204" pitchFamily="18" charset="0"/>
-                            </a:rPr>
-                            <m:t>−</m:t>
-                          </m:r>
-                          <m:r>
-                            <a:rPr lang="en-US" b="1" i="1" smtClean="0">
-                              <a:latin typeface="Cambria Math" panose="02040503050406030204" pitchFamily="18" charset="0"/>
-                              <a:ea typeface="Cambria Math" panose="02040503050406030204" pitchFamily="18" charset="0"/>
-                            </a:rPr>
-                            <m:t>𝟕</m:t>
-                          </m:r>
-                        </m:sup>
-                      </m:sSup>
-                      <m:r>
-                        <a:rPr lang="en-US" b="1" i="1" smtClean="0">
-                          <a:latin typeface="Cambria Math" panose="02040503050406030204" pitchFamily="18" charset="0"/>
-                          <a:ea typeface="Cambria Math" panose="02040503050406030204" pitchFamily="18" charset="0"/>
-                        </a:rPr>
-                        <m:t> </m:t>
-                      </m:r>
-                      <m:r>
-                        <a:rPr lang="ru-RU" b="1" i="0" smtClean="0">
-                          <a:latin typeface="Cambria Math" panose="02040503050406030204" pitchFamily="18" charset="0"/>
-                          <a:ea typeface="Cambria Math" panose="02040503050406030204" pitchFamily="18" charset="0"/>
-                        </a:rPr>
-                        <m:t>кг</m:t>
-                      </m:r>
-                      <m:r>
-                        <a:rPr lang="ru-RU" b="1" i="1" smtClean="0">
-                          <a:latin typeface="Cambria Math" panose="02040503050406030204" pitchFamily="18" charset="0"/>
-                          <a:ea typeface="Cambria Math" panose="02040503050406030204" pitchFamily="18" charset="0"/>
-                        </a:rPr>
-                        <m:t>∙</m:t>
-                      </m:r>
-                      <m:sSup>
-                        <m:sSupPr>
-                          <m:ctrlPr>
-                            <a:rPr lang="ru-RU" b="1" i="1" smtClean="0">
-                              <a:latin typeface="Cambria Math" panose="02040503050406030204" pitchFamily="18" charset="0"/>
-                              <a:ea typeface="Cambria Math" panose="02040503050406030204" pitchFamily="18" charset="0"/>
-                            </a:rPr>
-                          </m:ctrlPr>
-                        </m:sSupPr>
-                        <m:e>
-                          <m:r>
-                            <a:rPr lang="ru-RU" b="1" i="1" smtClean="0">
-                              <a:latin typeface="Cambria Math" panose="02040503050406030204" pitchFamily="18" charset="0"/>
-                              <a:ea typeface="Cambria Math" panose="02040503050406030204" pitchFamily="18" charset="0"/>
-                            </a:rPr>
-                            <m:t>м</m:t>
-                          </m:r>
-                        </m:e>
-                        <m:sup>
-                          <m:r>
-                            <a:rPr lang="ru-RU" b="1" i="1" smtClean="0">
-                              <a:latin typeface="Cambria Math" panose="02040503050406030204" pitchFamily="18" charset="0"/>
-                              <a:ea typeface="Cambria Math" panose="02040503050406030204" pitchFamily="18" charset="0"/>
-                            </a:rPr>
-                            <m:t>𝟐</m:t>
-                          </m:r>
-                        </m:sup>
-                      </m:sSup>
                     </m:oMath>
                   </m:oMathPara>
                 </a14:m>
@@ -9420,10 +11240,10 @@
         <mc:Fallback>
           <p:sp>
             <p:nvSpPr>
-              <p:cNvPr id="15" name="TextBox 14">
+              <p:cNvPr id="10" name="TextBox 9">
                 <a:extLst>
                   <a:ext uri="{FF2B5EF4-FFF2-40B4-BE49-F238E27FC236}">
-                    <a16:creationId xmlns:a16="http://schemas.microsoft.com/office/drawing/2014/main" id="{C56A41B1-1177-44A3-8AD3-CD3EA2C2983E}"/>
+                    <a16:creationId xmlns:a16="http://schemas.microsoft.com/office/drawing/2014/main" id="{E77CC1F7-E166-4CE6-BB8B-5EB930DA1169}"/>
                   </a:ext>
                 </a:extLst>
               </p:cNvPr>
@@ -9434,8 +11254,8 @@
             </p:nvSpPr>
             <p:spPr>
               <a:xfrm>
-                <a:off x="2759700" y="6322484"/>
-                <a:ext cx="6190128" cy="375552"/>
+                <a:off x="2763715" y="4982326"/>
+                <a:ext cx="6190128" cy="975908"/>
               </a:xfrm>
               <a:prstGeom prst="rect">
                 <a:avLst/>
@@ -9443,7 +11263,7 @@
               <a:blipFill>
                 <a:blip r:embed="rId3"/>
                 <a:stretch>
-                  <a:fillRect b="-9677"/>
+                  <a:fillRect/>
                 </a:stretch>
               </a:blipFill>
             </p:spPr>
@@ -9452,7 +11272,7 @@
               <a:lstStyle/>
               <a:p>
                 <a:r>
-                  <a:rPr lang="ru-RU">
+                  <a:rPr lang="en-US">
                     <a:noFill/>
                   </a:rPr>
                   <a:t> </a:t>
@@ -9465,7 +11285,7 @@
     </p:spTree>
     <p:extLst>
       <p:ext uri="{BB962C8B-B14F-4D97-AF65-F5344CB8AC3E}">
-        <p14:creationId xmlns:p14="http://schemas.microsoft.com/office/powerpoint/2010/main" val="841034221"/>
+        <p14:creationId xmlns:p14="http://schemas.microsoft.com/office/powerpoint/2010/main" val="2195243119"/>
       </p:ext>
     </p:extLst>
   </p:cSld>
@@ -9475,7 +11295,7 @@
 </p:sld>
 </file>
 
-<file path=ppt/slides/slide7.xml><?xml version="1.0" encoding="utf-8"?>
+<file path=ppt/slides/slide9.xml><?xml version="1.0" encoding="utf-8"?>
 <p:sld xmlns:a="http://schemas.openxmlformats.org/drawingml/2006/main" xmlns:r="http://schemas.openxmlformats.org/officeDocument/2006/relationships" xmlns:p="http://schemas.openxmlformats.org/presentationml/2006/main">
   <p:cSld>
     <p:spTree>
@@ -9509,7 +11329,7 @@
           <a:p>
             <a:fld id="{1F8BD534-37C6-45AF-BD63-E8CFF4C8D25C}" type="slidenum">
               <a:rPr lang="en-US" smtClean="0"/>
-              <a:t>7</a:t>
+              <a:t>9</a:t>
             </a:fld>
             <a:endParaRPr lang="en-US"/>
           </a:p>
@@ -9870,843 +11690,6 @@
     <p:extLst>
       <p:ext uri="{BB962C8B-B14F-4D97-AF65-F5344CB8AC3E}">
         <p14:creationId xmlns:p14="http://schemas.microsoft.com/office/powerpoint/2010/main" val="1363180178"/>
-      </p:ext>
-    </p:extLst>
-  </p:cSld>
-  <p:clrMapOvr>
-    <a:masterClrMapping/>
-  </p:clrMapOvr>
-</p:sld>
-</file>
-
-<file path=ppt/slides/slide8.xml><?xml version="1.0" encoding="utf-8"?>
-<p:sld xmlns:a="http://schemas.openxmlformats.org/drawingml/2006/main" xmlns:r="http://schemas.openxmlformats.org/officeDocument/2006/relationships" xmlns:p="http://schemas.openxmlformats.org/presentationml/2006/main">
-  <p:cSld>
-    <p:spTree>
-      <p:nvGrpSpPr>
-        <p:cNvPr id="1" name=""/>
-        <p:cNvGrpSpPr/>
-        <p:nvPr/>
-      </p:nvGrpSpPr>
-      <p:grpSpPr>
-        <a:xfrm>
-          <a:off x="0" y="0"/>
-          <a:ext cx="0" cy="0"/>
-          <a:chOff x="0" y="0"/>
-          <a:chExt cx="0" cy="0"/>
-        </a:xfrm>
-      </p:grpSpPr>
-      <p:sp>
-        <p:nvSpPr>
-          <p:cNvPr id="4" name="Slide Number Placeholder 3">
-            <a:extLst>
-              <a:ext uri="{FF2B5EF4-FFF2-40B4-BE49-F238E27FC236}">
-                <a16:creationId xmlns:a16="http://schemas.microsoft.com/office/drawing/2014/main" id="{356807AF-B532-44F6-A3C5-779F1176F644}"/>
-              </a:ext>
-            </a:extLst>
-          </p:cNvPr>
-          <p:cNvSpPr>
-            <a:spLocks noGrp="1"/>
-          </p:cNvSpPr>
-          <p:nvPr>
-            <p:ph type="sldNum" sz="quarter" idx="12"/>
-          </p:nvPr>
-        </p:nvSpPr>
-        <p:spPr/>
-        <p:txBody>
-          <a:bodyPr/>
-          <a:lstStyle/>
-          <a:p>
-            <a:fld id="{1F8BD534-37C6-45AF-BD63-E8CFF4C8D25C}" type="slidenum">
-              <a:rPr lang="en-US" smtClean="0"/>
-              <a:t>8</a:t>
-            </a:fld>
-            <a:endParaRPr lang="en-US"/>
-          </a:p>
-        </p:txBody>
-      </p:sp>
-      <p:sp>
-        <p:nvSpPr>
-          <p:cNvPr id="5" name="TextBox 4">
-            <a:extLst>
-              <a:ext uri="{FF2B5EF4-FFF2-40B4-BE49-F238E27FC236}">
-                <a16:creationId xmlns:a16="http://schemas.microsoft.com/office/drawing/2014/main" id="{E2F314B4-3CCB-44D2-AF5F-B866DD7E5345}"/>
-              </a:ext>
-            </a:extLst>
-          </p:cNvPr>
-          <p:cNvSpPr txBox="1"/>
-          <p:nvPr/>
-        </p:nvSpPr>
-        <p:spPr>
-          <a:xfrm>
-            <a:off x="245214" y="796304"/>
-            <a:ext cx="11384715" cy="646331"/>
-          </a:xfrm>
-          <a:prstGeom prst="rect">
-            <a:avLst/>
-          </a:prstGeom>
-          <a:noFill/>
-        </p:spPr>
-        <p:txBody>
-          <a:bodyPr wrap="square">
-            <a:spAutoFit/>
-          </a:bodyPr>
-          <a:lstStyle/>
-          <a:p>
-            <a:pPr algn="just"/>
-            <a:r>
-              <a:rPr lang="ru-RU" dirty="0">
-                <a:latin typeface="+mj-lt"/>
-              </a:rPr>
-              <a:t>Итоговый момент определяется как отношение ускорений рамы при перенацеливании и при тестовом воздействии</a:t>
-            </a:r>
-          </a:p>
-        </p:txBody>
-      </p:sp>
-      <p:sp>
-        <p:nvSpPr>
-          <p:cNvPr id="6" name="TextBox 5">
-            <a:extLst>
-              <a:ext uri="{FF2B5EF4-FFF2-40B4-BE49-F238E27FC236}">
-                <a16:creationId xmlns:a16="http://schemas.microsoft.com/office/drawing/2014/main" id="{339AB545-3535-4DD5-A63E-4232D3ED4C5B}"/>
-              </a:ext>
-            </a:extLst>
-          </p:cNvPr>
-          <p:cNvSpPr txBox="1"/>
-          <p:nvPr/>
-        </p:nvSpPr>
-        <p:spPr>
-          <a:xfrm>
-            <a:off x="0" y="-7506"/>
-            <a:ext cx="10633039" cy="646331"/>
-          </a:xfrm>
-          <a:prstGeom prst="rect">
-            <a:avLst/>
-          </a:prstGeom>
-          <a:noFill/>
-        </p:spPr>
-        <p:txBody>
-          <a:bodyPr wrap="none" rtlCol="0">
-            <a:spAutoFit/>
-          </a:bodyPr>
-          <a:lstStyle/>
-          <a:p>
-            <a:r>
-              <a:rPr lang="ru-RU" sz="3600" dirty="0">
-                <a:latin typeface="+mj-lt"/>
-              </a:rPr>
-              <a:t>Оценка момента на основание при перенацеливании</a:t>
-            </a:r>
-          </a:p>
-        </p:txBody>
-      </p:sp>
-      <mc:AlternateContent xmlns:mc="http://schemas.openxmlformats.org/markup-compatibility/2006" xmlns:a14="http://schemas.microsoft.com/office/drawing/2010/main">
-        <mc:Choice Requires="a14">
-          <p:sp>
-            <p:nvSpPr>
-              <p:cNvPr id="7" name="TextBox 6">
-                <a:extLst>
-                  <a:ext uri="{FF2B5EF4-FFF2-40B4-BE49-F238E27FC236}">
-                    <a16:creationId xmlns:a16="http://schemas.microsoft.com/office/drawing/2014/main" id="{426F59A3-387F-40BD-A3D9-ADE749A62E24}"/>
-                  </a:ext>
-                </a:extLst>
-              </p:cNvPr>
-              <p:cNvSpPr txBox="1"/>
-              <p:nvPr/>
-            </p:nvSpPr>
-            <p:spPr>
-              <a:xfrm>
-                <a:off x="403642" y="1600114"/>
-                <a:ext cx="11384715" cy="612475"/>
-              </a:xfrm>
-              <a:prstGeom prst="rect">
-                <a:avLst/>
-              </a:prstGeom>
-              <a:noFill/>
-            </p:spPr>
-            <p:txBody>
-              <a:bodyPr wrap="square">
-                <a:spAutoFit/>
-              </a:bodyPr>
-              <a:lstStyle/>
-              <a:p>
-                <a:pPr algn="just"/>
-                <a14:m>
-                  <m:oMathPara xmlns:m="http://schemas.openxmlformats.org/officeDocument/2006/math">
-                    <m:oMathParaPr>
-                      <m:jc m:val="centerGroup"/>
-                    </m:oMathParaPr>
-                    <m:oMath xmlns:m="http://schemas.openxmlformats.org/officeDocument/2006/math">
-                      <m:r>
-                        <a:rPr lang="en-US" b="0" i="1" smtClean="0">
-                          <a:latin typeface="Cambria Math" panose="02040503050406030204" pitchFamily="18" charset="0"/>
-                        </a:rPr>
-                        <m:t>𝑀</m:t>
-                      </m:r>
-                      <m:r>
-                        <a:rPr lang="en-US" b="0" i="1" smtClean="0">
-                          <a:latin typeface="Cambria Math" panose="02040503050406030204" pitchFamily="18" charset="0"/>
-                        </a:rPr>
-                        <m:t>=</m:t>
-                      </m:r>
-                      <m:f>
-                        <m:fPr>
-                          <m:ctrlPr>
-                            <a:rPr lang="en-US" b="0" i="1" smtClean="0">
-                              <a:latin typeface="Cambria Math" panose="02040503050406030204" pitchFamily="18" charset="0"/>
-                              <a:ea typeface="Cambria Math" panose="02040503050406030204" pitchFamily="18" charset="0"/>
-                            </a:rPr>
-                          </m:ctrlPr>
-                        </m:fPr>
-                        <m:num>
-                          <m:sSub>
-                            <m:sSubPr>
-                              <m:ctrlPr>
-                                <a:rPr lang="en-US" i="1" smtClean="0">
-                                  <a:latin typeface="Cambria Math" panose="02040503050406030204" pitchFamily="18" charset="0"/>
-                                  <a:ea typeface="Cambria Math" panose="02040503050406030204" pitchFamily="18" charset="0"/>
-                                </a:rPr>
-                              </m:ctrlPr>
-                            </m:sSubPr>
-                            <m:e>
-                              <m:r>
-                                <m:rPr>
-                                  <m:sty m:val="p"/>
-                                </m:rPr>
-                                <a:rPr lang="en-US" i="1">
-                                  <a:latin typeface="Cambria Math" panose="02040503050406030204" pitchFamily="18" charset="0"/>
-                                  <a:ea typeface="Cambria Math" panose="02040503050406030204" pitchFamily="18" charset="0"/>
-                                </a:rPr>
-                                <m:t>ε</m:t>
-                              </m:r>
-                            </m:e>
-                            <m:sub>
-                              <m:r>
-                                <a:rPr lang="ru-RU" b="0" i="1" smtClean="0">
-                                  <a:latin typeface="Cambria Math" panose="02040503050406030204" pitchFamily="18" charset="0"/>
-                                  <a:ea typeface="Cambria Math" panose="02040503050406030204" pitchFamily="18" charset="0"/>
-                                </a:rPr>
-                                <m:t>п</m:t>
-                              </m:r>
-                            </m:sub>
-                          </m:sSub>
-                        </m:num>
-                        <m:den>
-                          <m:sSub>
-                            <m:sSubPr>
-                              <m:ctrlPr>
-                                <a:rPr lang="en-US" i="1">
-                                  <a:latin typeface="Cambria Math" panose="02040503050406030204" pitchFamily="18" charset="0"/>
-                                  <a:ea typeface="Cambria Math" panose="02040503050406030204" pitchFamily="18" charset="0"/>
-                                </a:rPr>
-                              </m:ctrlPr>
-                            </m:sSubPr>
-                            <m:e>
-                              <m:r>
-                                <m:rPr>
-                                  <m:sty m:val="p"/>
-                                </m:rPr>
-                                <a:rPr lang="en-US" i="1">
-                                  <a:latin typeface="Cambria Math" panose="02040503050406030204" pitchFamily="18" charset="0"/>
-                                  <a:ea typeface="Cambria Math" panose="02040503050406030204" pitchFamily="18" charset="0"/>
-                                </a:rPr>
-                                <m:t>ε</m:t>
-                              </m:r>
-                            </m:e>
-                            <m:sub>
-                              <m:r>
-                                <a:rPr lang="ru-RU" b="0" i="1" smtClean="0">
-                                  <a:latin typeface="Cambria Math" panose="02040503050406030204" pitchFamily="18" charset="0"/>
-                                  <a:ea typeface="Cambria Math" panose="02040503050406030204" pitchFamily="18" charset="0"/>
-                                </a:rPr>
-                                <m:t>т</m:t>
-                              </m:r>
-                            </m:sub>
-                          </m:sSub>
-                        </m:den>
-                      </m:f>
-                      <m:r>
-                        <a:rPr lang="en-US" b="0" i="1" smtClean="0">
-                          <a:latin typeface="Cambria Math" panose="02040503050406030204" pitchFamily="18" charset="0"/>
-                          <a:ea typeface="Cambria Math" panose="02040503050406030204" pitchFamily="18" charset="0"/>
-                        </a:rPr>
-                        <m:t>∙</m:t>
-                      </m:r>
-                      <m:sSub>
-                        <m:sSubPr>
-                          <m:ctrlPr>
-                            <a:rPr lang="en-US" b="0" i="1" smtClean="0">
-                              <a:latin typeface="Cambria Math" panose="02040503050406030204" pitchFamily="18" charset="0"/>
-                              <a:ea typeface="Cambria Math" panose="02040503050406030204" pitchFamily="18" charset="0"/>
-                            </a:rPr>
-                          </m:ctrlPr>
-                        </m:sSubPr>
-                        <m:e>
-                          <m:r>
-                            <a:rPr lang="en-US" b="0" i="1" smtClean="0">
-                              <a:latin typeface="Cambria Math" panose="02040503050406030204" pitchFamily="18" charset="0"/>
-                              <a:ea typeface="Cambria Math" panose="02040503050406030204" pitchFamily="18" charset="0"/>
-                            </a:rPr>
-                            <m:t>𝑀</m:t>
-                          </m:r>
-                        </m:e>
-                        <m:sub>
-                          <m:r>
-                            <a:rPr lang="ru-RU" b="0" i="1" smtClean="0">
-                              <a:latin typeface="Cambria Math" panose="02040503050406030204" pitchFamily="18" charset="0"/>
-                              <a:ea typeface="Cambria Math" panose="02040503050406030204" pitchFamily="18" charset="0"/>
-                            </a:rPr>
-                            <m:t>т</m:t>
-                          </m:r>
-                        </m:sub>
-                      </m:sSub>
-                    </m:oMath>
-                  </m:oMathPara>
-                </a14:m>
-                <a:endParaRPr lang="ru-RU" dirty="0">
-                  <a:latin typeface="+mj-lt"/>
-                </a:endParaRPr>
-              </a:p>
-            </p:txBody>
-          </p:sp>
-        </mc:Choice>
-        <mc:Fallback xmlns="">
-          <p:sp>
-            <p:nvSpPr>
-              <p:cNvPr id="7" name="TextBox 6">
-                <a:extLst>
-                  <a:ext uri="{FF2B5EF4-FFF2-40B4-BE49-F238E27FC236}">
-                    <a16:creationId xmlns:a16="http://schemas.microsoft.com/office/drawing/2014/main" id="{426F59A3-387F-40BD-A3D9-ADE749A62E24}"/>
-                  </a:ext>
-                </a:extLst>
-              </p:cNvPr>
-              <p:cNvSpPr txBox="1">
-                <a:spLocks noRot="1" noChangeAspect="1" noMove="1" noResize="1" noEditPoints="1" noAdjustHandles="1" noChangeArrowheads="1" noChangeShapeType="1" noTextEdit="1"/>
-              </p:cNvSpPr>
-              <p:nvPr/>
-            </p:nvSpPr>
-            <p:spPr>
-              <a:xfrm>
-                <a:off x="403642" y="1600114"/>
-                <a:ext cx="11384715" cy="612475"/>
-              </a:xfrm>
-              <a:prstGeom prst="rect">
-                <a:avLst/>
-              </a:prstGeom>
-              <a:blipFill>
-                <a:blip r:embed="rId2"/>
-                <a:stretch>
-                  <a:fillRect/>
-                </a:stretch>
-              </a:blipFill>
-            </p:spPr>
-            <p:txBody>
-              <a:bodyPr/>
-              <a:lstStyle/>
-              <a:p>
-                <a:r>
-                  <a:rPr lang="en-US">
-                    <a:noFill/>
-                  </a:rPr>
-                  <a:t> </a:t>
-                </a:r>
-              </a:p>
-            </p:txBody>
-          </p:sp>
-        </mc:Fallback>
-      </mc:AlternateContent>
-      <mc:AlternateContent xmlns:mc="http://schemas.openxmlformats.org/markup-compatibility/2006" xmlns:a14="http://schemas.microsoft.com/office/drawing/2010/main">
-        <mc:Choice Requires="a14">
-          <p:sp>
-            <p:nvSpPr>
-              <p:cNvPr id="8" name="TextBox 7">
-                <a:extLst>
-                  <a:ext uri="{FF2B5EF4-FFF2-40B4-BE49-F238E27FC236}">
-                    <a16:creationId xmlns:a16="http://schemas.microsoft.com/office/drawing/2014/main" id="{654FEEA9-50CF-470D-ADDC-678036E55340}"/>
-                  </a:ext>
-                </a:extLst>
-              </p:cNvPr>
-              <p:cNvSpPr txBox="1"/>
-              <p:nvPr/>
-            </p:nvSpPr>
-            <p:spPr>
-              <a:xfrm>
-                <a:off x="403642" y="2212589"/>
-                <a:ext cx="11384715" cy="646331"/>
-              </a:xfrm>
-              <a:prstGeom prst="rect">
-                <a:avLst/>
-              </a:prstGeom>
-              <a:noFill/>
-            </p:spPr>
-            <p:txBody>
-              <a:bodyPr wrap="square">
-                <a:spAutoFit/>
-              </a:bodyPr>
-              <a:lstStyle/>
-              <a:p>
-                <a:pPr algn="just"/>
-                <a:r>
-                  <a:rPr lang="ru-RU" dirty="0">
-                    <a:latin typeface="+mj-lt"/>
-                  </a:rPr>
-                  <a:t>Где </a:t>
-                </a:r>
-                <a14:m>
-                  <m:oMath xmlns:m="http://schemas.openxmlformats.org/officeDocument/2006/math">
-                    <m:sSub>
-                      <m:sSubPr>
-                        <m:ctrlPr>
-                          <a:rPr lang="en-US" i="1" smtClean="0">
-                            <a:latin typeface="Cambria Math" panose="02040503050406030204" pitchFamily="18" charset="0"/>
-                            <a:ea typeface="Cambria Math" panose="02040503050406030204" pitchFamily="18" charset="0"/>
-                          </a:rPr>
-                        </m:ctrlPr>
-                      </m:sSubPr>
-                      <m:e>
-                        <m:r>
-                          <m:rPr>
-                            <m:sty m:val="p"/>
-                          </m:rPr>
-                          <a:rPr lang="en-US" i="1">
-                            <a:latin typeface="Cambria Math" panose="02040503050406030204" pitchFamily="18" charset="0"/>
-                            <a:ea typeface="Cambria Math" panose="02040503050406030204" pitchFamily="18" charset="0"/>
-                          </a:rPr>
-                          <m:t>ε</m:t>
-                        </m:r>
-                      </m:e>
-                      <m:sub>
-                        <m:r>
-                          <a:rPr lang="ru-RU" b="0" i="1" smtClean="0">
-                            <a:latin typeface="Cambria Math" panose="02040503050406030204" pitchFamily="18" charset="0"/>
-                            <a:ea typeface="Cambria Math" panose="02040503050406030204" pitchFamily="18" charset="0"/>
-                          </a:rPr>
-                          <m:t>п</m:t>
-                        </m:r>
-                      </m:sub>
-                    </m:sSub>
-                  </m:oMath>
-                </a14:m>
-                <a:r>
-                  <a:rPr lang="ru-RU" dirty="0">
-                    <a:latin typeface="+mj-lt"/>
-                  </a:rPr>
-                  <a:t> - ускорение рамы при перенацеливании</a:t>
-                </a:r>
-                <a:r>
-                  <a:rPr lang="en-US" dirty="0">
-                    <a:latin typeface="+mj-lt"/>
-                  </a:rPr>
-                  <a:t>; </a:t>
-                </a:r>
-                <a14:m>
-                  <m:oMath xmlns:m="http://schemas.openxmlformats.org/officeDocument/2006/math">
-                    <m:sSub>
-                      <m:sSubPr>
-                        <m:ctrlPr>
-                          <a:rPr lang="en-US" i="1">
-                            <a:latin typeface="Cambria Math" panose="02040503050406030204" pitchFamily="18" charset="0"/>
-                            <a:ea typeface="Cambria Math" panose="02040503050406030204" pitchFamily="18" charset="0"/>
-                          </a:rPr>
-                        </m:ctrlPr>
-                      </m:sSubPr>
-                      <m:e>
-                        <m:r>
-                          <m:rPr>
-                            <m:sty m:val="p"/>
-                          </m:rPr>
-                          <a:rPr lang="en-US" i="1">
-                            <a:latin typeface="Cambria Math" panose="02040503050406030204" pitchFamily="18" charset="0"/>
-                            <a:ea typeface="Cambria Math" panose="02040503050406030204" pitchFamily="18" charset="0"/>
-                          </a:rPr>
-                          <m:t>ε</m:t>
-                        </m:r>
-                      </m:e>
-                      <m:sub>
-                        <m:r>
-                          <a:rPr lang="ru-RU" i="1">
-                            <a:latin typeface="Cambria Math" panose="02040503050406030204" pitchFamily="18" charset="0"/>
-                            <a:ea typeface="Cambria Math" panose="02040503050406030204" pitchFamily="18" charset="0"/>
-                          </a:rPr>
-                          <m:t>т</m:t>
-                        </m:r>
-                      </m:sub>
-                    </m:sSub>
-                  </m:oMath>
-                </a14:m>
-                <a:r>
-                  <a:rPr lang="en-US" dirty="0">
-                    <a:latin typeface="+mj-lt"/>
-                  </a:rPr>
-                  <a:t> - </a:t>
-                </a:r>
-                <a:r>
-                  <a:rPr lang="ru-RU" dirty="0">
-                    <a:latin typeface="+mj-lt"/>
-                  </a:rPr>
-                  <a:t>ускорение рамы при тестовом воздействии</a:t>
-                </a:r>
-                <a:r>
-                  <a:rPr lang="en-US" dirty="0">
-                    <a:latin typeface="+mj-lt"/>
-                  </a:rPr>
-                  <a:t>; </a:t>
-                </a:r>
-                <a14:m>
-                  <m:oMath xmlns:m="http://schemas.openxmlformats.org/officeDocument/2006/math">
-                    <m:sSub>
-                      <m:sSubPr>
-                        <m:ctrlPr>
-                          <a:rPr lang="en-US" i="1">
-                            <a:latin typeface="Cambria Math" panose="02040503050406030204" pitchFamily="18" charset="0"/>
-                            <a:ea typeface="Cambria Math" panose="02040503050406030204" pitchFamily="18" charset="0"/>
-                          </a:rPr>
-                        </m:ctrlPr>
-                      </m:sSubPr>
-                      <m:e>
-                        <m:r>
-                          <a:rPr lang="en-US" i="1">
-                            <a:latin typeface="Cambria Math" panose="02040503050406030204" pitchFamily="18" charset="0"/>
-                            <a:ea typeface="Cambria Math" panose="02040503050406030204" pitchFamily="18" charset="0"/>
-                          </a:rPr>
-                          <m:t>𝑀</m:t>
-                        </m:r>
-                      </m:e>
-                      <m:sub>
-                        <m:r>
-                          <a:rPr lang="ru-RU" i="1">
-                            <a:latin typeface="Cambria Math" panose="02040503050406030204" pitchFamily="18" charset="0"/>
-                            <a:ea typeface="Cambria Math" panose="02040503050406030204" pitchFamily="18" charset="0"/>
-                          </a:rPr>
-                          <m:t>т</m:t>
-                        </m:r>
-                      </m:sub>
-                    </m:sSub>
-                  </m:oMath>
-                </a14:m>
-                <a:r>
-                  <a:rPr lang="en-US" dirty="0">
-                    <a:latin typeface="+mj-lt"/>
-                  </a:rPr>
-                  <a:t> - </a:t>
-                </a:r>
-                <a:r>
-                  <a:rPr lang="ru-RU" dirty="0">
-                    <a:latin typeface="+mj-lt"/>
-                  </a:rPr>
-                  <a:t>эталонный момент маховика, равный 0,005 </a:t>
-                </a:r>
-                <a:r>
-                  <a:rPr lang="ru-RU" dirty="0" err="1">
-                    <a:latin typeface="+mj-lt"/>
-                  </a:rPr>
-                  <a:t>Н·м</a:t>
-                </a:r>
-                <a:endParaRPr lang="ru-RU" dirty="0">
-                  <a:latin typeface="+mj-lt"/>
-                </a:endParaRPr>
-              </a:p>
-            </p:txBody>
-          </p:sp>
-        </mc:Choice>
-        <mc:Fallback xmlns="">
-          <p:sp>
-            <p:nvSpPr>
-              <p:cNvPr id="8" name="TextBox 7">
-                <a:extLst>
-                  <a:ext uri="{FF2B5EF4-FFF2-40B4-BE49-F238E27FC236}">
-                    <a16:creationId xmlns:a16="http://schemas.microsoft.com/office/drawing/2014/main" id="{654FEEA9-50CF-470D-ADDC-678036E55340}"/>
-                  </a:ext>
-                </a:extLst>
-              </p:cNvPr>
-              <p:cNvSpPr txBox="1">
-                <a:spLocks noRot="1" noChangeAspect="1" noMove="1" noResize="1" noEditPoints="1" noAdjustHandles="1" noChangeArrowheads="1" noChangeShapeType="1" noTextEdit="1"/>
-              </p:cNvSpPr>
-              <p:nvPr/>
-            </p:nvSpPr>
-            <p:spPr>
-              <a:xfrm>
-                <a:off x="403642" y="2212589"/>
-                <a:ext cx="11384715" cy="646331"/>
-              </a:xfrm>
-              <a:prstGeom prst="rect">
-                <a:avLst/>
-              </a:prstGeom>
-              <a:blipFill>
-                <a:blip r:embed="rId3"/>
-                <a:stretch>
-                  <a:fillRect l="-428" t="-5660" r="-482" b="-14151"/>
-                </a:stretch>
-              </a:blipFill>
-            </p:spPr>
-            <p:txBody>
-              <a:bodyPr/>
-              <a:lstStyle/>
-              <a:p>
-                <a:r>
-                  <a:rPr lang="en-US">
-                    <a:noFill/>
-                  </a:rPr>
-                  <a:t> </a:t>
-                </a:r>
-              </a:p>
-            </p:txBody>
-          </p:sp>
-        </mc:Fallback>
-      </mc:AlternateContent>
-      <p:pic>
-        <p:nvPicPr>
-          <p:cNvPr id="10" name="Picture 9">
-            <a:extLst>
-              <a:ext uri="{FF2B5EF4-FFF2-40B4-BE49-F238E27FC236}">
-                <a16:creationId xmlns:a16="http://schemas.microsoft.com/office/drawing/2014/main" id="{B2C75F8D-E74C-4D9C-92C1-1CD7F2374AE0}"/>
-              </a:ext>
-            </a:extLst>
-          </p:cNvPr>
-          <p:cNvPicPr>
-            <a:picLocks noChangeAspect="1"/>
-          </p:cNvPicPr>
-          <p:nvPr/>
-        </p:nvPicPr>
-        <p:blipFill>
-          <a:blip r:embed="rId4">
-            <a:extLst>
-              <a:ext uri="{28A0092B-C50C-407E-A947-70E740481C1C}">
-                <a14:useLocalDpi xmlns:a14="http://schemas.microsoft.com/office/drawing/2010/main" val="0"/>
-              </a:ext>
-            </a:extLst>
-          </a:blip>
-          <a:stretch>
-            <a:fillRect/>
-          </a:stretch>
-        </p:blipFill>
-        <p:spPr>
-          <a:xfrm>
-            <a:off x="3614549" y="2858920"/>
-            <a:ext cx="4646044" cy="3484533"/>
-          </a:xfrm>
-          <a:prstGeom prst="rect">
-            <a:avLst/>
-          </a:prstGeom>
-        </p:spPr>
-      </p:pic>
-      <p:sp>
-        <p:nvSpPr>
-          <p:cNvPr id="11" name="TextBox 10">
-            <a:extLst>
-              <a:ext uri="{FF2B5EF4-FFF2-40B4-BE49-F238E27FC236}">
-                <a16:creationId xmlns:a16="http://schemas.microsoft.com/office/drawing/2014/main" id="{ED50AAA5-A17C-414A-B679-854F62D0E264}"/>
-              </a:ext>
-            </a:extLst>
-          </p:cNvPr>
-          <p:cNvSpPr txBox="1"/>
-          <p:nvPr/>
-        </p:nvSpPr>
-        <p:spPr>
-          <a:xfrm>
-            <a:off x="3869267" y="6343453"/>
-            <a:ext cx="3964547" cy="338554"/>
-          </a:xfrm>
-          <a:prstGeom prst="rect">
-            <a:avLst/>
-          </a:prstGeom>
-          <a:noFill/>
-        </p:spPr>
-        <p:txBody>
-          <a:bodyPr wrap="none" rtlCol="0">
-            <a:spAutoFit/>
-          </a:bodyPr>
-          <a:lstStyle/>
-          <a:p>
-            <a:r>
-              <a:rPr lang="ru-RU" sz="1600" dirty="0">
-                <a:latin typeface="+mj-lt"/>
-              </a:rPr>
-              <a:t>Рисунок 8 – Нескомпенсированный момент</a:t>
-            </a:r>
-          </a:p>
-        </p:txBody>
-      </p:sp>
-    </p:spTree>
-    <p:extLst>
-      <p:ext uri="{BB962C8B-B14F-4D97-AF65-F5344CB8AC3E}">
-        <p14:creationId xmlns:p14="http://schemas.microsoft.com/office/powerpoint/2010/main" val="2969139650"/>
-      </p:ext>
-    </p:extLst>
-  </p:cSld>
-  <p:clrMapOvr>
-    <a:masterClrMapping/>
-  </p:clrMapOvr>
-</p:sld>
-</file>
-
-<file path=ppt/slides/slide9.xml><?xml version="1.0" encoding="utf-8"?>
-<p:sld xmlns:a="http://schemas.openxmlformats.org/drawingml/2006/main" xmlns:r="http://schemas.openxmlformats.org/officeDocument/2006/relationships" xmlns:p="http://schemas.openxmlformats.org/presentationml/2006/main">
-  <p:cSld>
-    <p:spTree>
-      <p:nvGrpSpPr>
-        <p:cNvPr id="1" name=""/>
-        <p:cNvGrpSpPr/>
-        <p:nvPr/>
-      </p:nvGrpSpPr>
-      <p:grpSpPr>
-        <a:xfrm>
-          <a:off x="0" y="0"/>
-          <a:ext cx="0" cy="0"/>
-          <a:chOff x="0" y="0"/>
-          <a:chExt cx="0" cy="0"/>
-        </a:xfrm>
-      </p:grpSpPr>
-      <p:sp>
-        <p:nvSpPr>
-          <p:cNvPr id="2" name="Номер слайда 1"/>
-          <p:cNvSpPr>
-            <a:spLocks noGrp="1"/>
-          </p:cNvSpPr>
-          <p:nvPr>
-            <p:ph type="sldNum" sz="quarter" idx="12"/>
-          </p:nvPr>
-        </p:nvSpPr>
-        <p:spPr/>
-        <p:txBody>
-          <a:bodyPr/>
-          <a:lstStyle/>
-          <a:p>
-            <a:fld id="{1F8BD534-37C6-45AF-BD63-E8CFF4C8D25C}" type="slidenum">
-              <a:rPr lang="en-US" smtClean="0"/>
-              <a:t>9</a:t>
-            </a:fld>
-            <a:endParaRPr lang="en-US"/>
-          </a:p>
-        </p:txBody>
-      </p:sp>
-      <p:sp>
-        <p:nvSpPr>
-          <p:cNvPr id="4" name="TextBox 3">
-            <a:extLst>
-              <a:ext uri="{FF2B5EF4-FFF2-40B4-BE49-F238E27FC236}">
-                <a16:creationId xmlns:a16="http://schemas.microsoft.com/office/drawing/2014/main" id="{EEEC72EE-784F-449E-A930-23808E09552E}"/>
-              </a:ext>
-            </a:extLst>
-          </p:cNvPr>
-          <p:cNvSpPr txBox="1"/>
-          <p:nvPr/>
-        </p:nvSpPr>
-        <p:spPr>
-          <a:xfrm>
-            <a:off x="0" y="-7506"/>
-            <a:ext cx="2537874" cy="646331"/>
-          </a:xfrm>
-          <a:prstGeom prst="rect">
-            <a:avLst/>
-          </a:prstGeom>
-          <a:noFill/>
-        </p:spPr>
-        <p:txBody>
-          <a:bodyPr wrap="none" rtlCol="0">
-            <a:spAutoFit/>
-          </a:bodyPr>
-          <a:lstStyle/>
-          <a:p>
-            <a:r>
-              <a:rPr lang="ru-RU" sz="3600" dirty="0">
-                <a:latin typeface="+mj-lt"/>
-              </a:rPr>
-              <a:t>Заключение</a:t>
-            </a:r>
-          </a:p>
-        </p:txBody>
-      </p:sp>
-      <p:sp>
-        <p:nvSpPr>
-          <p:cNvPr id="8" name="TextBox 7">
-            <a:extLst>
-              <a:ext uri="{FF2B5EF4-FFF2-40B4-BE49-F238E27FC236}">
-                <a16:creationId xmlns:a16="http://schemas.microsoft.com/office/drawing/2014/main" id="{DCA36B11-BA86-458D-B0D6-526644284586}"/>
-              </a:ext>
-            </a:extLst>
-          </p:cNvPr>
-          <p:cNvSpPr txBox="1"/>
-          <p:nvPr/>
-        </p:nvSpPr>
-        <p:spPr>
-          <a:xfrm>
-            <a:off x="219003" y="964081"/>
-            <a:ext cx="11384715" cy="1477328"/>
-          </a:xfrm>
-          <a:prstGeom prst="rect">
-            <a:avLst/>
-          </a:prstGeom>
-          <a:noFill/>
-        </p:spPr>
-        <p:txBody>
-          <a:bodyPr wrap="square">
-            <a:spAutoFit/>
-          </a:bodyPr>
-          <a:lstStyle/>
-          <a:p>
-            <a:pPr marL="285750" indent="-285750" algn="just">
-              <a:buFont typeface="Arial" panose="020B0604020202020204" pitchFamily="34" charset="0"/>
-              <a:buChar char="•"/>
-            </a:pPr>
-            <a:r>
-              <a:rPr lang="ru-RU" b="1" dirty="0"/>
-              <a:t> </a:t>
-            </a:r>
-            <a:r>
-              <a:rPr lang="ru-RU" dirty="0"/>
-              <a:t>Разработан стенд для измерения остаточного реактивного момента при перенацеливании оптических систем.</a:t>
-            </a:r>
-          </a:p>
-          <a:p>
-            <a:pPr marL="285750" indent="-285750" algn="just">
-              <a:buFont typeface="Arial" panose="020B0604020202020204" pitchFamily="34" charset="0"/>
-              <a:buChar char="•"/>
-            </a:pPr>
-            <a:r>
-              <a:rPr lang="ru-RU" dirty="0"/>
-              <a:t> Проведено моделирование, определены оптимальные параметры колебательного звена.</a:t>
-            </a:r>
-          </a:p>
-          <a:p>
-            <a:pPr marL="285750" indent="-285750" algn="just">
-              <a:buFont typeface="Arial" panose="020B0604020202020204" pitchFamily="34" charset="0"/>
-              <a:buChar char="•"/>
-            </a:pPr>
-            <a:r>
-              <a:rPr lang="ru-RU" dirty="0"/>
-              <a:t> Методика измерения прошла аттестацию в Государственном реестре средств измерений.</a:t>
-            </a:r>
-          </a:p>
-          <a:p>
-            <a:pPr marL="285750" indent="-285750" algn="just">
-              <a:buFont typeface="Arial" panose="020B0604020202020204" pitchFamily="34" charset="0"/>
-              <a:buChar char="•"/>
-            </a:pPr>
-            <a:r>
-              <a:rPr lang="ru-RU" dirty="0"/>
-              <a:t> Достигнута высокая точность — погрешность менее 5%.</a:t>
-            </a:r>
-          </a:p>
-          <a:p>
-            <a:pPr marL="285750" indent="-285750" algn="just">
-              <a:buFont typeface="Arial" panose="020B0604020202020204" pitchFamily="34" charset="0"/>
-              <a:buChar char="•"/>
-            </a:pPr>
-            <a:r>
-              <a:rPr lang="ru-RU" dirty="0"/>
-              <a:t> Методика может применяться для настройки оптико-механических систем различного назначения</a:t>
-            </a:r>
-            <a:endParaRPr lang="ru-RU" dirty="0">
-              <a:latin typeface="+mj-lt"/>
-            </a:endParaRPr>
-          </a:p>
-        </p:txBody>
-      </p:sp>
-    </p:spTree>
-    <p:extLst>
-      <p:ext uri="{BB962C8B-B14F-4D97-AF65-F5344CB8AC3E}">
-        <p14:creationId xmlns:p14="http://schemas.microsoft.com/office/powerpoint/2010/main" val="1270011595"/>
       </p:ext>
     </p:extLst>
   </p:cSld>

</xml_diff>